<commit_message>
ALR praesentation addes more slides
</commit_message>
<xml_diff>
--- a/ALR_Vortrag.pptx
+++ b/ALR_Vortrag.pptx
@@ -1,14 +1,14 @@
 
 <file path=ppt/presentation.xml><?xml version="1.0" encoding="utf-8"?>
-<p:presentation xmlns:a="http://schemas.openxmlformats.org/drawingml/2006/main" xmlns:r="http://schemas.openxmlformats.org/officeDocument/2006/relationships" xmlns:p="http://schemas.openxmlformats.org/presentationml/2006/main" strictFirstAndLastChars="0" saveSubsetFonts="1">
+<p:presentation xmlns:a="http://schemas.openxmlformats.org/drawingml/2006/main" xmlns:r="http://schemas.openxmlformats.org/officeDocument/2006/relationships" xmlns:p="http://schemas.openxmlformats.org/presentationml/2006/main" showSpecialPlsOnTitleSld="0" strictFirstAndLastChars="0" saveSubsetFonts="1">
   <p:sldMasterIdLst>
     <p:sldMasterId id="2147483649" r:id="rId1"/>
   </p:sldMasterIdLst>
   <p:notesMasterIdLst>
-    <p:notesMasterId r:id="rId9"/>
+    <p:notesMasterId r:id="rId17"/>
   </p:notesMasterIdLst>
   <p:handoutMasterIdLst>
-    <p:handoutMasterId r:id="rId10"/>
+    <p:handoutMasterId r:id="rId18"/>
   </p:handoutMasterIdLst>
   <p:sldIdLst>
     <p:sldId id="328" r:id="rId2"/>
@@ -18,6 +18,14 @@
     <p:sldId id="333" r:id="rId6"/>
     <p:sldId id="334" r:id="rId7"/>
     <p:sldId id="335" r:id="rId8"/>
+    <p:sldId id="336" r:id="rId9"/>
+    <p:sldId id="337" r:id="rId10"/>
+    <p:sldId id="338" r:id="rId11"/>
+    <p:sldId id="339" r:id="rId12"/>
+    <p:sldId id="340" r:id="rId13"/>
+    <p:sldId id="341" r:id="rId14"/>
+    <p:sldId id="342" r:id="rId15"/>
+    <p:sldId id="343" r:id="rId16"/>
   </p:sldIdLst>
   <p:sldSz cx="9144000" cy="6858000" type="screen4x3"/>
   <p:notesSz cx="6858000" cy="9144000"/>
@@ -148,7 +156,7 @@
   </p:defaultTextStyle>
   <p:extLst>
     <p:ext uri="{EFAFB233-063F-42B5-8137-9DF3F51BA10A}">
-      <p15:sldGuideLst xmlns="" xmlns:p15="http://schemas.microsoft.com/office/powerpoint/2012/main">
+      <p15:sldGuideLst xmlns:p15="http://schemas.microsoft.com/office/powerpoint/2012/main" xmlns="">
         <p15:guide id="1" orient="horz" pos="4133">
           <p15:clr>
             <a:srgbClr val="A4A3A4"/>
@@ -902,6 +910,669 @@
 </p:notesMaster>
 </file>
 
+<file path=ppt/notesSlides/notesSlide1.xml><?xml version="1.0" encoding="utf-8"?>
+<p:notes xmlns:a="http://schemas.openxmlformats.org/drawingml/2006/main" xmlns:r="http://schemas.openxmlformats.org/officeDocument/2006/relationships" xmlns:p="http://schemas.openxmlformats.org/presentationml/2006/main">
+  <p:cSld>
+    <p:spTree>
+      <p:nvGrpSpPr>
+        <p:cNvPr id="1" name=""/>
+        <p:cNvGrpSpPr/>
+        <p:nvPr/>
+      </p:nvGrpSpPr>
+      <p:grpSpPr>
+        <a:xfrm>
+          <a:off x="0" y="0"/>
+          <a:ext cx="0" cy="0"/>
+          <a:chOff x="0" y="0"/>
+          <a:chExt cx="0" cy="0"/>
+        </a:xfrm>
+      </p:grpSpPr>
+      <p:sp>
+        <p:nvSpPr>
+          <p:cNvPr id="2" name="Folienbildplatzhalter 1"/>
+          <p:cNvSpPr>
+            <a:spLocks noGrp="1" noRot="1" noChangeAspect="1"/>
+          </p:cNvSpPr>
+          <p:nvPr>
+            <p:ph type="sldImg"/>
+          </p:nvPr>
+        </p:nvSpPr>
+        <p:spPr/>
+      </p:sp>
+      <p:sp>
+        <p:nvSpPr>
+          <p:cNvPr id="3" name="Notizenplatzhalter 2"/>
+          <p:cNvSpPr>
+            <a:spLocks noGrp="1"/>
+          </p:cNvSpPr>
+          <p:nvPr>
+            <p:ph type="body" idx="1"/>
+          </p:nvPr>
+        </p:nvSpPr>
+        <p:spPr/>
+        <p:txBody>
+          <a:bodyPr/>
+          <a:lstStyle/>
+          <a:p>
+            <a:r>
+              <a:rPr lang="de-DE" dirty="0" smtClean="0"/>
+              <a:t>Beim </a:t>
+            </a:r>
+            <a:r>
+              <a:rPr lang="de-DE" dirty="0" err="1" smtClean="0"/>
+              <a:t>start</a:t>
+            </a:r>
+            <a:r>
+              <a:rPr lang="de-DE" dirty="0" smtClean="0"/>
+              <a:t> zeigen, dass der Monat</a:t>
+            </a:r>
+            <a:r>
+              <a:rPr lang="de-DE" baseline="0" dirty="0" smtClean="0"/>
+              <a:t> bei null beginnt. Die Tage aber beginnen bei 1</a:t>
+            </a:r>
+            <a:endParaRPr lang="de-DE" dirty="0"/>
+          </a:p>
+        </p:txBody>
+      </p:sp>
+      <p:sp>
+        <p:nvSpPr>
+          <p:cNvPr id="4" name="Foliennummernplatzhalter 3"/>
+          <p:cNvSpPr>
+            <a:spLocks noGrp="1"/>
+          </p:cNvSpPr>
+          <p:nvPr>
+            <p:ph type="sldNum" sz="quarter" idx="10"/>
+          </p:nvPr>
+        </p:nvSpPr>
+        <p:spPr/>
+        <p:txBody>
+          <a:bodyPr/>
+          <a:lstStyle/>
+          <a:p>
+            <a:pPr>
+              <a:defRPr/>
+            </a:pPr>
+            <a:fld id="{B18CAF1D-5C34-46F0-BE38-8FACCDEB05E9}" type="slidenum">
+              <a:rPr lang="de-DE" smtClean="0"/>
+              <a:pPr>
+                <a:defRPr/>
+              </a:pPr>
+              <a:t>5</a:t>
+            </a:fld>
+            <a:endParaRPr lang="de-DE"/>
+          </a:p>
+        </p:txBody>
+      </p:sp>
+    </p:spTree>
+    <p:extLst>
+      <p:ext uri="{BB962C8B-B14F-4D97-AF65-F5344CB8AC3E}">
+        <p14:creationId xmlns:p14="http://schemas.microsoft.com/office/powerpoint/2010/main" val="2535150171"/>
+      </p:ext>
+    </p:extLst>
+  </p:cSld>
+  <p:clrMapOvr>
+    <a:masterClrMapping/>
+  </p:clrMapOvr>
+</p:notes>
+</file>
+
+<file path=ppt/notesSlides/notesSlide2.xml><?xml version="1.0" encoding="utf-8"?>
+<p:notes xmlns:a="http://schemas.openxmlformats.org/drawingml/2006/main" xmlns:r="http://schemas.openxmlformats.org/officeDocument/2006/relationships" xmlns:p="http://schemas.openxmlformats.org/presentationml/2006/main">
+  <p:cSld>
+    <p:spTree>
+      <p:nvGrpSpPr>
+        <p:cNvPr id="1" name=""/>
+        <p:cNvGrpSpPr/>
+        <p:nvPr/>
+      </p:nvGrpSpPr>
+      <p:grpSpPr>
+        <a:xfrm>
+          <a:off x="0" y="0"/>
+          <a:ext cx="0" cy="0"/>
+          <a:chOff x="0" y="0"/>
+          <a:chExt cx="0" cy="0"/>
+        </a:xfrm>
+      </p:grpSpPr>
+      <p:sp>
+        <p:nvSpPr>
+          <p:cNvPr id="2" name="Folienbildplatzhalter 1"/>
+          <p:cNvSpPr>
+            <a:spLocks noGrp="1" noRot="1" noChangeAspect="1"/>
+          </p:cNvSpPr>
+          <p:nvPr>
+            <p:ph type="sldImg"/>
+          </p:nvPr>
+        </p:nvSpPr>
+        <p:spPr/>
+      </p:sp>
+      <p:sp>
+        <p:nvSpPr>
+          <p:cNvPr id="3" name="Notizenplatzhalter 2"/>
+          <p:cNvSpPr>
+            <a:spLocks noGrp="1"/>
+          </p:cNvSpPr>
+          <p:nvPr>
+            <p:ph type="body" idx="1"/>
+          </p:nvPr>
+        </p:nvSpPr>
+        <p:spPr/>
+        <p:txBody>
+          <a:bodyPr/>
+          <a:lstStyle/>
+          <a:p>
+            <a:endParaRPr lang="de-DE" dirty="0"/>
+          </a:p>
+        </p:txBody>
+      </p:sp>
+      <p:sp>
+        <p:nvSpPr>
+          <p:cNvPr id="4" name="Foliennummernplatzhalter 3"/>
+          <p:cNvSpPr>
+            <a:spLocks noGrp="1"/>
+          </p:cNvSpPr>
+          <p:nvPr>
+            <p:ph type="sldNum" sz="quarter" idx="10"/>
+          </p:nvPr>
+        </p:nvSpPr>
+        <p:spPr/>
+        <p:txBody>
+          <a:bodyPr/>
+          <a:lstStyle/>
+          <a:p>
+            <a:pPr>
+              <a:defRPr/>
+            </a:pPr>
+            <a:fld id="{B18CAF1D-5C34-46F0-BE38-8FACCDEB05E9}" type="slidenum">
+              <a:rPr lang="de-DE" smtClean="0"/>
+              <a:pPr>
+                <a:defRPr/>
+              </a:pPr>
+              <a:t>8</a:t>
+            </a:fld>
+            <a:endParaRPr lang="de-DE"/>
+          </a:p>
+        </p:txBody>
+      </p:sp>
+    </p:spTree>
+    <p:extLst>
+      <p:ext uri="{BB962C8B-B14F-4D97-AF65-F5344CB8AC3E}">
+        <p14:creationId xmlns:p14="http://schemas.microsoft.com/office/powerpoint/2010/main" val="2702906516"/>
+      </p:ext>
+    </p:extLst>
+  </p:cSld>
+  <p:clrMapOvr>
+    <a:masterClrMapping/>
+  </p:clrMapOvr>
+</p:notes>
+</file>
+
+<file path=ppt/notesSlides/notesSlide3.xml><?xml version="1.0" encoding="utf-8"?>
+<p:notes xmlns:a="http://schemas.openxmlformats.org/drawingml/2006/main" xmlns:r="http://schemas.openxmlformats.org/officeDocument/2006/relationships" xmlns:p="http://schemas.openxmlformats.org/presentationml/2006/main">
+  <p:cSld>
+    <p:spTree>
+      <p:nvGrpSpPr>
+        <p:cNvPr id="1" name=""/>
+        <p:cNvGrpSpPr/>
+        <p:nvPr/>
+      </p:nvGrpSpPr>
+      <p:grpSpPr>
+        <a:xfrm>
+          <a:off x="0" y="0"/>
+          <a:ext cx="0" cy="0"/>
+          <a:chOff x="0" y="0"/>
+          <a:chExt cx="0" cy="0"/>
+        </a:xfrm>
+      </p:grpSpPr>
+      <p:sp>
+        <p:nvSpPr>
+          <p:cNvPr id="2" name="Folienbildplatzhalter 1"/>
+          <p:cNvSpPr>
+            <a:spLocks noGrp="1" noRot="1" noChangeAspect="1"/>
+          </p:cNvSpPr>
+          <p:nvPr>
+            <p:ph type="sldImg"/>
+          </p:nvPr>
+        </p:nvSpPr>
+        <p:spPr/>
+      </p:sp>
+      <p:sp>
+        <p:nvSpPr>
+          <p:cNvPr id="3" name="Notizenplatzhalter 2"/>
+          <p:cNvSpPr>
+            <a:spLocks noGrp="1"/>
+          </p:cNvSpPr>
+          <p:nvPr>
+            <p:ph type="body" idx="1"/>
+          </p:nvPr>
+        </p:nvSpPr>
+        <p:spPr/>
+        <p:txBody>
+          <a:bodyPr/>
+          <a:lstStyle/>
+          <a:p>
+            <a:r>
+              <a:rPr lang="de-DE" dirty="0" smtClean="0"/>
+              <a:t>Später wird erklärt wie weit</a:t>
+            </a:r>
+            <a:r>
+              <a:rPr lang="de-DE" baseline="0" dirty="0" smtClean="0"/>
+              <a:t> in die Zukunft – Vorhersagen werden immer ungenauer, da die neusten vorhersagen dann auf alten Vorhersagen beruhen</a:t>
+            </a:r>
+            <a:endParaRPr lang="de-DE" dirty="0"/>
+          </a:p>
+        </p:txBody>
+      </p:sp>
+      <p:sp>
+        <p:nvSpPr>
+          <p:cNvPr id="4" name="Foliennummernplatzhalter 3"/>
+          <p:cNvSpPr>
+            <a:spLocks noGrp="1"/>
+          </p:cNvSpPr>
+          <p:nvPr>
+            <p:ph type="sldNum" sz="quarter" idx="10"/>
+          </p:nvPr>
+        </p:nvSpPr>
+        <p:spPr/>
+        <p:txBody>
+          <a:bodyPr/>
+          <a:lstStyle/>
+          <a:p>
+            <a:pPr>
+              <a:defRPr/>
+            </a:pPr>
+            <a:fld id="{B18CAF1D-5C34-46F0-BE38-8FACCDEB05E9}" type="slidenum">
+              <a:rPr lang="de-DE" smtClean="0"/>
+              <a:pPr>
+                <a:defRPr/>
+              </a:pPr>
+              <a:t>10</a:t>
+            </a:fld>
+            <a:endParaRPr lang="de-DE"/>
+          </a:p>
+        </p:txBody>
+      </p:sp>
+    </p:spTree>
+    <p:extLst>
+      <p:ext uri="{BB962C8B-B14F-4D97-AF65-F5344CB8AC3E}">
+        <p14:creationId xmlns:p14="http://schemas.microsoft.com/office/powerpoint/2010/main" val="64454650"/>
+      </p:ext>
+    </p:extLst>
+  </p:cSld>
+  <p:clrMapOvr>
+    <a:masterClrMapping/>
+  </p:clrMapOvr>
+</p:notes>
+</file>
+
+<file path=ppt/notesSlides/notesSlide4.xml><?xml version="1.0" encoding="utf-8"?>
+<p:notes xmlns:a="http://schemas.openxmlformats.org/drawingml/2006/main" xmlns:r="http://schemas.openxmlformats.org/officeDocument/2006/relationships" xmlns:p="http://schemas.openxmlformats.org/presentationml/2006/main">
+  <p:cSld>
+    <p:spTree>
+      <p:nvGrpSpPr>
+        <p:cNvPr id="1" name=""/>
+        <p:cNvGrpSpPr/>
+        <p:nvPr/>
+      </p:nvGrpSpPr>
+      <p:grpSpPr>
+        <a:xfrm>
+          <a:off x="0" y="0"/>
+          <a:ext cx="0" cy="0"/>
+          <a:chOff x="0" y="0"/>
+          <a:chExt cx="0" cy="0"/>
+        </a:xfrm>
+      </p:grpSpPr>
+      <p:sp>
+        <p:nvSpPr>
+          <p:cNvPr id="2" name="Folienbildplatzhalter 1"/>
+          <p:cNvSpPr>
+            <a:spLocks noGrp="1" noRot="1" noChangeAspect="1"/>
+          </p:cNvSpPr>
+          <p:nvPr>
+            <p:ph type="sldImg"/>
+          </p:nvPr>
+        </p:nvSpPr>
+        <p:spPr/>
+      </p:sp>
+      <p:sp>
+        <p:nvSpPr>
+          <p:cNvPr id="3" name="Notizenplatzhalter 2"/>
+          <p:cNvSpPr>
+            <a:spLocks noGrp="1"/>
+          </p:cNvSpPr>
+          <p:nvPr>
+            <p:ph type="body" idx="1"/>
+          </p:nvPr>
+        </p:nvSpPr>
+        <p:spPr/>
+        <p:txBody>
+          <a:bodyPr/>
+          <a:lstStyle/>
+          <a:p>
+            <a:r>
+              <a:rPr lang="de-DE" dirty="0" smtClean="0"/>
+              <a:t>Nur weil unsere Test gut</a:t>
+            </a:r>
+            <a:r>
+              <a:rPr lang="de-DE" baseline="0" dirty="0" smtClean="0"/>
+              <a:t> waren, heißt es nicht das die </a:t>
+            </a:r>
+            <a:r>
+              <a:rPr lang="de-DE" baseline="0" dirty="0" err="1" smtClean="0"/>
+              <a:t>ergebnisse</a:t>
+            </a:r>
+            <a:r>
+              <a:rPr lang="de-DE" baseline="0" dirty="0" smtClean="0"/>
+              <a:t> repräsentativ sind </a:t>
+            </a:r>
+            <a:r>
+              <a:rPr lang="de-DE" baseline="0" dirty="0" err="1" smtClean="0"/>
+              <a:t>bzw</a:t>
+            </a:r>
+            <a:r>
+              <a:rPr lang="de-DE" baseline="0" dirty="0" smtClean="0"/>
+              <a:t> man immer gute </a:t>
+            </a:r>
+            <a:r>
+              <a:rPr lang="de-DE" baseline="0" dirty="0" err="1" smtClean="0"/>
+              <a:t>ergebnisse</a:t>
+            </a:r>
+            <a:r>
+              <a:rPr lang="de-DE" baseline="0" dirty="0" smtClean="0"/>
+              <a:t> erzielen würde.</a:t>
+            </a:r>
+          </a:p>
+          <a:p>
+            <a:endParaRPr lang="de-DE" dirty="0" smtClean="0"/>
+          </a:p>
+          <a:p>
+            <a:r>
+              <a:rPr lang="de-DE" dirty="0" smtClean="0"/>
+              <a:t>Bei unseren Test wurden keine richtigen Transaktionen durchgeführt. Also wurde der Markt</a:t>
+            </a:r>
+            <a:r>
+              <a:rPr lang="de-DE" baseline="0" dirty="0" smtClean="0"/>
+              <a:t> durch unsere Transaktionen nicht beeinflusst</a:t>
+            </a:r>
+            <a:endParaRPr lang="de-DE" dirty="0"/>
+          </a:p>
+        </p:txBody>
+      </p:sp>
+      <p:sp>
+        <p:nvSpPr>
+          <p:cNvPr id="4" name="Foliennummernplatzhalter 3"/>
+          <p:cNvSpPr>
+            <a:spLocks noGrp="1"/>
+          </p:cNvSpPr>
+          <p:nvPr>
+            <p:ph type="sldNum" sz="quarter" idx="10"/>
+          </p:nvPr>
+        </p:nvSpPr>
+        <p:spPr/>
+        <p:txBody>
+          <a:bodyPr/>
+          <a:lstStyle/>
+          <a:p>
+            <a:pPr>
+              <a:defRPr/>
+            </a:pPr>
+            <a:fld id="{B18CAF1D-5C34-46F0-BE38-8FACCDEB05E9}" type="slidenum">
+              <a:rPr lang="de-DE" smtClean="0"/>
+              <a:pPr>
+                <a:defRPr/>
+              </a:pPr>
+              <a:t>11</a:t>
+            </a:fld>
+            <a:endParaRPr lang="de-DE"/>
+          </a:p>
+        </p:txBody>
+      </p:sp>
+    </p:spTree>
+    <p:extLst>
+      <p:ext uri="{BB962C8B-B14F-4D97-AF65-F5344CB8AC3E}">
+        <p14:creationId xmlns:p14="http://schemas.microsoft.com/office/powerpoint/2010/main" val="3684959917"/>
+      </p:ext>
+    </p:extLst>
+  </p:cSld>
+  <p:clrMapOvr>
+    <a:masterClrMapping/>
+  </p:clrMapOvr>
+</p:notes>
+</file>
+
+<file path=ppt/notesSlides/notesSlide5.xml><?xml version="1.0" encoding="utf-8"?>
+<p:notes xmlns:a="http://schemas.openxmlformats.org/drawingml/2006/main" xmlns:r="http://schemas.openxmlformats.org/officeDocument/2006/relationships" xmlns:p="http://schemas.openxmlformats.org/presentationml/2006/main">
+  <p:cSld>
+    <p:spTree>
+      <p:nvGrpSpPr>
+        <p:cNvPr id="1" name=""/>
+        <p:cNvGrpSpPr/>
+        <p:nvPr/>
+      </p:nvGrpSpPr>
+      <p:grpSpPr>
+        <a:xfrm>
+          <a:off x="0" y="0"/>
+          <a:ext cx="0" cy="0"/>
+          <a:chOff x="0" y="0"/>
+          <a:chExt cx="0" cy="0"/>
+        </a:xfrm>
+      </p:grpSpPr>
+      <p:sp>
+        <p:nvSpPr>
+          <p:cNvPr id="2" name="Folienbildplatzhalter 1"/>
+          <p:cNvSpPr>
+            <a:spLocks noGrp="1" noRot="1" noChangeAspect="1"/>
+          </p:cNvSpPr>
+          <p:nvPr>
+            <p:ph type="sldImg"/>
+          </p:nvPr>
+        </p:nvSpPr>
+        <p:spPr/>
+      </p:sp>
+      <p:sp>
+        <p:nvSpPr>
+          <p:cNvPr id="3" name="Notizenplatzhalter 2"/>
+          <p:cNvSpPr>
+            <a:spLocks noGrp="1"/>
+          </p:cNvSpPr>
+          <p:nvPr>
+            <p:ph type="body" idx="1"/>
+          </p:nvPr>
+        </p:nvSpPr>
+        <p:spPr/>
+        <p:txBody>
+          <a:bodyPr/>
+          <a:lstStyle/>
+          <a:p>
+            <a:r>
+              <a:rPr lang="de-DE" dirty="0" smtClean="0"/>
+              <a:t>Jeweils bei einer einzigen Aktie.</a:t>
+            </a:r>
+          </a:p>
+          <a:p>
+            <a:endParaRPr lang="de-DE" dirty="0" smtClean="0"/>
+          </a:p>
+          <a:p>
+            <a:r>
+              <a:rPr lang="de-DE" dirty="0" smtClean="0"/>
+              <a:t>Random </a:t>
+            </a:r>
+            <a:r>
+              <a:rPr lang="de-DE" dirty="0" err="1" smtClean="0"/>
+              <a:t>Combination</a:t>
+            </a:r>
+            <a:r>
+              <a:rPr lang="de-DE" dirty="0" smtClean="0"/>
+              <a:t> sind jeweils 100 Aktien</a:t>
+            </a:r>
+            <a:endParaRPr lang="de-DE" dirty="0"/>
+          </a:p>
+        </p:txBody>
+      </p:sp>
+      <p:sp>
+        <p:nvSpPr>
+          <p:cNvPr id="4" name="Foliennummernplatzhalter 3"/>
+          <p:cNvSpPr>
+            <a:spLocks noGrp="1"/>
+          </p:cNvSpPr>
+          <p:nvPr>
+            <p:ph type="sldNum" sz="quarter" idx="10"/>
+          </p:nvPr>
+        </p:nvSpPr>
+        <p:spPr/>
+        <p:txBody>
+          <a:bodyPr/>
+          <a:lstStyle/>
+          <a:p>
+            <a:pPr>
+              <a:defRPr/>
+            </a:pPr>
+            <a:fld id="{B18CAF1D-5C34-46F0-BE38-8FACCDEB05E9}" type="slidenum">
+              <a:rPr lang="de-DE" smtClean="0"/>
+              <a:pPr>
+                <a:defRPr/>
+              </a:pPr>
+              <a:t>12</a:t>
+            </a:fld>
+            <a:endParaRPr lang="de-DE"/>
+          </a:p>
+        </p:txBody>
+      </p:sp>
+    </p:spTree>
+    <p:extLst>
+      <p:ext uri="{BB962C8B-B14F-4D97-AF65-F5344CB8AC3E}">
+        <p14:creationId xmlns:p14="http://schemas.microsoft.com/office/powerpoint/2010/main" val="1800806128"/>
+      </p:ext>
+    </p:extLst>
+  </p:cSld>
+  <p:clrMapOvr>
+    <a:masterClrMapping/>
+  </p:clrMapOvr>
+</p:notes>
+</file>
+
+<file path=ppt/notesSlides/notesSlide6.xml><?xml version="1.0" encoding="utf-8"?>
+<p:notes xmlns:a="http://schemas.openxmlformats.org/drawingml/2006/main" xmlns:r="http://schemas.openxmlformats.org/officeDocument/2006/relationships" xmlns:p="http://schemas.openxmlformats.org/presentationml/2006/main">
+  <p:cSld>
+    <p:spTree>
+      <p:nvGrpSpPr>
+        <p:cNvPr id="1" name=""/>
+        <p:cNvGrpSpPr/>
+        <p:nvPr/>
+      </p:nvGrpSpPr>
+      <p:grpSpPr>
+        <a:xfrm>
+          <a:off x="0" y="0"/>
+          <a:ext cx="0" cy="0"/>
+          <a:chOff x="0" y="0"/>
+          <a:chExt cx="0" cy="0"/>
+        </a:xfrm>
+      </p:grpSpPr>
+      <p:sp>
+        <p:nvSpPr>
+          <p:cNvPr id="2" name="Folienbildplatzhalter 1"/>
+          <p:cNvSpPr>
+            <a:spLocks noGrp="1" noRot="1" noChangeAspect="1"/>
+          </p:cNvSpPr>
+          <p:nvPr>
+            <p:ph type="sldImg"/>
+          </p:nvPr>
+        </p:nvSpPr>
+        <p:spPr/>
+      </p:sp>
+      <p:sp>
+        <p:nvSpPr>
+          <p:cNvPr id="3" name="Notizenplatzhalter 2"/>
+          <p:cNvSpPr>
+            <a:spLocks noGrp="1"/>
+          </p:cNvSpPr>
+          <p:nvPr>
+            <p:ph type="body" idx="1"/>
+          </p:nvPr>
+        </p:nvSpPr>
+        <p:spPr/>
+        <p:txBody>
+          <a:bodyPr/>
+          <a:lstStyle/>
+          <a:p>
+            <a:r>
+              <a:rPr lang="de-DE" dirty="0" smtClean="0"/>
+              <a:t>Jedes Set</a:t>
+            </a:r>
+            <a:r>
+              <a:rPr lang="de-DE" baseline="0" dirty="0" smtClean="0"/>
+              <a:t> besteht aus 150 Aktien</a:t>
+            </a:r>
+          </a:p>
+          <a:p>
+            <a:endParaRPr lang="de-DE" baseline="0" dirty="0" smtClean="0"/>
+          </a:p>
+          <a:p>
+            <a:r>
+              <a:rPr lang="de-DE" baseline="0" dirty="0" smtClean="0"/>
+              <a:t>15 Tage werden berücksichtigt, </a:t>
+            </a:r>
+            <a:r>
+              <a:rPr lang="de-DE" baseline="0" dirty="0" err="1" smtClean="0"/>
+              <a:t>dh</a:t>
+            </a:r>
+            <a:r>
+              <a:rPr lang="de-DE" baseline="0" dirty="0" smtClean="0"/>
+              <a:t> an Tag 15 sind </a:t>
+            </a:r>
+            <a:r>
+              <a:rPr lang="de-DE" baseline="0" dirty="0" err="1" smtClean="0"/>
+              <a:t>nurnoch</a:t>
+            </a:r>
+            <a:r>
+              <a:rPr lang="de-DE" baseline="0" dirty="0" smtClean="0"/>
+              <a:t> vorhergesagte Werte für die Vorhersage ausschlaggebend</a:t>
+            </a:r>
+            <a:endParaRPr lang="de-DE" dirty="0"/>
+          </a:p>
+        </p:txBody>
+      </p:sp>
+      <p:sp>
+        <p:nvSpPr>
+          <p:cNvPr id="4" name="Foliennummernplatzhalter 3"/>
+          <p:cNvSpPr>
+            <a:spLocks noGrp="1"/>
+          </p:cNvSpPr>
+          <p:nvPr>
+            <p:ph type="sldNum" sz="quarter" idx="10"/>
+          </p:nvPr>
+        </p:nvSpPr>
+        <p:spPr/>
+        <p:txBody>
+          <a:bodyPr/>
+          <a:lstStyle/>
+          <a:p>
+            <a:pPr>
+              <a:defRPr/>
+            </a:pPr>
+            <a:fld id="{B18CAF1D-5C34-46F0-BE38-8FACCDEB05E9}" type="slidenum">
+              <a:rPr lang="de-DE" smtClean="0"/>
+              <a:pPr>
+                <a:defRPr/>
+              </a:pPr>
+              <a:t>14</a:t>
+            </a:fld>
+            <a:endParaRPr lang="de-DE"/>
+          </a:p>
+        </p:txBody>
+      </p:sp>
+    </p:spTree>
+    <p:extLst>
+      <p:ext uri="{BB962C8B-B14F-4D97-AF65-F5344CB8AC3E}">
+        <p14:creationId xmlns:p14="http://schemas.microsoft.com/office/powerpoint/2010/main" val="1045000357"/>
+      </p:ext>
+    </p:extLst>
+  </p:cSld>
+  <p:clrMapOvr>
+    <a:masterClrMapping/>
+  </p:clrMapOvr>
+</p:notes>
+</file>
+
 <file path=ppt/slideLayouts/slideLayout1.xml><?xml version="1.0" encoding="utf-8"?>
 <p:sldLayout xmlns:a="http://schemas.openxmlformats.org/drawingml/2006/main" xmlns:r="http://schemas.openxmlformats.org/officeDocument/2006/relationships" xmlns:p="http://schemas.openxmlformats.org/presentationml/2006/main" showMasterSp="0" type="title" preserve="1">
   <p:cSld name="Titelfolie">
@@ -1255,10 +1926,10 @@
             <a:pPr>
               <a:defRPr/>
             </a:pPr>
-            <a:r>
+            <a:fld id="{695F87E2-7DCF-41CD-AB1B-F929B2475F9B}" type="datetime1">
               <a:rPr lang="de-DE" smtClean="0"/>
-              <a:t>       2</a:t>
-            </a:r>
+              <a:t>07.06.2015</a:t>
+            </a:fld>
             <a:endParaRPr lang="de-DE"/>
           </a:p>
         </p:txBody>
@@ -1348,10 +2019,10 @@
             <a:pPr>
               <a:defRPr/>
             </a:pPr>
-            <a:r>
+            <a:fld id="{B6B6FA6C-0F14-45A2-B60C-271D69CEE8AA}" type="datetime1">
               <a:rPr lang="de-DE" smtClean="0"/>
-              <a:t>       2</a:t>
-            </a:r>
+              <a:t>07.06.2015</a:t>
+            </a:fld>
             <a:endParaRPr lang="de-DE"/>
           </a:p>
         </p:txBody>
@@ -1683,10 +2354,10 @@
             <a:pPr>
               <a:defRPr/>
             </a:pPr>
-            <a:r>
+            <a:fld id="{521890D0-6CDC-4963-A90E-27694203ACE9}" type="datetime1">
               <a:rPr lang="de-DE" smtClean="0"/>
-              <a:t>       2</a:t>
-            </a:r>
+              <a:t>07.06.2015</a:t>
+            </a:fld>
             <a:endParaRPr lang="de-DE"/>
           </a:p>
         </p:txBody>
@@ -2249,7 +2920,6 @@
               <a:rPr lang="de-DE" dirty="0" smtClean="0"/>
               <a:t>Börsenkursvorhersage</a:t>
             </a:r>
-            <a:endParaRPr lang="de-DE" dirty="0" smtClean="0"/>
           </a:p>
         </p:txBody>
       </p:sp>
@@ -2295,7 +2965,6 @@
               <a:rPr lang="de-DE" dirty="0" smtClean="0"/>
               <a:t>6IB, 11.06.2015</a:t>
             </a:r>
-            <a:endParaRPr lang="de-DE" dirty="0" smtClean="0"/>
           </a:p>
         </p:txBody>
       </p:sp>
@@ -2359,6 +3028,1180 @@
       </p:par>
     </p:tnLst>
   </p:timing>
+</p:sld>
+</file>
+
+<file path=ppt/slides/slide10.xml><?xml version="1.0" encoding="utf-8"?>
+<p:sld xmlns:a="http://schemas.openxmlformats.org/drawingml/2006/main" xmlns:r="http://schemas.openxmlformats.org/officeDocument/2006/relationships" xmlns:p="http://schemas.openxmlformats.org/presentationml/2006/main">
+  <p:cSld>
+    <p:spTree>
+      <p:nvGrpSpPr>
+        <p:cNvPr id="1" name=""/>
+        <p:cNvGrpSpPr/>
+        <p:nvPr/>
+      </p:nvGrpSpPr>
+      <p:grpSpPr>
+        <a:xfrm>
+          <a:off x="0" y="0"/>
+          <a:ext cx="0" cy="0"/>
+          <a:chOff x="0" y="0"/>
+          <a:chExt cx="0" cy="0"/>
+        </a:xfrm>
+      </p:grpSpPr>
+      <p:sp>
+        <p:nvSpPr>
+          <p:cNvPr id="2" name="Titel 1"/>
+          <p:cNvSpPr>
+            <a:spLocks noGrp="1"/>
+          </p:cNvSpPr>
+          <p:nvPr>
+            <p:ph type="title"/>
+          </p:nvPr>
+        </p:nvSpPr>
+        <p:spPr/>
+        <p:txBody>
+          <a:bodyPr/>
+          <a:lstStyle/>
+          <a:p>
+            <a:r>
+              <a:rPr lang="de-DE" dirty="0" err="1" smtClean="0"/>
+              <a:t>Latest</a:t>
+            </a:r>
+            <a:r>
+              <a:rPr lang="de-DE" dirty="0" smtClean="0"/>
+              <a:t> Trend</a:t>
+            </a:r>
+            <a:endParaRPr lang="de-DE" dirty="0"/>
+          </a:p>
+        </p:txBody>
+      </p:sp>
+      <p:sp>
+        <p:nvSpPr>
+          <p:cNvPr id="3" name="Inhaltsplatzhalter 2"/>
+          <p:cNvSpPr>
+            <a:spLocks noGrp="1"/>
+          </p:cNvSpPr>
+          <p:nvPr>
+            <p:ph idx="1"/>
+          </p:nvPr>
+        </p:nvSpPr>
+        <p:spPr/>
+        <p:txBody>
+          <a:bodyPr/>
+          <a:lstStyle/>
+          <a:p>
+            <a:pPr marL="285750" indent="-285750">
+              <a:buFont typeface="Arial" panose="020B0604020202020204" pitchFamily="34" charset="0"/>
+              <a:buChar char="•"/>
+            </a:pPr>
+            <a:r>
+              <a:rPr lang="de-DE" dirty="0" smtClean="0"/>
+              <a:t>Vorhersage des genauen Preises einer Aktie in der Zukunft.</a:t>
+            </a:r>
+          </a:p>
+          <a:p>
+            <a:pPr marL="285750" indent="-285750">
+              <a:buFont typeface="Arial" panose="020B0604020202020204" pitchFamily="34" charset="0"/>
+              <a:buChar char="•"/>
+            </a:pPr>
+            <a:r>
+              <a:rPr lang="de-DE" dirty="0" smtClean="0"/>
+              <a:t>Aktien werden bei einer positiven Prognose gekauft.</a:t>
+            </a:r>
+          </a:p>
+          <a:p>
+            <a:pPr marL="285750" indent="-285750">
+              <a:buFont typeface="Arial" panose="020B0604020202020204" pitchFamily="34" charset="0"/>
+              <a:buChar char="•"/>
+            </a:pPr>
+            <a:r>
+              <a:rPr lang="de-DE" dirty="0" smtClean="0"/>
+              <a:t>Basiert auf der Kursentwicklung der letzten Handelstage.</a:t>
+            </a:r>
+          </a:p>
+          <a:p>
+            <a:pPr marL="285750" indent="-285750">
+              <a:buFont typeface="Arial" panose="020B0604020202020204" pitchFamily="34" charset="0"/>
+              <a:buChar char="•"/>
+            </a:pPr>
+            <a:r>
+              <a:rPr lang="de-DE" dirty="0" smtClean="0"/>
+              <a:t>Mittelwert der Abweichung wird auf den letzten Preis addiert.</a:t>
+            </a:r>
+          </a:p>
+          <a:p>
+            <a:pPr marL="285750" indent="-285750">
+              <a:buFont typeface="Arial" panose="020B0604020202020204" pitchFamily="34" charset="0"/>
+              <a:buChar char="•"/>
+            </a:pPr>
+            <a:r>
+              <a:rPr lang="de-DE" dirty="0" smtClean="0"/>
+              <a:t>Beliebig weit in die Zukunft durchführbar.</a:t>
+            </a:r>
+            <a:endParaRPr lang="de-DE" dirty="0"/>
+          </a:p>
+        </p:txBody>
+      </p:sp>
+      <p:sp>
+        <p:nvSpPr>
+          <p:cNvPr id="4" name="Fußzeilenplatzhalter 3"/>
+          <p:cNvSpPr>
+            <a:spLocks noGrp="1"/>
+          </p:cNvSpPr>
+          <p:nvPr>
+            <p:ph type="ftr" sz="quarter" idx="10"/>
+          </p:nvPr>
+        </p:nvSpPr>
+        <p:spPr/>
+        <p:txBody>
+          <a:bodyPr/>
+          <a:lstStyle/>
+          <a:p>
+            <a:pPr>
+              <a:defRPr/>
+            </a:pPr>
+            <a:r>
+              <a:rPr lang="de-DE" smtClean="0"/>
+              <a:t>Hochschule Mannheim University of Applied Sciences | ALR-Vortrag</a:t>
+            </a:r>
+            <a:endParaRPr lang="de-DE" dirty="0"/>
+          </a:p>
+        </p:txBody>
+      </p:sp>
+      <p:sp>
+        <p:nvSpPr>
+          <p:cNvPr id="6" name="Datumsplatzhalter 5"/>
+          <p:cNvSpPr>
+            <a:spLocks noGrp="1"/>
+          </p:cNvSpPr>
+          <p:nvPr>
+            <p:ph type="dt" sz="half" idx="11"/>
+          </p:nvPr>
+        </p:nvSpPr>
+        <p:spPr/>
+        <p:txBody>
+          <a:bodyPr/>
+          <a:lstStyle/>
+          <a:p>
+            <a:pPr>
+              <a:defRPr/>
+            </a:pPr>
+            <a:fld id="{7E79E592-784D-4C57-913B-5EADF498B781}" type="datetime1">
+              <a:rPr lang="de-DE" smtClean="0"/>
+              <a:t>07.06.2015</a:t>
+            </a:fld>
+            <a:endParaRPr lang="de-DE"/>
+          </a:p>
+        </p:txBody>
+      </p:sp>
+    </p:spTree>
+    <p:extLst>
+      <p:ext uri="{BB962C8B-B14F-4D97-AF65-F5344CB8AC3E}">
+        <p14:creationId xmlns:p14="http://schemas.microsoft.com/office/powerpoint/2010/main" val="2607671327"/>
+      </p:ext>
+    </p:extLst>
+  </p:cSld>
+  <p:clrMapOvr>
+    <a:masterClrMapping/>
+  </p:clrMapOvr>
+  <p:transition/>
+  <p:timing>
+    <p:tnLst>
+      <p:par>
+        <p:cTn id="1" dur="indefinite" restart="never" nodeType="tmRoot"/>
+      </p:par>
+    </p:tnLst>
+  </p:timing>
+</p:sld>
+</file>
+
+<file path=ppt/slides/slide11.xml><?xml version="1.0" encoding="utf-8"?>
+<p:sld xmlns:a="http://schemas.openxmlformats.org/drawingml/2006/main" xmlns:r="http://schemas.openxmlformats.org/officeDocument/2006/relationships" xmlns:p="http://schemas.openxmlformats.org/presentationml/2006/main">
+  <p:cSld>
+    <p:spTree>
+      <p:nvGrpSpPr>
+        <p:cNvPr id="1" name=""/>
+        <p:cNvGrpSpPr/>
+        <p:nvPr/>
+      </p:nvGrpSpPr>
+      <p:grpSpPr>
+        <a:xfrm>
+          <a:off x="0" y="0"/>
+          <a:ext cx="0" cy="0"/>
+          <a:chOff x="0" y="0"/>
+          <a:chExt cx="0" cy="0"/>
+        </a:xfrm>
+      </p:grpSpPr>
+      <p:sp>
+        <p:nvSpPr>
+          <p:cNvPr id="2" name="Titel 1"/>
+          <p:cNvSpPr>
+            <a:spLocks noGrp="1"/>
+          </p:cNvSpPr>
+          <p:nvPr>
+            <p:ph type="title"/>
+          </p:nvPr>
+        </p:nvSpPr>
+        <p:spPr/>
+        <p:txBody>
+          <a:bodyPr/>
+          <a:lstStyle/>
+          <a:p>
+            <a:r>
+              <a:rPr lang="de-DE" dirty="0" smtClean="0"/>
+              <a:t>Ergebnisse</a:t>
+            </a:r>
+            <a:endParaRPr lang="de-DE" dirty="0"/>
+          </a:p>
+        </p:txBody>
+      </p:sp>
+      <p:sp>
+        <p:nvSpPr>
+          <p:cNvPr id="3" name="Inhaltsplatzhalter 2"/>
+          <p:cNvSpPr>
+            <a:spLocks noGrp="1"/>
+          </p:cNvSpPr>
+          <p:nvPr>
+            <p:ph idx="1"/>
+          </p:nvPr>
+        </p:nvSpPr>
+        <p:spPr/>
+        <p:txBody>
+          <a:bodyPr/>
+          <a:lstStyle/>
+          <a:p>
+            <a:pPr marL="285750" indent="-285750">
+              <a:buFont typeface="Arial" panose="020B0604020202020204" pitchFamily="34" charset="0"/>
+              <a:buChar char="•"/>
+            </a:pPr>
+            <a:r>
+              <a:rPr lang="de-DE" dirty="0" smtClean="0"/>
+              <a:t>Mit allen Algorithmen hatten wir gute Ergebnisse.</a:t>
+            </a:r>
+          </a:p>
+          <a:p>
+            <a:pPr marL="285750" indent="-285750">
+              <a:buFont typeface="Arial" panose="020B0604020202020204" pitchFamily="34" charset="0"/>
+              <a:buChar char="•"/>
+            </a:pPr>
+            <a:r>
+              <a:rPr lang="de-DE" dirty="0" smtClean="0"/>
+              <a:t>Testergebnisse keine Garantie.</a:t>
+            </a:r>
+          </a:p>
+          <a:p>
+            <a:pPr marL="285750" indent="-285750">
+              <a:buFont typeface="Arial" panose="020B0604020202020204" pitchFamily="34" charset="0"/>
+              <a:buChar char="•"/>
+            </a:pPr>
+            <a:r>
+              <a:rPr lang="de-DE" dirty="0" smtClean="0"/>
+              <a:t>Verschiedene Aktienkurse verwendet.</a:t>
+            </a:r>
+          </a:p>
+          <a:p>
+            <a:pPr marL="285750" indent="-285750">
+              <a:buFont typeface="Arial" panose="020B0604020202020204" pitchFamily="34" charset="0"/>
+              <a:buChar char="•"/>
+            </a:pPr>
+            <a:r>
+              <a:rPr lang="de-DE" dirty="0" smtClean="0"/>
+              <a:t>MA Algorithmus wurde für die letzten 1000 Tage getestet.</a:t>
+            </a:r>
+          </a:p>
+          <a:p>
+            <a:pPr marL="468313" lvl="1" indent="-285750">
+              <a:buFont typeface="Arial" panose="020B0604020202020204" pitchFamily="34" charset="0"/>
+              <a:buChar char="•"/>
+            </a:pPr>
+            <a:r>
+              <a:rPr lang="de-DE" dirty="0" smtClean="0"/>
+              <a:t>Bei den Test wurde eine Aktie gekauft/verkauft</a:t>
+            </a:r>
+          </a:p>
+          <a:p>
+            <a:pPr marL="468313" lvl="1" indent="-285750">
+              <a:buFont typeface="Arial" panose="020B0604020202020204" pitchFamily="34" charset="0"/>
+              <a:buChar char="•"/>
+            </a:pPr>
+            <a:r>
+              <a:rPr lang="de-DE" dirty="0" smtClean="0"/>
+              <a:t>Gewinne/Verluste werden anhand einer Aktie genannt.</a:t>
+            </a:r>
+          </a:p>
+          <a:p>
+            <a:pPr marL="285750" indent="-285750">
+              <a:buFont typeface="Arial" panose="020B0604020202020204" pitchFamily="34" charset="0"/>
+              <a:buChar char="•"/>
+            </a:pPr>
+            <a:r>
+              <a:rPr lang="de-DE" dirty="0" err="1" smtClean="0"/>
+              <a:t>Latest</a:t>
+            </a:r>
+            <a:r>
+              <a:rPr lang="de-DE" dirty="0" smtClean="0"/>
+              <a:t> Trend Algorithmus beste Ergebnisse bei Berücksichtigung der letzten 15 Tage</a:t>
+            </a:r>
+          </a:p>
+          <a:p>
+            <a:pPr marL="468313" lvl="1" indent="-285750">
+              <a:buFont typeface="Arial" panose="020B0604020202020204" pitchFamily="34" charset="0"/>
+              <a:buChar char="•"/>
+            </a:pPr>
+            <a:r>
+              <a:rPr lang="de-DE" dirty="0" smtClean="0"/>
+              <a:t>Lang genug um längere Tendenzen zu erkennen</a:t>
+            </a:r>
+          </a:p>
+          <a:p>
+            <a:pPr marL="468313" lvl="1" indent="-285750">
+              <a:buFont typeface="Arial" panose="020B0604020202020204" pitchFamily="34" charset="0"/>
+              <a:buChar char="•"/>
+            </a:pPr>
+            <a:r>
+              <a:rPr lang="de-DE" dirty="0" smtClean="0"/>
+              <a:t>Kurz genug um kurzzeitige Trends zu erkennen</a:t>
+            </a:r>
+          </a:p>
+          <a:p>
+            <a:pPr marL="285750" indent="-285750">
+              <a:buFont typeface="Arial" panose="020B0604020202020204" pitchFamily="34" charset="0"/>
+              <a:buChar char="•"/>
+            </a:pPr>
+            <a:endParaRPr lang="de-DE" dirty="0" smtClean="0"/>
+          </a:p>
+        </p:txBody>
+      </p:sp>
+      <p:sp>
+        <p:nvSpPr>
+          <p:cNvPr id="4" name="Fußzeilenplatzhalter 3"/>
+          <p:cNvSpPr>
+            <a:spLocks noGrp="1"/>
+          </p:cNvSpPr>
+          <p:nvPr>
+            <p:ph type="ftr" sz="quarter" idx="10"/>
+          </p:nvPr>
+        </p:nvSpPr>
+        <p:spPr/>
+        <p:txBody>
+          <a:bodyPr/>
+          <a:lstStyle/>
+          <a:p>
+            <a:pPr>
+              <a:defRPr/>
+            </a:pPr>
+            <a:r>
+              <a:rPr lang="de-DE" smtClean="0"/>
+              <a:t>Hochschule Mannheim University of Applied Sciences | ALR-Vortrag</a:t>
+            </a:r>
+            <a:endParaRPr lang="de-DE" dirty="0"/>
+          </a:p>
+        </p:txBody>
+      </p:sp>
+      <p:sp>
+        <p:nvSpPr>
+          <p:cNvPr id="5" name="Datumsplatzhalter 4"/>
+          <p:cNvSpPr>
+            <a:spLocks noGrp="1"/>
+          </p:cNvSpPr>
+          <p:nvPr>
+            <p:ph type="dt" sz="half" idx="11"/>
+          </p:nvPr>
+        </p:nvSpPr>
+        <p:spPr/>
+        <p:txBody>
+          <a:bodyPr/>
+          <a:lstStyle/>
+          <a:p>
+            <a:pPr>
+              <a:defRPr/>
+            </a:pPr>
+            <a:fld id="{695F87E2-7DCF-41CD-AB1B-F929B2475F9B}" type="datetime1">
+              <a:rPr lang="de-DE" smtClean="0"/>
+              <a:t>07.06.2015</a:t>
+            </a:fld>
+            <a:endParaRPr lang="de-DE"/>
+          </a:p>
+        </p:txBody>
+      </p:sp>
+    </p:spTree>
+    <p:extLst>
+      <p:ext uri="{BB962C8B-B14F-4D97-AF65-F5344CB8AC3E}">
+        <p14:creationId xmlns:p14="http://schemas.microsoft.com/office/powerpoint/2010/main" val="240989800"/>
+      </p:ext>
+    </p:extLst>
+  </p:cSld>
+  <p:clrMapOvr>
+    <a:masterClrMapping/>
+  </p:clrMapOvr>
+  <p:transition/>
+  <p:timing>
+    <p:tnLst>
+      <p:par>
+        <p:cTn id="1" dur="indefinite" restart="never" nodeType="tmRoot"/>
+      </p:par>
+    </p:tnLst>
+  </p:timing>
+</p:sld>
+</file>
+
+<file path=ppt/slides/slide12.xml><?xml version="1.0" encoding="utf-8"?>
+<p:sld xmlns:a="http://schemas.openxmlformats.org/drawingml/2006/main" xmlns:r="http://schemas.openxmlformats.org/officeDocument/2006/relationships" xmlns:p="http://schemas.openxmlformats.org/presentationml/2006/main">
+  <p:cSld>
+    <p:spTree>
+      <p:nvGrpSpPr>
+        <p:cNvPr id="1" name=""/>
+        <p:cNvGrpSpPr/>
+        <p:nvPr/>
+      </p:nvGrpSpPr>
+      <p:grpSpPr>
+        <a:xfrm>
+          <a:off x="0" y="0"/>
+          <a:ext cx="0" cy="0"/>
+          <a:chOff x="0" y="0"/>
+          <a:chExt cx="0" cy="0"/>
+        </a:xfrm>
+      </p:grpSpPr>
+      <p:sp>
+        <p:nvSpPr>
+          <p:cNvPr id="2" name="Titel 1"/>
+          <p:cNvSpPr>
+            <a:spLocks noGrp="1"/>
+          </p:cNvSpPr>
+          <p:nvPr>
+            <p:ph type="title"/>
+          </p:nvPr>
+        </p:nvSpPr>
+        <p:spPr/>
+        <p:txBody>
+          <a:bodyPr/>
+          <a:lstStyle/>
+          <a:p>
+            <a:r>
+              <a:rPr lang="de-DE" dirty="0" err="1" smtClean="0"/>
+              <a:t>Moving</a:t>
+            </a:r>
+            <a:r>
+              <a:rPr lang="de-DE" dirty="0" smtClean="0"/>
+              <a:t> Average Algorithmus Ergebnisse</a:t>
+            </a:r>
+            <a:endParaRPr lang="de-DE" dirty="0"/>
+          </a:p>
+        </p:txBody>
+      </p:sp>
+      <p:sp>
+        <p:nvSpPr>
+          <p:cNvPr id="4" name="Fußzeilenplatzhalter 3"/>
+          <p:cNvSpPr>
+            <a:spLocks noGrp="1"/>
+          </p:cNvSpPr>
+          <p:nvPr>
+            <p:ph type="ftr" sz="quarter" idx="10"/>
+          </p:nvPr>
+        </p:nvSpPr>
+        <p:spPr/>
+        <p:txBody>
+          <a:bodyPr/>
+          <a:lstStyle/>
+          <a:p>
+            <a:pPr>
+              <a:defRPr/>
+            </a:pPr>
+            <a:r>
+              <a:rPr lang="de-DE" smtClean="0"/>
+              <a:t>Hochschule Mannheim University of Applied Sciences | ALR-Vortrag</a:t>
+            </a:r>
+            <a:endParaRPr lang="de-DE" dirty="0"/>
+          </a:p>
+        </p:txBody>
+      </p:sp>
+      <p:sp>
+        <p:nvSpPr>
+          <p:cNvPr id="5" name="Datumsplatzhalter 4"/>
+          <p:cNvSpPr>
+            <a:spLocks noGrp="1"/>
+          </p:cNvSpPr>
+          <p:nvPr>
+            <p:ph type="dt" sz="half" idx="11"/>
+          </p:nvPr>
+        </p:nvSpPr>
+        <p:spPr/>
+        <p:txBody>
+          <a:bodyPr/>
+          <a:lstStyle/>
+          <a:p>
+            <a:pPr>
+              <a:defRPr/>
+            </a:pPr>
+            <a:fld id="{695F87E2-7DCF-41CD-AB1B-F929B2475F9B}" type="datetime1">
+              <a:rPr lang="de-DE" smtClean="0"/>
+              <a:t>07.06.2015</a:t>
+            </a:fld>
+            <a:endParaRPr lang="de-DE"/>
+          </a:p>
+        </p:txBody>
+      </p:sp>
+      <p:pic>
+        <p:nvPicPr>
+          <p:cNvPr id="2050" name="Picture 2"/>
+          <p:cNvPicPr>
+            <a:picLocks noGrp="1" noChangeAspect="1" noChangeArrowheads="1"/>
+          </p:cNvPicPr>
+          <p:nvPr>
+            <p:ph idx="1"/>
+          </p:nvPr>
+        </p:nvPicPr>
+        <p:blipFill>
+          <a:blip r:embed="rId3">
+            <a:extLst>
+              <a:ext uri="{28A0092B-C50C-407E-A947-70E740481C1C}">
+                <a14:useLocalDpi xmlns:a14="http://schemas.microsoft.com/office/drawing/2010/main" val="0"/>
+              </a:ext>
+            </a:extLst>
+          </a:blip>
+          <a:srcRect/>
+          <a:stretch>
+            <a:fillRect/>
+          </a:stretch>
+        </p:blipFill>
+        <p:spPr bwMode="auto">
+          <a:xfrm>
+            <a:off x="1475656" y="2132856"/>
+            <a:ext cx="6624736" cy="3619069"/>
+          </a:xfrm>
+          <a:prstGeom prst="rect">
+            <a:avLst/>
+          </a:prstGeom>
+          <a:noFill/>
+          <a:ln>
+            <a:noFill/>
+          </a:ln>
+          <a:extLst>
+            <a:ext uri="{909E8E84-426E-40DD-AFC4-6F175D3DCCD1}">
+              <a14:hiddenFill xmlns:a14="http://schemas.microsoft.com/office/drawing/2010/main">
+                <a:solidFill>
+                  <a:schemeClr val="accent1"/>
+                </a:solidFill>
+              </a14:hiddenFill>
+            </a:ext>
+            <a:ext uri="{91240B29-F687-4F45-9708-019B960494DF}">
+              <a14:hiddenLine xmlns:a14="http://schemas.microsoft.com/office/drawing/2010/main" w="9525">
+                <a:solidFill>
+                  <a:schemeClr val="tx1"/>
+                </a:solidFill>
+                <a:miter lim="800000"/>
+                <a:headEnd/>
+                <a:tailEnd/>
+              </a14:hiddenLine>
+            </a:ext>
+          </a:extLst>
+        </p:spPr>
+      </p:pic>
+      <p:pic>
+        <p:nvPicPr>
+          <p:cNvPr id="2051" name="Picture 3"/>
+          <p:cNvPicPr>
+            <a:picLocks noChangeAspect="1" noChangeArrowheads="1"/>
+          </p:cNvPicPr>
+          <p:nvPr/>
+        </p:nvPicPr>
+        <p:blipFill>
+          <a:blip r:embed="rId4">
+            <a:extLst>
+              <a:ext uri="{28A0092B-C50C-407E-A947-70E740481C1C}">
+                <a14:useLocalDpi xmlns:a14="http://schemas.microsoft.com/office/drawing/2010/main" val="0"/>
+              </a:ext>
+            </a:extLst>
+          </a:blip>
+          <a:srcRect/>
+          <a:stretch>
+            <a:fillRect/>
+          </a:stretch>
+        </p:blipFill>
+        <p:spPr bwMode="auto">
+          <a:xfrm>
+            <a:off x="23700" y="5517232"/>
+            <a:ext cx="1485900" cy="952500"/>
+          </a:xfrm>
+          <a:prstGeom prst="rect">
+            <a:avLst/>
+          </a:prstGeom>
+          <a:noFill/>
+          <a:ln>
+            <a:noFill/>
+          </a:ln>
+          <a:extLst>
+            <a:ext uri="{909E8E84-426E-40DD-AFC4-6F175D3DCCD1}">
+              <a14:hiddenFill xmlns:a14="http://schemas.microsoft.com/office/drawing/2010/main">
+                <a:solidFill>
+                  <a:schemeClr val="accent1"/>
+                </a:solidFill>
+              </a14:hiddenFill>
+            </a:ext>
+            <a:ext uri="{91240B29-F687-4F45-9708-019B960494DF}">
+              <a14:hiddenLine xmlns:a14="http://schemas.microsoft.com/office/drawing/2010/main" w="9525">
+                <a:solidFill>
+                  <a:schemeClr val="tx1"/>
+                </a:solidFill>
+                <a:miter lim="800000"/>
+                <a:headEnd/>
+                <a:tailEnd/>
+              </a14:hiddenLine>
+            </a:ext>
+          </a:extLst>
+        </p:spPr>
+      </p:pic>
+    </p:spTree>
+    <p:extLst>
+      <p:ext uri="{BB962C8B-B14F-4D97-AF65-F5344CB8AC3E}">
+        <p14:creationId xmlns:p14="http://schemas.microsoft.com/office/powerpoint/2010/main" val="1940328831"/>
+      </p:ext>
+    </p:extLst>
+  </p:cSld>
+  <p:clrMapOvr>
+    <a:masterClrMapping/>
+  </p:clrMapOvr>
+  <p:transition/>
+  <p:timing>
+    <p:tnLst>
+      <p:par>
+        <p:cTn id="1" dur="indefinite" restart="never" nodeType="tmRoot"/>
+      </p:par>
+    </p:tnLst>
+  </p:timing>
+</p:sld>
+</file>
+
+<file path=ppt/slides/slide13.xml><?xml version="1.0" encoding="utf-8"?>
+<p:sld xmlns:a="http://schemas.openxmlformats.org/drawingml/2006/main" xmlns:r="http://schemas.openxmlformats.org/officeDocument/2006/relationships" xmlns:p="http://schemas.openxmlformats.org/presentationml/2006/main">
+  <p:cSld>
+    <p:spTree>
+      <p:nvGrpSpPr>
+        <p:cNvPr id="1" name=""/>
+        <p:cNvGrpSpPr/>
+        <p:nvPr/>
+      </p:nvGrpSpPr>
+      <p:grpSpPr>
+        <a:xfrm>
+          <a:off x="0" y="0"/>
+          <a:ext cx="0" cy="0"/>
+          <a:chOff x="0" y="0"/>
+          <a:chExt cx="0" cy="0"/>
+        </a:xfrm>
+      </p:grpSpPr>
+      <p:sp>
+        <p:nvSpPr>
+          <p:cNvPr id="2" name="Titel 1"/>
+          <p:cNvSpPr>
+            <a:spLocks noGrp="1"/>
+          </p:cNvSpPr>
+          <p:nvPr>
+            <p:ph type="title"/>
+          </p:nvPr>
+        </p:nvSpPr>
+        <p:spPr/>
+        <p:txBody>
+          <a:bodyPr/>
+          <a:lstStyle/>
+          <a:p>
+            <a:r>
+              <a:rPr lang="de-DE" dirty="0" err="1"/>
+              <a:t>Moving</a:t>
+            </a:r>
+            <a:r>
+              <a:rPr lang="de-DE" dirty="0"/>
+              <a:t> Average Algorithmus Ergebnisse</a:t>
+            </a:r>
+          </a:p>
+        </p:txBody>
+      </p:sp>
+      <p:sp>
+        <p:nvSpPr>
+          <p:cNvPr id="3" name="Inhaltsplatzhalter 2"/>
+          <p:cNvSpPr>
+            <a:spLocks noGrp="1"/>
+          </p:cNvSpPr>
+          <p:nvPr>
+            <p:ph idx="1"/>
+          </p:nvPr>
+        </p:nvSpPr>
+        <p:spPr/>
+        <p:txBody>
+          <a:bodyPr/>
+          <a:lstStyle/>
+          <a:p>
+            <a:pPr marL="285750" indent="-285750">
+              <a:buFont typeface="Arial" panose="020B0604020202020204" pitchFamily="34" charset="0"/>
+              <a:buChar char="•"/>
+            </a:pPr>
+            <a:r>
+              <a:rPr lang="de-DE" dirty="0" smtClean="0"/>
+              <a:t>Gewinne bei drei der vier Zufallskombinationen</a:t>
+            </a:r>
+          </a:p>
+          <a:p>
+            <a:pPr marL="285750" indent="-285750">
+              <a:buFont typeface="Arial" panose="020B0604020202020204" pitchFamily="34" charset="0"/>
+              <a:buChar char="•"/>
+            </a:pPr>
+            <a:r>
+              <a:rPr lang="de-DE" dirty="0" smtClean="0"/>
+              <a:t>Resultate bei den einzelnen Aktien ist nicht sehr aussagekräftig aber dennoch ein Indiz</a:t>
+            </a:r>
+          </a:p>
+          <a:p>
+            <a:pPr marL="285750" indent="-285750">
+              <a:buFont typeface="Arial" panose="020B0604020202020204" pitchFamily="34" charset="0"/>
+              <a:buChar char="•"/>
+            </a:pPr>
+            <a:r>
+              <a:rPr lang="de-DE" dirty="0" smtClean="0"/>
+              <a:t>Bei den Zufallskombinationen insgesamt </a:t>
+            </a:r>
+            <a:r>
+              <a:rPr lang="de-DE" b="1" dirty="0" smtClean="0"/>
+              <a:t>89,89 $</a:t>
+            </a:r>
+            <a:r>
+              <a:rPr lang="de-DE" dirty="0" smtClean="0"/>
+              <a:t> Gewinn in den letzten 1000 Tagen</a:t>
+            </a:r>
+          </a:p>
+          <a:p>
+            <a:pPr marL="285750" indent="-285750">
+              <a:buFont typeface="Arial" panose="020B0604020202020204" pitchFamily="34" charset="0"/>
+              <a:buChar char="•"/>
+            </a:pPr>
+            <a:endParaRPr lang="de-DE" dirty="0"/>
+          </a:p>
+        </p:txBody>
+      </p:sp>
+      <p:sp>
+        <p:nvSpPr>
+          <p:cNvPr id="4" name="Fußzeilenplatzhalter 3"/>
+          <p:cNvSpPr>
+            <a:spLocks noGrp="1"/>
+          </p:cNvSpPr>
+          <p:nvPr>
+            <p:ph type="ftr" sz="quarter" idx="10"/>
+          </p:nvPr>
+        </p:nvSpPr>
+        <p:spPr/>
+        <p:txBody>
+          <a:bodyPr/>
+          <a:lstStyle/>
+          <a:p>
+            <a:pPr>
+              <a:defRPr/>
+            </a:pPr>
+            <a:r>
+              <a:rPr lang="de-DE" smtClean="0"/>
+              <a:t>Hochschule Mannheim University of Applied Sciences | ALR-Vortrag</a:t>
+            </a:r>
+            <a:endParaRPr lang="de-DE" dirty="0"/>
+          </a:p>
+        </p:txBody>
+      </p:sp>
+      <p:sp>
+        <p:nvSpPr>
+          <p:cNvPr id="5" name="Datumsplatzhalter 4"/>
+          <p:cNvSpPr>
+            <a:spLocks noGrp="1"/>
+          </p:cNvSpPr>
+          <p:nvPr>
+            <p:ph type="dt" sz="half" idx="11"/>
+          </p:nvPr>
+        </p:nvSpPr>
+        <p:spPr/>
+        <p:txBody>
+          <a:bodyPr/>
+          <a:lstStyle/>
+          <a:p>
+            <a:pPr>
+              <a:defRPr/>
+            </a:pPr>
+            <a:fld id="{695F87E2-7DCF-41CD-AB1B-F929B2475F9B}" type="datetime1">
+              <a:rPr lang="de-DE" smtClean="0"/>
+              <a:t>07.06.2015</a:t>
+            </a:fld>
+            <a:endParaRPr lang="de-DE"/>
+          </a:p>
+        </p:txBody>
+      </p:sp>
+    </p:spTree>
+    <p:extLst>
+      <p:ext uri="{BB962C8B-B14F-4D97-AF65-F5344CB8AC3E}">
+        <p14:creationId xmlns:p14="http://schemas.microsoft.com/office/powerpoint/2010/main" val="4265248058"/>
+      </p:ext>
+    </p:extLst>
+  </p:cSld>
+  <p:clrMapOvr>
+    <a:masterClrMapping/>
+  </p:clrMapOvr>
+  <p:transition/>
+  <p:timing>
+    <p:tnLst>
+      <p:par>
+        <p:cTn id="1" dur="indefinite" restart="never" nodeType="tmRoot"/>
+      </p:par>
+    </p:tnLst>
+  </p:timing>
+</p:sld>
+</file>
+
+<file path=ppt/slides/slide14.xml><?xml version="1.0" encoding="utf-8"?>
+<p:sld xmlns:a="http://schemas.openxmlformats.org/drawingml/2006/main" xmlns:r="http://schemas.openxmlformats.org/officeDocument/2006/relationships" xmlns:p="http://schemas.openxmlformats.org/presentationml/2006/main">
+  <p:cSld>
+    <p:spTree>
+      <p:nvGrpSpPr>
+        <p:cNvPr id="1" name=""/>
+        <p:cNvGrpSpPr/>
+        <p:nvPr/>
+      </p:nvGrpSpPr>
+      <p:grpSpPr>
+        <a:xfrm>
+          <a:off x="0" y="0"/>
+          <a:ext cx="0" cy="0"/>
+          <a:chOff x="0" y="0"/>
+          <a:chExt cx="0" cy="0"/>
+        </a:xfrm>
+      </p:grpSpPr>
+      <p:sp>
+        <p:nvSpPr>
+          <p:cNvPr id="2" name="Titel 1"/>
+          <p:cNvSpPr>
+            <a:spLocks noGrp="1"/>
+          </p:cNvSpPr>
+          <p:nvPr>
+            <p:ph type="title"/>
+          </p:nvPr>
+        </p:nvSpPr>
+        <p:spPr/>
+        <p:txBody>
+          <a:bodyPr/>
+          <a:lstStyle/>
+          <a:p>
+            <a:r>
+              <a:rPr lang="de-DE" dirty="0" err="1" smtClean="0"/>
+              <a:t>Latest</a:t>
+            </a:r>
+            <a:r>
+              <a:rPr lang="de-DE" dirty="0" smtClean="0"/>
+              <a:t> Trend Algorithmus </a:t>
+            </a:r>
+            <a:r>
+              <a:rPr lang="de-DE" dirty="0"/>
+              <a:t>Ergebnisse</a:t>
+            </a:r>
+          </a:p>
+        </p:txBody>
+      </p:sp>
+      <p:sp>
+        <p:nvSpPr>
+          <p:cNvPr id="3" name="Inhaltsplatzhalter 2"/>
+          <p:cNvSpPr>
+            <a:spLocks noGrp="1"/>
+          </p:cNvSpPr>
+          <p:nvPr>
+            <p:ph idx="1"/>
+          </p:nvPr>
+        </p:nvSpPr>
+        <p:spPr/>
+        <p:txBody>
+          <a:bodyPr/>
+          <a:lstStyle/>
+          <a:p>
+            <a:endParaRPr lang="de-DE" dirty="0"/>
+          </a:p>
+        </p:txBody>
+      </p:sp>
+      <p:sp>
+        <p:nvSpPr>
+          <p:cNvPr id="4" name="Fußzeilenplatzhalter 3"/>
+          <p:cNvSpPr>
+            <a:spLocks noGrp="1"/>
+          </p:cNvSpPr>
+          <p:nvPr>
+            <p:ph type="ftr" sz="quarter" idx="10"/>
+          </p:nvPr>
+        </p:nvSpPr>
+        <p:spPr/>
+        <p:txBody>
+          <a:bodyPr/>
+          <a:lstStyle/>
+          <a:p>
+            <a:pPr>
+              <a:defRPr/>
+            </a:pPr>
+            <a:r>
+              <a:rPr lang="de-DE" smtClean="0"/>
+              <a:t>Hochschule Mannheim University of Applied Sciences | ALR-Vortrag</a:t>
+            </a:r>
+            <a:endParaRPr lang="de-DE" dirty="0"/>
+          </a:p>
+        </p:txBody>
+      </p:sp>
+      <p:sp>
+        <p:nvSpPr>
+          <p:cNvPr id="5" name="Datumsplatzhalter 4"/>
+          <p:cNvSpPr>
+            <a:spLocks noGrp="1"/>
+          </p:cNvSpPr>
+          <p:nvPr>
+            <p:ph type="dt" sz="half" idx="11"/>
+          </p:nvPr>
+        </p:nvSpPr>
+        <p:spPr/>
+        <p:txBody>
+          <a:bodyPr/>
+          <a:lstStyle/>
+          <a:p>
+            <a:pPr>
+              <a:defRPr/>
+            </a:pPr>
+            <a:fld id="{695F87E2-7DCF-41CD-AB1B-F929B2475F9B}" type="datetime1">
+              <a:rPr lang="de-DE" smtClean="0"/>
+              <a:t>07.06.2015</a:t>
+            </a:fld>
+            <a:endParaRPr lang="de-DE"/>
+          </a:p>
+        </p:txBody>
+      </p:sp>
+      <p:pic>
+        <p:nvPicPr>
+          <p:cNvPr id="4098" name="Picture 2"/>
+          <p:cNvPicPr>
+            <a:picLocks noChangeAspect="1" noChangeArrowheads="1"/>
+          </p:cNvPicPr>
+          <p:nvPr/>
+        </p:nvPicPr>
+        <p:blipFill>
+          <a:blip r:embed="rId3">
+            <a:extLst>
+              <a:ext uri="{28A0092B-C50C-407E-A947-70E740481C1C}">
+                <a14:useLocalDpi xmlns:a14="http://schemas.microsoft.com/office/drawing/2010/main" val="0"/>
+              </a:ext>
+            </a:extLst>
+          </a:blip>
+          <a:srcRect/>
+          <a:stretch>
+            <a:fillRect/>
+          </a:stretch>
+        </p:blipFill>
+        <p:spPr bwMode="auto">
+          <a:xfrm>
+            <a:off x="1547664" y="2852936"/>
+            <a:ext cx="6426645" cy="2736304"/>
+          </a:xfrm>
+          <a:prstGeom prst="rect">
+            <a:avLst/>
+          </a:prstGeom>
+          <a:noFill/>
+          <a:ln>
+            <a:noFill/>
+          </a:ln>
+          <a:extLst>
+            <a:ext uri="{909E8E84-426E-40DD-AFC4-6F175D3DCCD1}">
+              <a14:hiddenFill xmlns:a14="http://schemas.microsoft.com/office/drawing/2010/main">
+                <a:solidFill>
+                  <a:schemeClr val="accent1"/>
+                </a:solidFill>
+              </a14:hiddenFill>
+            </a:ext>
+            <a:ext uri="{91240B29-F687-4F45-9708-019B960494DF}">
+              <a14:hiddenLine xmlns:a14="http://schemas.microsoft.com/office/drawing/2010/main" w="9525">
+                <a:solidFill>
+                  <a:schemeClr val="tx1"/>
+                </a:solidFill>
+                <a:miter lim="800000"/>
+                <a:headEnd/>
+                <a:tailEnd/>
+              </a14:hiddenLine>
+            </a:ext>
+          </a:extLst>
+        </p:spPr>
+      </p:pic>
+    </p:spTree>
+    <p:extLst>
+      <p:ext uri="{BB962C8B-B14F-4D97-AF65-F5344CB8AC3E}">
+        <p14:creationId xmlns:p14="http://schemas.microsoft.com/office/powerpoint/2010/main" val="3812974443"/>
+      </p:ext>
+    </p:extLst>
+  </p:cSld>
+  <p:clrMapOvr>
+    <a:masterClrMapping/>
+  </p:clrMapOvr>
+  <p:transition/>
+</p:sld>
+</file>
+
+<file path=ppt/slides/slide15.xml><?xml version="1.0" encoding="utf-8"?>
+<p:sld xmlns:a="http://schemas.openxmlformats.org/drawingml/2006/main" xmlns:r="http://schemas.openxmlformats.org/officeDocument/2006/relationships" xmlns:p="http://schemas.openxmlformats.org/presentationml/2006/main">
+  <p:cSld>
+    <p:spTree>
+      <p:nvGrpSpPr>
+        <p:cNvPr id="1" name=""/>
+        <p:cNvGrpSpPr/>
+        <p:nvPr/>
+      </p:nvGrpSpPr>
+      <p:grpSpPr>
+        <a:xfrm>
+          <a:off x="0" y="0"/>
+          <a:ext cx="0" cy="0"/>
+          <a:chOff x="0" y="0"/>
+          <a:chExt cx="0" cy="0"/>
+        </a:xfrm>
+      </p:grpSpPr>
+      <p:sp>
+        <p:nvSpPr>
+          <p:cNvPr id="2" name="Titel 1"/>
+          <p:cNvSpPr>
+            <a:spLocks noGrp="1"/>
+          </p:cNvSpPr>
+          <p:nvPr>
+            <p:ph type="title"/>
+          </p:nvPr>
+        </p:nvSpPr>
+        <p:spPr/>
+        <p:txBody>
+          <a:bodyPr/>
+          <a:lstStyle/>
+          <a:p>
+            <a:r>
+              <a:rPr lang="de-DE" dirty="0" err="1"/>
+              <a:t>Latest</a:t>
+            </a:r>
+            <a:r>
+              <a:rPr lang="de-DE" dirty="0"/>
+              <a:t> Trend Algorithmus Ergebnisse</a:t>
+            </a:r>
+          </a:p>
+        </p:txBody>
+      </p:sp>
+      <p:sp>
+        <p:nvSpPr>
+          <p:cNvPr id="3" name="Inhaltsplatzhalter 2"/>
+          <p:cNvSpPr>
+            <a:spLocks noGrp="1"/>
+          </p:cNvSpPr>
+          <p:nvPr>
+            <p:ph idx="1"/>
+          </p:nvPr>
+        </p:nvSpPr>
+        <p:spPr/>
+        <p:txBody>
+          <a:bodyPr/>
+          <a:lstStyle/>
+          <a:p>
+            <a:pPr marL="285750" indent="-285750">
+              <a:buFont typeface="Arial" panose="020B0604020202020204" pitchFamily="34" charset="0"/>
+              <a:buChar char="•"/>
+            </a:pPr>
+            <a:r>
+              <a:rPr lang="de-DE" dirty="0" smtClean="0"/>
+              <a:t>Eine gute Vorhersage für die nächsten 4-5 Tage in die Zukunft ist sicher</a:t>
+            </a:r>
+          </a:p>
+          <a:p>
+            <a:pPr marL="285750" indent="-285750">
+              <a:buFont typeface="Arial" panose="020B0604020202020204" pitchFamily="34" charset="0"/>
+              <a:buChar char="•"/>
+            </a:pPr>
+            <a:r>
+              <a:rPr lang="de-DE" dirty="0" smtClean="0"/>
+              <a:t>Bei Set 2 + 3 sind die Vorhersagen für die nächsten 15 Tage immer noch akzeptabel mit einer Differenz von ungefähr 0.1 $</a:t>
+            </a:r>
+          </a:p>
+          <a:p>
+            <a:pPr marL="285750" indent="-285750">
+              <a:buFont typeface="Arial" panose="020B0604020202020204" pitchFamily="34" charset="0"/>
+              <a:buChar char="•"/>
+            </a:pPr>
+            <a:r>
+              <a:rPr lang="de-DE" dirty="0" smtClean="0"/>
+              <a:t>Aber bei Set </a:t>
+            </a:r>
+            <a:r>
+              <a:rPr lang="de-DE" smtClean="0"/>
+              <a:t>1 mehr als 1 $</a:t>
+            </a:r>
+            <a:endParaRPr lang="de-DE" dirty="0" smtClean="0"/>
+          </a:p>
+          <a:p>
+            <a:pPr marL="285750" indent="-285750">
+              <a:buFont typeface="Arial" panose="020B0604020202020204" pitchFamily="34" charset="0"/>
+              <a:buChar char="•"/>
+            </a:pPr>
+            <a:endParaRPr lang="de-DE" dirty="0" smtClean="0"/>
+          </a:p>
+          <a:p>
+            <a:endParaRPr lang="de-DE" dirty="0"/>
+          </a:p>
+        </p:txBody>
+      </p:sp>
+      <p:sp>
+        <p:nvSpPr>
+          <p:cNvPr id="4" name="Fußzeilenplatzhalter 3"/>
+          <p:cNvSpPr>
+            <a:spLocks noGrp="1"/>
+          </p:cNvSpPr>
+          <p:nvPr>
+            <p:ph type="ftr" sz="quarter" idx="10"/>
+          </p:nvPr>
+        </p:nvSpPr>
+        <p:spPr/>
+        <p:txBody>
+          <a:bodyPr/>
+          <a:lstStyle/>
+          <a:p>
+            <a:pPr>
+              <a:defRPr/>
+            </a:pPr>
+            <a:r>
+              <a:rPr lang="de-DE" smtClean="0"/>
+              <a:t>Hochschule Mannheim University of Applied Sciences | ALR-Vortrag</a:t>
+            </a:r>
+            <a:endParaRPr lang="de-DE" dirty="0"/>
+          </a:p>
+        </p:txBody>
+      </p:sp>
+      <p:sp>
+        <p:nvSpPr>
+          <p:cNvPr id="5" name="Datumsplatzhalter 4"/>
+          <p:cNvSpPr>
+            <a:spLocks noGrp="1"/>
+          </p:cNvSpPr>
+          <p:nvPr>
+            <p:ph type="dt" sz="half" idx="11"/>
+          </p:nvPr>
+        </p:nvSpPr>
+        <p:spPr/>
+        <p:txBody>
+          <a:bodyPr/>
+          <a:lstStyle/>
+          <a:p>
+            <a:pPr>
+              <a:defRPr/>
+            </a:pPr>
+            <a:fld id="{695F87E2-7DCF-41CD-AB1B-F929B2475F9B}" type="datetime1">
+              <a:rPr lang="de-DE" smtClean="0"/>
+              <a:t>07.06.2015</a:t>
+            </a:fld>
+            <a:endParaRPr lang="de-DE"/>
+          </a:p>
+        </p:txBody>
+      </p:sp>
+    </p:spTree>
+    <p:extLst>
+      <p:ext uri="{BB962C8B-B14F-4D97-AF65-F5344CB8AC3E}">
+        <p14:creationId xmlns:p14="http://schemas.microsoft.com/office/powerpoint/2010/main" val="1234607961"/>
+      </p:ext>
+    </p:extLst>
+  </p:cSld>
+  <p:clrMapOvr>
+    <a:masterClrMapping/>
+  </p:clrMapOvr>
+  <p:transition/>
 </p:sld>
 </file>
 
@@ -2427,15 +4270,7 @@
             </a:pPr>
             <a:r>
               <a:rPr lang="de-DE" dirty="0" smtClean="0"/>
-              <a:t>Einführung </a:t>
-            </a:r>
-            <a:r>
-              <a:rPr lang="de-DE" dirty="0" smtClean="0"/>
-              <a:t>in die </a:t>
-            </a:r>
-            <a:r>
-              <a:rPr lang="de-DE" dirty="0" smtClean="0"/>
-              <a:t>Thematik.</a:t>
+              <a:t>Einführung in die Thematik.</a:t>
             </a:r>
           </a:p>
           <a:p>
@@ -2475,7 +4310,15 @@
             </a:pPr>
             <a:r>
               <a:rPr lang="de-DE" dirty="0" smtClean="0"/>
-              <a:t>Beschreibung der benutzen Algorithmen.</a:t>
+              <a:t>Beschreibung </a:t>
+            </a:r>
+            <a:r>
+              <a:rPr lang="de-DE" dirty="0" smtClean="0"/>
+              <a:t>der Algorithmen</a:t>
+            </a:r>
+            <a:r>
+              <a:rPr lang="de-DE" dirty="0" smtClean="0"/>
+              <a:t>.</a:t>
             </a:r>
           </a:p>
           <a:p>
@@ -2521,7 +4364,6 @@
               <a:rPr lang="de-DE" dirty="0" smtClean="0"/>
               <a:t>(Live Demo)</a:t>
             </a:r>
-            <a:endParaRPr lang="de-DE" dirty="0" smtClean="0"/>
           </a:p>
         </p:txBody>
       </p:sp>
@@ -2561,11 +4403,7 @@
             </a:r>
             <a:r>
               <a:rPr lang="de-DE" dirty="0" smtClean="0"/>
-              <a:t> | </a:t>
-            </a:r>
-            <a:r>
-              <a:rPr lang="de-DE" dirty="0" smtClean="0"/>
-              <a:t>ALR-Vortrag</a:t>
+              <a:t> | ALR-Vortrag</a:t>
             </a:r>
             <a:endParaRPr lang="de-DE" dirty="0"/>
           </a:p>
@@ -2573,7 +4411,7 @@
       </p:sp>
       <p:sp>
         <p:nvSpPr>
-          <p:cNvPr id="5" name="Datumsplatzhalter 4"/>
+          <p:cNvPr id="6" name="Datumsplatzhalter 5"/>
           <p:cNvSpPr>
             <a:spLocks noGrp="1"/>
           </p:cNvSpPr>
@@ -2589,10 +4427,10 @@
             <a:pPr>
               <a:defRPr/>
             </a:pPr>
-            <a:r>
+            <a:fld id="{6063EDCB-C58D-4863-A1C4-30DD165584D1}" type="datetime1">
               <a:rPr lang="de-DE" smtClean="0"/>
-              <a:t>       2</a:t>
-            </a:r>
+              <a:t>07.06.2015</a:t>
+            </a:fld>
             <a:endParaRPr lang="de-DE"/>
           </a:p>
         </p:txBody>
@@ -2745,8 +4583,13 @@
             </a:pPr>
             <a:r>
               <a:rPr lang="de-DE" dirty="0" smtClean="0"/>
-              <a:t>Der Anteil von computerunterstütztem Handel ist weitaus höher.</a:t>
-            </a:r>
+              <a:t>Der Anteil von computerunterstütztem Handel ist weitaus höher</a:t>
+            </a:r>
+            <a:r>
+              <a:rPr lang="de-DE" dirty="0" smtClean="0"/>
+              <a:t>.</a:t>
+            </a:r>
+            <a:endParaRPr lang="de-DE" dirty="0" smtClean="0"/>
           </a:p>
           <a:p>
             <a:endParaRPr lang="de-DE" dirty="0"/>
@@ -2784,7 +4627,7 @@
       </p:sp>
       <p:sp>
         <p:nvSpPr>
-          <p:cNvPr id="5" name="Datumsplatzhalter 4"/>
+          <p:cNvPr id="6" name="Datumsplatzhalter 5"/>
           <p:cNvSpPr>
             <a:spLocks noGrp="1"/>
           </p:cNvSpPr>
@@ -2800,10 +4643,10 @@
             <a:pPr>
               <a:defRPr/>
             </a:pPr>
-            <a:r>
+            <a:fld id="{E127489A-FA8A-40B3-8B20-FF25D11E9DFD}" type="datetime1">
               <a:rPr lang="de-DE" smtClean="0"/>
-              <a:t>       2</a:t>
-            </a:r>
+              <a:t>07.06.2015</a:t>
+            </a:fld>
             <a:endParaRPr lang="de-DE"/>
           </a:p>
         </p:txBody>
@@ -2984,7 +4827,7 @@
       </p:sp>
       <p:sp>
         <p:nvSpPr>
-          <p:cNvPr id="5" name="Datumsplatzhalter 4"/>
+          <p:cNvPr id="6" name="Datumsplatzhalter 5"/>
           <p:cNvSpPr>
             <a:spLocks noGrp="1"/>
           </p:cNvSpPr>
@@ -3000,10 +4843,10 @@
             <a:pPr>
               <a:defRPr/>
             </a:pPr>
-            <a:r>
+            <a:fld id="{1CE624D5-18D4-414D-8D43-94987B9B7410}" type="datetime1">
               <a:rPr lang="de-DE" smtClean="0"/>
-              <a:t>       2</a:t>
-            </a:r>
+              <a:t>07.06.2015</a:t>
+            </a:fld>
             <a:endParaRPr lang="de-DE"/>
           </a:p>
         </p:txBody>
@@ -3125,7 +4968,7 @@
               <a:buChar char="•"/>
             </a:pPr>
             <a:endParaRPr lang="de-DE" sz="1600" dirty="0" smtClean="0">
-              <a:hlinkClick r:id="rId2"/>
+              <a:hlinkClick r:id="rId3"/>
             </a:endParaRPr>
           </a:p>
           <a:p>
@@ -3202,32 +5045,6 @@
               <a:t>Hochschule Mannheim University of Applied Sciences | ALR-Vortrag</a:t>
             </a:r>
             <a:endParaRPr lang="de-DE" dirty="0"/>
-          </a:p>
-        </p:txBody>
-      </p:sp>
-      <p:sp>
-        <p:nvSpPr>
-          <p:cNvPr id="5" name="Datumsplatzhalter 4"/>
-          <p:cNvSpPr>
-            <a:spLocks noGrp="1"/>
-          </p:cNvSpPr>
-          <p:nvPr>
-            <p:ph type="dt" sz="half" idx="11"/>
-          </p:nvPr>
-        </p:nvSpPr>
-        <p:spPr/>
-        <p:txBody>
-          <a:bodyPr/>
-          <a:lstStyle/>
-          <a:p>
-            <a:pPr>
-              <a:defRPr/>
-            </a:pPr>
-            <a:r>
-              <a:rPr lang="de-DE" smtClean="0"/>
-              <a:t>       2</a:t>
-            </a:r>
-            <a:endParaRPr lang="de-DE"/>
           </a:p>
         </p:txBody>
       </p:sp>
@@ -4092,6 +5909,32 @@
           </p:txBody>
         </p:sp>
       </p:grpSp>
+      <p:sp>
+        <p:nvSpPr>
+          <p:cNvPr id="26" name="Datumsplatzhalter 25"/>
+          <p:cNvSpPr>
+            <a:spLocks noGrp="1"/>
+          </p:cNvSpPr>
+          <p:nvPr>
+            <p:ph type="dt" sz="half" idx="11"/>
+          </p:nvPr>
+        </p:nvSpPr>
+        <p:spPr/>
+        <p:txBody>
+          <a:bodyPr/>
+          <a:lstStyle/>
+          <a:p>
+            <a:pPr>
+              <a:defRPr/>
+            </a:pPr>
+            <a:fld id="{B4B34FCF-C4FC-4403-B056-EF838823B52E}" type="datetime1">
+              <a:rPr lang="de-DE" smtClean="0"/>
+              <a:t>07.06.2015</a:t>
+            </a:fld>
+            <a:endParaRPr lang="de-DE"/>
+          </a:p>
+        </p:txBody>
+      </p:sp>
     </p:spTree>
     <p:extLst>
       <p:ext uri="{BB962C8B-B14F-4D97-AF65-F5344CB8AC3E}">
@@ -4463,32 +6306,6 @@
           </a:p>
         </p:txBody>
       </p:sp>
-      <p:sp>
-        <p:nvSpPr>
-          <p:cNvPr id="5" name="Datumsplatzhalter 4"/>
-          <p:cNvSpPr>
-            <a:spLocks noGrp="1"/>
-          </p:cNvSpPr>
-          <p:nvPr>
-            <p:ph type="dt" sz="half" idx="11"/>
-          </p:nvPr>
-        </p:nvSpPr>
-        <p:spPr/>
-        <p:txBody>
-          <a:bodyPr/>
-          <a:lstStyle/>
-          <a:p>
-            <a:pPr>
-              <a:defRPr/>
-            </a:pPr>
-            <a:r>
-              <a:rPr lang="de-DE" smtClean="0"/>
-              <a:t>       2</a:t>
-            </a:r>
-            <a:endParaRPr lang="de-DE"/>
-          </a:p>
-        </p:txBody>
-      </p:sp>
       <p:pic>
         <p:nvPicPr>
           <p:cNvPr id="1026" name="Picture 2"/>
@@ -4545,6 +6362,32 @@
           </a:extLst>
         </p:spPr>
       </p:pic>
+      <p:sp>
+        <p:nvSpPr>
+          <p:cNvPr id="3" name="Datumsplatzhalter 2"/>
+          <p:cNvSpPr>
+            <a:spLocks noGrp="1"/>
+          </p:cNvSpPr>
+          <p:nvPr>
+            <p:ph type="dt" sz="half" idx="11"/>
+          </p:nvPr>
+        </p:nvSpPr>
+        <p:spPr/>
+        <p:txBody>
+          <a:bodyPr/>
+          <a:lstStyle/>
+          <a:p>
+            <a:pPr>
+              <a:defRPr/>
+            </a:pPr>
+            <a:fld id="{8B1B29B7-D833-4D8D-A133-90782A729786}" type="datetime1">
+              <a:rPr lang="de-DE" smtClean="0"/>
+              <a:t>07.06.2015</a:t>
+            </a:fld>
+            <a:endParaRPr lang="de-DE"/>
+          </a:p>
+        </p:txBody>
+      </p:sp>
     </p:spTree>
     <p:extLst>
       <p:ext uri="{BB962C8B-B14F-4D97-AF65-F5344CB8AC3E}">
@@ -4702,7 +6545,7 @@
       </p:sp>
       <p:sp>
         <p:nvSpPr>
-          <p:cNvPr id="5" name="Datumsplatzhalter 4"/>
+          <p:cNvPr id="6" name="Datumsplatzhalter 5"/>
           <p:cNvSpPr>
             <a:spLocks noGrp="1"/>
           </p:cNvSpPr>
@@ -4718,10 +6561,10 @@
             <a:pPr>
               <a:defRPr/>
             </a:pPr>
-            <a:r>
+            <a:fld id="{034D232E-0076-4CFF-8CDB-5CDC6106C44B}" type="datetime1">
               <a:rPr lang="de-DE" smtClean="0"/>
-              <a:t>       2</a:t>
-            </a:r>
+              <a:t>07.06.2015</a:t>
+            </a:fld>
             <a:endParaRPr lang="de-DE"/>
           </a:p>
         </p:txBody>
@@ -4730,6 +6573,346 @@
     <p:extLst>
       <p:ext uri="{BB962C8B-B14F-4D97-AF65-F5344CB8AC3E}">
         <p14:creationId xmlns:p14="http://schemas.microsoft.com/office/powerpoint/2010/main" val="3263531960"/>
+      </p:ext>
+    </p:extLst>
+  </p:cSld>
+  <p:clrMapOvr>
+    <a:masterClrMapping/>
+  </p:clrMapOvr>
+  <p:transition/>
+  <p:timing>
+    <p:tnLst>
+      <p:par>
+        <p:cTn id="1" dur="indefinite" restart="never" nodeType="tmRoot"/>
+      </p:par>
+    </p:tnLst>
+  </p:timing>
+</p:sld>
+</file>
+
+<file path=ppt/slides/slide8.xml><?xml version="1.0" encoding="utf-8"?>
+<p:sld xmlns:a="http://schemas.openxmlformats.org/drawingml/2006/main" xmlns:r="http://schemas.openxmlformats.org/officeDocument/2006/relationships" xmlns:p="http://schemas.openxmlformats.org/presentationml/2006/main">
+  <p:cSld>
+    <p:spTree>
+      <p:nvGrpSpPr>
+        <p:cNvPr id="1" name=""/>
+        <p:cNvGrpSpPr/>
+        <p:nvPr/>
+      </p:nvGrpSpPr>
+      <p:grpSpPr>
+        <a:xfrm>
+          <a:off x="0" y="0"/>
+          <a:ext cx="0" cy="0"/>
+          <a:chOff x="0" y="0"/>
+          <a:chExt cx="0" cy="0"/>
+        </a:xfrm>
+      </p:grpSpPr>
+      <p:sp>
+        <p:nvSpPr>
+          <p:cNvPr id="2" name="Titel 1"/>
+          <p:cNvSpPr>
+            <a:spLocks noGrp="1"/>
+          </p:cNvSpPr>
+          <p:nvPr>
+            <p:ph type="title"/>
+          </p:nvPr>
+        </p:nvSpPr>
+        <p:spPr/>
+        <p:txBody>
+          <a:bodyPr/>
+          <a:lstStyle/>
+          <a:p>
+            <a:r>
+              <a:rPr lang="de-DE" dirty="0" err="1" smtClean="0"/>
+              <a:t>Moving</a:t>
+            </a:r>
+            <a:r>
+              <a:rPr lang="de-DE" dirty="0" smtClean="0"/>
+              <a:t> Average</a:t>
+            </a:r>
+            <a:endParaRPr lang="de-DE" dirty="0"/>
+          </a:p>
+        </p:txBody>
+      </p:sp>
+      <p:sp>
+        <p:nvSpPr>
+          <p:cNvPr id="3" name="Inhaltsplatzhalter 2"/>
+          <p:cNvSpPr>
+            <a:spLocks noGrp="1"/>
+          </p:cNvSpPr>
+          <p:nvPr>
+            <p:ph idx="1"/>
+          </p:nvPr>
+        </p:nvSpPr>
+        <p:spPr/>
+        <p:txBody>
+          <a:bodyPr/>
+          <a:lstStyle/>
+          <a:p>
+            <a:pPr marL="285750" indent="-285750">
+              <a:buFont typeface="Arial" panose="020B0604020202020204" pitchFamily="34" charset="0"/>
+              <a:buChar char="•"/>
+            </a:pPr>
+            <a:r>
+              <a:rPr lang="de-DE" dirty="0" smtClean="0"/>
+              <a:t>Gibt keinen genauen Börsenkurs der nächsten Tage</a:t>
+            </a:r>
+          </a:p>
+          <a:p>
+            <a:pPr marL="285750" indent="-285750">
+              <a:buFont typeface="Arial" panose="020B0604020202020204" pitchFamily="34" charset="0"/>
+              <a:buChar char="•"/>
+            </a:pPr>
+            <a:r>
+              <a:rPr lang="de-DE" dirty="0" smtClean="0"/>
+              <a:t>Gibt an wann eine Aktie gekauft und wann verkauft werden soll</a:t>
+            </a:r>
+          </a:p>
+          <a:p>
+            <a:pPr marL="285750" indent="-285750">
+              <a:buFont typeface="Arial" panose="020B0604020202020204" pitchFamily="34" charset="0"/>
+              <a:buChar char="•"/>
+            </a:pPr>
+            <a:r>
+              <a:rPr lang="de-DE" dirty="0" smtClean="0"/>
+              <a:t>MA der letzten 200 Tage und 50 Tage bilden</a:t>
+            </a:r>
+          </a:p>
+          <a:p>
+            <a:pPr marL="285750" indent="-285750">
+              <a:buFont typeface="Arial" panose="020B0604020202020204" pitchFamily="34" charset="0"/>
+              <a:buChar char="•"/>
+            </a:pPr>
+            <a:r>
+              <a:rPr lang="de-DE" dirty="0" smtClean="0"/>
+              <a:t>Falls MA50 &gt; MA200 Aktie kaufen</a:t>
+            </a:r>
+          </a:p>
+          <a:p>
+            <a:pPr marL="285750" indent="-285750">
+              <a:buFont typeface="Arial" panose="020B0604020202020204" pitchFamily="34" charset="0"/>
+              <a:buChar char="•"/>
+            </a:pPr>
+            <a:r>
+              <a:rPr lang="de-DE" dirty="0" smtClean="0"/>
+              <a:t>Falls MA200 &lt; MA50 Aktie verkaufen</a:t>
+            </a:r>
+          </a:p>
+          <a:p>
+            <a:pPr marL="285750" indent="-285750">
+              <a:buFont typeface="Arial" panose="020B0604020202020204" pitchFamily="34" charset="0"/>
+              <a:buChar char="•"/>
+            </a:pPr>
+            <a:r>
+              <a:rPr lang="de-DE" dirty="0" smtClean="0"/>
+              <a:t>Es werden langfristige Trends berücksichtigt</a:t>
+            </a:r>
+          </a:p>
+          <a:p>
+            <a:endParaRPr lang="de-DE" dirty="0"/>
+          </a:p>
+        </p:txBody>
+      </p:sp>
+      <p:sp>
+        <p:nvSpPr>
+          <p:cNvPr id="4" name="Fußzeilenplatzhalter 3"/>
+          <p:cNvSpPr>
+            <a:spLocks noGrp="1"/>
+          </p:cNvSpPr>
+          <p:nvPr>
+            <p:ph type="ftr" sz="quarter" idx="10"/>
+          </p:nvPr>
+        </p:nvSpPr>
+        <p:spPr/>
+        <p:txBody>
+          <a:bodyPr/>
+          <a:lstStyle/>
+          <a:p>
+            <a:pPr>
+              <a:defRPr/>
+            </a:pPr>
+            <a:r>
+              <a:rPr lang="de-DE" smtClean="0"/>
+              <a:t>Hochschule Mannheim University of Applied Sciences | ALR-Vortrag</a:t>
+            </a:r>
+            <a:endParaRPr lang="de-DE" dirty="0"/>
+          </a:p>
+        </p:txBody>
+      </p:sp>
+      <p:sp>
+        <p:nvSpPr>
+          <p:cNvPr id="6" name="Datumsplatzhalter 5"/>
+          <p:cNvSpPr>
+            <a:spLocks noGrp="1"/>
+          </p:cNvSpPr>
+          <p:nvPr>
+            <p:ph type="dt" sz="half" idx="11"/>
+          </p:nvPr>
+        </p:nvSpPr>
+        <p:spPr/>
+        <p:txBody>
+          <a:bodyPr/>
+          <a:lstStyle/>
+          <a:p>
+            <a:pPr>
+              <a:defRPr/>
+            </a:pPr>
+            <a:fld id="{DF42677E-3B94-49E4-A68C-480E82A4D5AB}" type="datetime1">
+              <a:rPr lang="de-DE" smtClean="0"/>
+              <a:t>07.06.2015</a:t>
+            </a:fld>
+            <a:endParaRPr lang="de-DE"/>
+          </a:p>
+        </p:txBody>
+      </p:sp>
+    </p:spTree>
+    <p:extLst>
+      <p:ext uri="{BB962C8B-B14F-4D97-AF65-F5344CB8AC3E}">
+        <p14:creationId xmlns:p14="http://schemas.microsoft.com/office/powerpoint/2010/main" val="3174153765"/>
+      </p:ext>
+    </p:extLst>
+  </p:cSld>
+  <p:clrMapOvr>
+    <a:masterClrMapping/>
+  </p:clrMapOvr>
+  <p:transition/>
+  <p:timing>
+    <p:tnLst>
+      <p:par>
+        <p:cTn id="1" dur="indefinite" restart="never" nodeType="tmRoot"/>
+      </p:par>
+    </p:tnLst>
+  </p:timing>
+</p:sld>
+</file>
+
+<file path=ppt/slides/slide9.xml><?xml version="1.0" encoding="utf-8"?>
+<p:sld xmlns:a="http://schemas.openxmlformats.org/drawingml/2006/main" xmlns:r="http://schemas.openxmlformats.org/officeDocument/2006/relationships" xmlns:p="http://schemas.openxmlformats.org/presentationml/2006/main">
+  <p:cSld>
+    <p:spTree>
+      <p:nvGrpSpPr>
+        <p:cNvPr id="1" name=""/>
+        <p:cNvGrpSpPr/>
+        <p:nvPr/>
+      </p:nvGrpSpPr>
+      <p:grpSpPr>
+        <a:xfrm>
+          <a:off x="0" y="0"/>
+          <a:ext cx="0" cy="0"/>
+          <a:chOff x="0" y="0"/>
+          <a:chExt cx="0" cy="0"/>
+        </a:xfrm>
+      </p:grpSpPr>
+      <p:sp>
+        <p:nvSpPr>
+          <p:cNvPr id="2" name="Titel 1"/>
+          <p:cNvSpPr>
+            <a:spLocks noGrp="1"/>
+          </p:cNvSpPr>
+          <p:nvPr>
+            <p:ph type="title"/>
+          </p:nvPr>
+        </p:nvSpPr>
+        <p:spPr/>
+        <p:txBody>
+          <a:bodyPr/>
+          <a:lstStyle/>
+          <a:p>
+            <a:endParaRPr lang="de-DE" dirty="0"/>
+          </a:p>
+        </p:txBody>
+      </p:sp>
+      <p:sp>
+        <p:nvSpPr>
+          <p:cNvPr id="3" name="Inhaltsplatzhalter 2"/>
+          <p:cNvSpPr>
+            <a:spLocks noGrp="1"/>
+          </p:cNvSpPr>
+          <p:nvPr>
+            <p:ph idx="1"/>
+          </p:nvPr>
+        </p:nvSpPr>
+        <p:spPr/>
+        <p:txBody>
+          <a:bodyPr/>
+          <a:lstStyle/>
+          <a:p>
+            <a:r>
+              <a:rPr lang="de-DE" dirty="0" smtClean="0"/>
+              <a:t>--</a:t>
+            </a:r>
+          </a:p>
+          <a:p>
+            <a:r>
+              <a:rPr lang="de-DE" dirty="0" smtClean="0"/>
+              <a:t>--TODO PLOT MOVING AVERAGE EINFÜGEN IN GRO?ER GRÖ?E</a:t>
+            </a:r>
+          </a:p>
+          <a:p>
+            <a:r>
+              <a:rPr lang="de-DE" dirty="0" smtClean="0"/>
+              <a:t>--</a:t>
+            </a:r>
+            <a:endParaRPr lang="de-DE" dirty="0"/>
+          </a:p>
+        </p:txBody>
+      </p:sp>
+      <p:sp>
+        <p:nvSpPr>
+          <p:cNvPr id="4" name="Fußzeilenplatzhalter 3"/>
+          <p:cNvSpPr>
+            <a:spLocks noGrp="1"/>
+          </p:cNvSpPr>
+          <p:nvPr>
+            <p:ph type="ftr" sz="quarter" idx="10"/>
+          </p:nvPr>
+        </p:nvSpPr>
+        <p:spPr/>
+        <p:txBody>
+          <a:bodyPr/>
+          <a:lstStyle/>
+          <a:p>
+            <a:pPr>
+              <a:defRPr/>
+            </a:pPr>
+            <a:r>
+              <a:rPr lang="de-DE" smtClean="0"/>
+              <a:t>Hochschule Mannheim University of Applied Sciences | ALR-Vortrag</a:t>
+            </a:r>
+            <a:endParaRPr lang="de-DE" dirty="0"/>
+          </a:p>
+        </p:txBody>
+      </p:sp>
+      <p:sp>
+        <p:nvSpPr>
+          <p:cNvPr id="6" name="Datumsplatzhalter 5"/>
+          <p:cNvSpPr>
+            <a:spLocks noGrp="1"/>
+          </p:cNvSpPr>
+          <p:nvPr>
+            <p:ph type="dt" sz="half" idx="11"/>
+          </p:nvPr>
+        </p:nvSpPr>
+        <p:spPr/>
+        <p:txBody>
+          <a:bodyPr/>
+          <a:lstStyle/>
+          <a:p>
+            <a:pPr>
+              <a:defRPr/>
+            </a:pPr>
+            <a:fld id="{F16A27A1-FF46-4C10-A1A3-BC12D02B18FB}" type="datetime1">
+              <a:rPr lang="de-DE" smtClean="0"/>
+              <a:t>07.06.2015</a:t>
+            </a:fld>
+            <a:endParaRPr lang="de-DE"/>
+          </a:p>
+        </p:txBody>
+      </p:sp>
+    </p:spTree>
+    <p:extLst>
+      <p:ext uri="{BB962C8B-B14F-4D97-AF65-F5344CB8AC3E}">
+        <p14:creationId xmlns:p14="http://schemas.microsoft.com/office/powerpoint/2010/main" val="3762152391"/>
       </p:ext>
     </p:extLst>
   </p:cSld>

</xml_diff>

<commit_message>
Added picture to slide
</commit_message>
<xml_diff>
--- a/ALR_Vortrag.pptx
+++ b/ALR_Vortrag.pptx
@@ -156,7 +156,7 @@
   </p:defaultTextStyle>
   <p:extLst>
     <p:ext uri="{EFAFB233-063F-42B5-8137-9DF3F51BA10A}">
-      <p15:sldGuideLst xmlns:p15="http://schemas.microsoft.com/office/powerpoint/2012/main" xmlns="">
+      <p15:sldGuideLst xmlns="" xmlns:p15="http://schemas.microsoft.com/office/powerpoint/2012/main">
         <p15:guide id="1" orient="horz" pos="4133">
           <p15:clr>
             <a:srgbClr val="A4A3A4"/>
@@ -1928,7 +1928,7 @@
             </a:pPr>
             <a:fld id="{695F87E2-7DCF-41CD-AB1B-F929B2475F9B}" type="datetime1">
               <a:rPr lang="de-DE" smtClean="0"/>
-              <a:t>07.06.2015</a:t>
+              <a:t>08.06.2015</a:t>
             </a:fld>
             <a:endParaRPr lang="de-DE"/>
           </a:p>
@@ -2021,7 +2021,7 @@
             </a:pPr>
             <a:fld id="{B6B6FA6C-0F14-45A2-B60C-271D69CEE8AA}" type="datetime1">
               <a:rPr lang="de-DE" smtClean="0"/>
-              <a:t>07.06.2015</a:t>
+              <a:t>08.06.2015</a:t>
             </a:fld>
             <a:endParaRPr lang="de-DE"/>
           </a:p>
@@ -2356,7 +2356,7 @@
             </a:pPr>
             <a:fld id="{521890D0-6CDC-4963-A90E-27694203ACE9}" type="datetime1">
               <a:rPr lang="de-DE" smtClean="0"/>
-              <a:t>07.06.2015</a:t>
+              <a:t>08.06.2015</a:t>
             </a:fld>
             <a:endParaRPr lang="de-DE"/>
           </a:p>
@@ -3188,7 +3188,7 @@
             </a:pPr>
             <a:fld id="{7E79E592-784D-4C57-913B-5EADF498B781}" type="datetime1">
               <a:rPr lang="de-DE" smtClean="0"/>
-              <a:t>07.06.2015</a:t>
+              <a:t>08.06.2015</a:t>
             </a:fld>
             <a:endParaRPr lang="de-DE"/>
           </a:p>
@@ -3418,7 +3418,7 @@
             </a:pPr>
             <a:fld id="{695F87E2-7DCF-41CD-AB1B-F929B2475F9B}" type="datetime1">
               <a:rPr lang="de-DE" smtClean="0"/>
-              <a:t>07.06.2015</a:t>
+              <a:t>08.06.2015</a:t>
             </a:fld>
             <a:endParaRPr lang="de-DE"/>
           </a:p>
@@ -3535,7 +3535,7 @@
             </a:pPr>
             <a:fld id="{695F87E2-7DCF-41CD-AB1B-F929B2475F9B}" type="datetime1">
               <a:rPr lang="de-DE" smtClean="0"/>
-              <a:t>07.06.2015</a:t>
+              <a:t>08.06.2015</a:t>
             </a:fld>
             <a:endParaRPr lang="de-DE"/>
           </a:p>
@@ -3822,7 +3822,7 @@
             </a:pPr>
             <a:fld id="{695F87E2-7DCF-41CD-AB1B-F929B2475F9B}" type="datetime1">
               <a:rPr lang="de-DE" smtClean="0"/>
-              <a:t>07.06.2015</a:t>
+              <a:t>08.06.2015</a:t>
             </a:fld>
             <a:endParaRPr lang="de-DE"/>
           </a:p>
@@ -3961,7 +3961,7 @@
             </a:pPr>
             <a:fld id="{695F87E2-7DCF-41CD-AB1B-F929B2475F9B}" type="datetime1">
               <a:rPr lang="de-DE" smtClean="0"/>
-              <a:t>07.06.2015</a:t>
+              <a:t>08.06.2015</a:t>
             </a:fld>
             <a:endParaRPr lang="de-DE"/>
           </a:p>
@@ -4185,7 +4185,7 @@
             </a:pPr>
             <a:fld id="{695F87E2-7DCF-41CD-AB1B-F929B2475F9B}" type="datetime1">
               <a:rPr lang="de-DE" smtClean="0"/>
-              <a:t>07.06.2015</a:t>
+              <a:t>08.06.2015</a:t>
             </a:fld>
             <a:endParaRPr lang="de-DE"/>
           </a:p>
@@ -4310,15 +4310,7 @@
             </a:pPr>
             <a:r>
               <a:rPr lang="de-DE" dirty="0" smtClean="0"/>
-              <a:t>Beschreibung </a:t>
-            </a:r>
-            <a:r>
-              <a:rPr lang="de-DE" dirty="0" smtClean="0"/>
-              <a:t>der Algorithmen</a:t>
-            </a:r>
-            <a:r>
-              <a:rPr lang="de-DE" dirty="0" smtClean="0"/>
-              <a:t>.</a:t>
+              <a:t>Beschreibung der Algorithmen.</a:t>
             </a:r>
           </a:p>
           <a:p>
@@ -4429,7 +4421,7 @@
             </a:pPr>
             <a:fld id="{6063EDCB-C58D-4863-A1C4-30DD165584D1}" type="datetime1">
               <a:rPr lang="de-DE" smtClean="0"/>
-              <a:t>07.06.2015</a:t>
+              <a:t>08.06.2015</a:t>
             </a:fld>
             <a:endParaRPr lang="de-DE"/>
           </a:p>
@@ -4583,13 +4575,8 @@
             </a:pPr>
             <a:r>
               <a:rPr lang="de-DE" dirty="0" smtClean="0"/>
-              <a:t>Der Anteil von computerunterstütztem Handel ist weitaus höher</a:t>
-            </a:r>
-            <a:r>
-              <a:rPr lang="de-DE" dirty="0" smtClean="0"/>
-              <a:t>.</a:t>
-            </a:r>
-            <a:endParaRPr lang="de-DE" dirty="0" smtClean="0"/>
+              <a:t>Der Anteil von computerunterstütztem Handel ist weitaus höher.</a:t>
+            </a:r>
           </a:p>
           <a:p>
             <a:endParaRPr lang="de-DE" dirty="0"/>
@@ -4645,7 +4632,7 @@
             </a:pPr>
             <a:fld id="{E127489A-FA8A-40B3-8B20-FF25D11E9DFD}" type="datetime1">
               <a:rPr lang="de-DE" smtClean="0"/>
-              <a:t>07.06.2015</a:t>
+              <a:t>08.06.2015</a:t>
             </a:fld>
             <a:endParaRPr lang="de-DE"/>
           </a:p>
@@ -4845,7 +4832,7 @@
             </a:pPr>
             <a:fld id="{1CE624D5-18D4-414D-8D43-94987B9B7410}" type="datetime1">
               <a:rPr lang="de-DE" smtClean="0"/>
-              <a:t>07.06.2015</a:t>
+              <a:t>08.06.2015</a:t>
             </a:fld>
             <a:endParaRPr lang="de-DE"/>
           </a:p>
@@ -5929,7 +5916,7 @@
             </a:pPr>
             <a:fld id="{B4B34FCF-C4FC-4403-B056-EF838823B52E}" type="datetime1">
               <a:rPr lang="de-DE" smtClean="0"/>
-              <a:t>07.06.2015</a:t>
+              <a:t>08.06.2015</a:t>
             </a:fld>
             <a:endParaRPr lang="de-DE"/>
           </a:p>
@@ -6382,7 +6369,7 @@
             </a:pPr>
             <a:fld id="{8B1B29B7-D833-4D8D-A133-90782A729786}" type="datetime1">
               <a:rPr lang="de-DE" smtClean="0"/>
-              <a:t>07.06.2015</a:t>
+              <a:t>08.06.2015</a:t>
             </a:fld>
             <a:endParaRPr lang="de-DE"/>
           </a:p>
@@ -6563,7 +6550,7 @@
             </a:pPr>
             <a:fld id="{034D232E-0076-4CFF-8CDB-5CDC6106C44B}" type="datetime1">
               <a:rPr lang="de-DE" smtClean="0"/>
-              <a:t>07.06.2015</a:t>
+              <a:t>08.06.2015</a:t>
             </a:fld>
             <a:endParaRPr lang="de-DE"/>
           </a:p>
@@ -6759,7 +6746,7 @@
             </a:pPr>
             <a:fld id="{DF42677E-3B94-49E4-A68C-480E82A4D5AB}" type="datetime1">
               <a:rPr lang="de-DE" smtClean="0"/>
-              <a:t>07.06.2015</a:t>
+              <a:t>08.06.2015</a:t>
             </a:fld>
             <a:endParaRPr lang="de-DE"/>
           </a:p>
@@ -6824,12 +6811,12 @@
       </p:sp>
       <p:sp>
         <p:nvSpPr>
-          <p:cNvPr id="3" name="Inhaltsplatzhalter 2"/>
+          <p:cNvPr id="4" name="Fußzeilenplatzhalter 3"/>
           <p:cNvSpPr>
             <a:spLocks noGrp="1"/>
           </p:cNvSpPr>
           <p:nvPr>
-            <p:ph idx="1"/>
+            <p:ph type="ftr" sz="quarter" idx="10"/>
           </p:nvPr>
         </p:nvSpPr>
         <p:spPr/>
@@ -6837,21 +6824,12 @@
           <a:bodyPr/>
           <a:lstStyle/>
           <a:p>
-            <a:r>
-              <a:rPr lang="de-DE" dirty="0" smtClean="0"/>
-              <a:t>--</a:t>
-            </a:r>
-          </a:p>
-          <a:p>
-            <a:r>
-              <a:rPr lang="de-DE" dirty="0" smtClean="0"/>
-              <a:t>--TODO PLOT MOVING AVERAGE EINFÜGEN IN GRO?ER GRÖ?E</a:t>
-            </a:r>
-          </a:p>
-          <a:p>
-            <a:r>
-              <a:rPr lang="de-DE" dirty="0" smtClean="0"/>
-              <a:t>--</a:t>
+            <a:pPr>
+              <a:defRPr/>
+            </a:pPr>
+            <a:r>
+              <a:rPr lang="de-DE" smtClean="0"/>
+              <a:t>Hochschule Mannheim University of Applied Sciences | ALR-Vortrag</a:t>
             </a:r>
             <a:endParaRPr lang="de-DE" dirty="0"/>
           </a:p>
@@ -6859,12 +6837,12 @@
       </p:sp>
       <p:sp>
         <p:nvSpPr>
-          <p:cNvPr id="4" name="Fußzeilenplatzhalter 3"/>
+          <p:cNvPr id="6" name="Datumsplatzhalter 5"/>
           <p:cNvSpPr>
             <a:spLocks noGrp="1"/>
           </p:cNvSpPr>
           <p:nvPr>
-            <p:ph type="ftr" sz="quarter" idx="10"/>
+            <p:ph type="dt" sz="half" idx="11"/>
           </p:nvPr>
         </p:nvSpPr>
         <p:spPr/>
@@ -6875,40 +6853,57 @@
             <a:pPr>
               <a:defRPr/>
             </a:pPr>
-            <a:r>
-              <a:rPr lang="de-DE" smtClean="0"/>
-              <a:t>Hochschule Mannheim University of Applied Sciences | ALR-Vortrag</a:t>
-            </a:r>
-            <a:endParaRPr lang="de-DE" dirty="0"/>
-          </a:p>
-        </p:txBody>
-      </p:sp>
-      <p:sp>
-        <p:nvSpPr>
-          <p:cNvPr id="6" name="Datumsplatzhalter 5"/>
-          <p:cNvSpPr>
-            <a:spLocks noGrp="1"/>
-          </p:cNvSpPr>
-          <p:nvPr>
-            <p:ph type="dt" sz="half" idx="11"/>
-          </p:nvPr>
-        </p:nvSpPr>
-        <p:spPr/>
-        <p:txBody>
-          <a:bodyPr/>
-          <a:lstStyle/>
-          <a:p>
-            <a:pPr>
-              <a:defRPr/>
-            </a:pPr>
             <a:fld id="{F16A27A1-FF46-4C10-A1A3-BC12D02B18FB}" type="datetime1">
               <a:rPr lang="de-DE" smtClean="0"/>
-              <a:t>07.06.2015</a:t>
+              <a:t>08.06.2015</a:t>
             </a:fld>
             <a:endParaRPr lang="de-DE"/>
           </a:p>
         </p:txBody>
       </p:sp>
+      <p:pic>
+        <p:nvPicPr>
+          <p:cNvPr id="1026" name="Picture 2" descr="C:\Users\Marc M\Desktop\SS15\Seminar\PaperVorlage\Figures\MSFT_MA_FORPP.png"/>
+          <p:cNvPicPr>
+            <a:picLocks noGrp="1" noChangeAspect="1" noChangeArrowheads="1"/>
+          </p:cNvPicPr>
+          <p:nvPr>
+            <p:ph idx="1"/>
+          </p:nvPr>
+        </p:nvPicPr>
+        <p:blipFill>
+          <a:blip r:embed="rId2">
+            <a:extLst>
+              <a:ext uri="{28A0092B-C50C-407E-A947-70E740481C1C}">
+                <a14:useLocalDpi xmlns:a14="http://schemas.microsoft.com/office/drawing/2010/main" val="0"/>
+              </a:ext>
+            </a:extLst>
+          </a:blip>
+          <a:srcRect/>
+          <a:stretch>
+            <a:fillRect/>
+          </a:stretch>
+        </p:blipFill>
+        <p:spPr bwMode="auto">
+          <a:xfrm>
+            <a:off x="-756592" y="1268760"/>
+            <a:ext cx="10583316" cy="5040560"/>
+          </a:xfrm>
+          <a:prstGeom prst="rect">
+            <a:avLst/>
+          </a:prstGeom>
+          <a:noFill/>
+          <a:extLst>
+            <a:ext uri="{909E8E84-426E-40DD-AFC4-6F175D3DCCD1}">
+              <a14:hiddenFill xmlns:a14="http://schemas.microsoft.com/office/drawing/2010/main">
+                <a:solidFill>
+                  <a:srgbClr val="FFFFFF"/>
+                </a:solidFill>
+              </a14:hiddenFill>
+            </a:ext>
+          </a:extLst>
+        </p:spPr>
+      </p:pic>
     </p:spTree>
     <p:extLst>
       <p:ext uri="{BB962C8B-B14F-4D97-AF65-F5344CB8AC3E}">

</xml_diff>

<commit_message>
Corrected errors in presentation
</commit_message>
<xml_diff>
--- a/ALR_Vortrag.pptx
+++ b/ALR_Vortrag.pptx
@@ -158,7 +158,7 @@
   </p:defaultTextStyle>
   <p:extLst>
     <p:ext uri="{EFAFB233-063F-42B5-8137-9DF3F51BA10A}">
-      <p15:sldGuideLst xmlns:p15="http://schemas.microsoft.com/office/powerpoint/2012/main" xmlns="">
+      <p15:sldGuideLst xmlns="" xmlns:p15="http://schemas.microsoft.com/office/powerpoint/2012/main">
         <p15:guide id="1" orient="horz" pos="4133">
           <p15:clr>
             <a:srgbClr val="A4A3A4"/>
@@ -6650,7 +6650,6 @@
               <a:rPr lang="de-DE" dirty="0"/>
               <a:t> Average Algorithmus</a:t>
             </a:r>
-            <a:endParaRPr lang="de-DE" dirty="0"/>
           </a:p>
         </p:txBody>
       </p:sp>
@@ -7154,8 +7153,13 @@
             </a:r>
             <a:r>
               <a:rPr lang="de-DE" dirty="0" smtClean="0"/>
-              <a:t> Gewinn in den letzten 1000 Tagen</a:t>
-            </a:r>
+              <a:t> Gewinn in den letzten 1000 </a:t>
+            </a:r>
+            <a:r>
+              <a:rPr lang="de-DE" dirty="0" smtClean="0"/>
+              <a:t>Tagen erwirtschaftet</a:t>
+            </a:r>
+            <a:endParaRPr lang="de-DE" dirty="0" smtClean="0"/>
           </a:p>
           <a:p>
             <a:pPr marL="285750" indent="-285750">
@@ -7288,8 +7292,13 @@
             </a:pPr>
             <a:r>
               <a:rPr lang="de-DE" dirty="0" smtClean="0"/>
-              <a:t>Vorhersage des genauen Preises einer Aktie in der Zukunft.</a:t>
-            </a:r>
+              <a:t>Vorhersage des genauen Preises einer Aktie in der </a:t>
+            </a:r>
+            <a:r>
+              <a:rPr lang="de-DE" dirty="0" smtClean="0"/>
+              <a:t>Zukunft</a:t>
+            </a:r>
+            <a:endParaRPr lang="de-DE" dirty="0" smtClean="0"/>
           </a:p>
           <a:p>
             <a:pPr marL="285750" indent="-285750">
@@ -7298,8 +7307,13 @@
             </a:pPr>
             <a:r>
               <a:rPr lang="de-DE" dirty="0" smtClean="0"/>
-              <a:t>Aktien werden bei einer positiven Prognose gekauft.</a:t>
-            </a:r>
+              <a:t>Aktien werden bei einer positiven Prognose </a:t>
+            </a:r>
+            <a:r>
+              <a:rPr lang="de-DE" dirty="0" smtClean="0"/>
+              <a:t>gekauft</a:t>
+            </a:r>
+            <a:endParaRPr lang="de-DE" dirty="0" smtClean="0"/>
           </a:p>
           <a:p>
             <a:pPr marL="285750" indent="-285750">
@@ -7308,8 +7322,13 @@
             </a:pPr>
             <a:r>
               <a:rPr lang="de-DE" dirty="0" smtClean="0"/>
-              <a:t>Basiert auf der Kursentwicklung der letzten Handelstage.</a:t>
-            </a:r>
+              <a:t>Basiert auf der Kursentwicklung der letzten </a:t>
+            </a:r>
+            <a:r>
+              <a:rPr lang="de-DE" dirty="0" smtClean="0"/>
+              <a:t>Handelstage</a:t>
+            </a:r>
+            <a:endParaRPr lang="de-DE" dirty="0" smtClean="0"/>
           </a:p>
           <a:p>
             <a:pPr marL="285750" indent="-285750">
@@ -7318,8 +7337,13 @@
             </a:pPr>
             <a:r>
               <a:rPr lang="de-DE" dirty="0" smtClean="0"/>
-              <a:t>Mittelwert der Abweichung wird auf den letzten Preis addiert.</a:t>
-            </a:r>
+              <a:t>Mittelwert der Abweichung wird auf den letzten Preis </a:t>
+            </a:r>
+            <a:r>
+              <a:rPr lang="de-DE" dirty="0" smtClean="0"/>
+              <a:t>addiert</a:t>
+            </a:r>
+            <a:endParaRPr lang="de-DE" dirty="0" smtClean="0"/>
           </a:p>
           <a:p>
             <a:pPr marL="285750" indent="-285750">
@@ -7328,7 +7352,11 @@
             </a:pPr>
             <a:r>
               <a:rPr lang="de-DE" dirty="0" smtClean="0"/>
-              <a:t>Beliebig weit in die Zukunft durchführbar.</a:t>
+              <a:t>Beliebig weit in die Zukunft </a:t>
+            </a:r>
+            <a:r>
+              <a:rPr lang="de-DE" dirty="0" smtClean="0"/>
+              <a:t>durchführbar</a:t>
             </a:r>
             <a:endParaRPr lang="de-DE" dirty="0"/>
           </a:p>
@@ -7383,7 +7411,6 @@
               <a:rPr lang="de-DE" dirty="0"/>
               <a:t> Trend Algorithmus</a:t>
             </a:r>
-            <a:endParaRPr lang="de-DE" dirty="0"/>
           </a:p>
         </p:txBody>
       </p:sp>
@@ -7649,14 +7676,12 @@
             </a:pPr>
             <a:r>
               <a:rPr lang="de-DE" dirty="0" smtClean="0"/>
-              <a:t>Aber bei Set 1 mehr als 1 $</a:t>
-            </a:r>
-          </a:p>
-          <a:p>
-            <a:pPr marL="285750" indent="-285750">
-              <a:buFont typeface="Arial" panose="020B0604020202020204" pitchFamily="34" charset="0"/>
-              <a:buChar char="•"/>
-            </a:pPr>
+              <a:t>Aber bei Set 1 mehr als 1 </a:t>
+            </a:r>
+            <a:r>
+              <a:rPr lang="de-DE" dirty="0" smtClean="0"/>
+              <a:t>$ Differenz</a:t>
+            </a:r>
             <a:endParaRPr lang="de-DE" dirty="0" smtClean="0"/>
           </a:p>
           <a:p>
@@ -7786,8 +7811,13 @@
             </a:pPr>
             <a:r>
               <a:rPr lang="de-DE" dirty="0" smtClean="0"/>
-              <a:t>Mit allen Algorithmen hatten wir gute Ergebnisse.</a:t>
-            </a:r>
+              <a:t>Mit allen Algorithmen hatten wir gute </a:t>
+            </a:r>
+            <a:r>
+              <a:rPr lang="de-DE" dirty="0" smtClean="0"/>
+              <a:t>Ergebnisse</a:t>
+            </a:r>
+            <a:endParaRPr lang="de-DE" dirty="0" smtClean="0"/>
           </a:p>
           <a:p>
             <a:pPr marL="285750" indent="-285750">
@@ -7796,8 +7826,13 @@
             </a:pPr>
             <a:r>
               <a:rPr lang="de-DE" dirty="0" smtClean="0"/>
-              <a:t>Testergebnisse keine Garantie.</a:t>
-            </a:r>
+              <a:t>Testergebnisse keine </a:t>
+            </a:r>
+            <a:r>
+              <a:rPr lang="de-DE" dirty="0" smtClean="0"/>
+              <a:t>Garantie</a:t>
+            </a:r>
+            <a:endParaRPr lang="de-DE" dirty="0" smtClean="0"/>
           </a:p>
           <a:p>
             <a:pPr marL="285750" indent="-285750">
@@ -7806,8 +7841,13 @@
             </a:pPr>
             <a:r>
               <a:rPr lang="de-DE" dirty="0" smtClean="0"/>
-              <a:t>Verschiedene Aktienkurse verwendet.</a:t>
-            </a:r>
+              <a:t>Verschiedene Aktienkurse </a:t>
+            </a:r>
+            <a:r>
+              <a:rPr lang="de-DE" dirty="0" smtClean="0"/>
+              <a:t>verwendet</a:t>
+            </a:r>
+            <a:endParaRPr lang="de-DE" dirty="0" smtClean="0"/>
           </a:p>
           <a:p>
             <a:pPr marL="468313" lvl="1" indent="-285750">
@@ -7816,11 +7856,15 @@
             </a:pPr>
             <a:r>
               <a:rPr lang="de-DE" dirty="0" smtClean="0"/>
-              <a:t>Bei </a:t>
-            </a:r>
-            <a:r>
-              <a:rPr lang="de-DE" dirty="0" smtClean="0"/>
-              <a:t>den Test wurde eine Aktie gekauft/verkauft</a:t>
+              <a:t>Bei den </a:t>
+            </a:r>
+            <a:r>
+              <a:rPr lang="de-DE" dirty="0" smtClean="0"/>
+              <a:t>Tests </a:t>
+            </a:r>
+            <a:r>
+              <a:rPr lang="de-DE" dirty="0" smtClean="0"/>
+              <a:t>wurde eine Aktie gekauft/verkauft</a:t>
             </a:r>
           </a:p>
           <a:p>
@@ -7830,8 +7874,13 @@
             </a:pPr>
             <a:r>
               <a:rPr lang="de-DE" dirty="0" smtClean="0"/>
-              <a:t>Gewinne/Verluste werden anhand einer Aktie genannt.</a:t>
-            </a:r>
+              <a:t>Gewinne/Verluste werden anhand einer Aktie </a:t>
+            </a:r>
+            <a:r>
+              <a:rPr lang="de-DE" dirty="0" smtClean="0"/>
+              <a:t>genannt</a:t>
+            </a:r>
+            <a:endParaRPr lang="de-DE" dirty="0" smtClean="0"/>
           </a:p>
           <a:p>
             <a:pPr marL="285750" indent="-285750">
@@ -7844,34 +7893,26 @@
             </a:r>
             <a:r>
               <a:rPr lang="de-DE" dirty="0" smtClean="0"/>
-              <a:t> Trend Algorithmus beste Ergebnisse bei Berücksichtigung der letzten 15 Tage</a:t>
-            </a:r>
-          </a:p>
-          <a:p>
-            <a:pPr marL="468313" lvl="1" indent="-285750">
-              <a:buFont typeface="Arial" panose="020B0604020202020204" pitchFamily="34" charset="0"/>
-              <a:buChar char="•"/>
+              <a:t> Trend Algorithmus </a:t>
+            </a:r>
+            <a:r>
+              <a:rPr lang="de-DE" dirty="0" smtClean="0"/>
+              <a:t>lieferte beste </a:t>
+            </a:r>
+            <a:r>
+              <a:rPr lang="de-DE" dirty="0" smtClean="0"/>
+              <a:t>Ergebnisse bei Berücksichtigung der letzten 15 Tage</a:t>
+            </a:r>
+          </a:p>
+          <a:p>
+            <a:pPr marL="525463" lvl="1" indent="-342900">
+              <a:buFont typeface="Wingdings" panose="05000000000000000000" pitchFamily="2" charset="2"/>
+              <a:buChar char="Ø"/>
             </a:pPr>
             <a:r>
               <a:rPr lang="de-DE" dirty="0" smtClean="0"/>
-              <a:t>Lang genug um längere Tendenzen zu erkennen</a:t>
-            </a:r>
-          </a:p>
-          <a:p>
-            <a:pPr marL="468313" lvl="1" indent="-285750">
-              <a:buFont typeface="Arial" panose="020B0604020202020204" pitchFamily="34" charset="0"/>
-              <a:buChar char="•"/>
-            </a:pPr>
-            <a:r>
-              <a:rPr lang="de-DE" dirty="0" smtClean="0"/>
-              <a:t>Kurz genug um kurzzeitige Trends zu erkennen</a:t>
-            </a:r>
-          </a:p>
-          <a:p>
-            <a:pPr marL="285750" indent="-285750">
-              <a:buFont typeface="Arial" panose="020B0604020202020204" pitchFamily="34" charset="0"/>
-              <a:buChar char="•"/>
-            </a:pPr>
+              <a:t>Zeitraum optimal um längerfristige Tendenzen und kurzzeitige Trends erkennen zu können</a:t>
+            </a:r>
             <a:endParaRPr lang="de-DE" dirty="0" smtClean="0"/>
           </a:p>
         </p:txBody>
@@ -7990,9 +8031,30 @@
               <a:buChar char="•"/>
             </a:pPr>
             <a:r>
-              <a:rPr lang="de-DE" dirty="0" smtClean="0"/>
-              <a:t>Für die Algorithmen noch mehr Börsenkurse verwenden für eine höhere Genauigkeit.</a:t>
-            </a:r>
+              <a:rPr lang="de-DE" smtClean="0"/>
+              <a:t>Durch Berücksichtigung von </a:t>
+            </a:r>
+            <a:r>
+              <a:rPr lang="de-DE" dirty="0" smtClean="0"/>
+              <a:t>noch </a:t>
+            </a:r>
+            <a:r>
+              <a:rPr lang="de-DE" dirty="0" smtClean="0"/>
+              <a:t>mehr </a:t>
+            </a:r>
+            <a:r>
+              <a:rPr lang="de-DE" dirty="0" smtClean="0"/>
+              <a:t>Börsenkursen eine </a:t>
+            </a:r>
+            <a:r>
+              <a:rPr lang="de-DE" dirty="0" smtClean="0"/>
+              <a:t>höhere </a:t>
+            </a:r>
+            <a:r>
+              <a:rPr lang="de-DE" dirty="0" smtClean="0"/>
+              <a:t>Genauigkeit erzielen</a:t>
+            </a:r>
+            <a:endParaRPr lang="de-DE" dirty="0" smtClean="0"/>
           </a:p>
           <a:p>
             <a:pPr marL="285750" indent="-285750">
@@ -8001,8 +8063,13 @@
             </a:pPr>
             <a:r>
               <a:rPr lang="de-DE" dirty="0" smtClean="0"/>
-              <a:t>Nachrichten automatisch mit einbeziehen.</a:t>
-            </a:r>
+              <a:t>Nachrichten automatisch mit </a:t>
+            </a:r>
+            <a:r>
+              <a:rPr lang="de-DE" dirty="0" smtClean="0"/>
+              <a:t>einbeziehen</a:t>
+            </a:r>
+            <a:endParaRPr lang="de-DE" dirty="0" smtClean="0"/>
           </a:p>
           <a:p>
             <a:pPr marL="285750" indent="-285750">
@@ -8019,7 +8086,11 @@
             </a:r>
             <a:r>
               <a:rPr lang="de-DE" dirty="0" smtClean="0"/>
-              <a:t> Trends noch besser erkennen.</a:t>
+              <a:t> Trends noch besser </a:t>
+            </a:r>
+            <a:r>
+              <a:rPr lang="de-DE" dirty="0" smtClean="0"/>
+              <a:t>erkennen</a:t>
             </a:r>
             <a:endParaRPr lang="de-DE" dirty="0"/>
           </a:p>
@@ -8146,8 +8217,13 @@
             </a:pPr>
             <a:r>
               <a:rPr lang="de-DE" dirty="0" smtClean="0"/>
-              <a:t>Einführung in die Thematik.</a:t>
-            </a:r>
+              <a:t>Einführung in die </a:t>
+            </a:r>
+            <a:r>
+              <a:rPr lang="de-DE" dirty="0" smtClean="0"/>
+              <a:t>Thematik</a:t>
+            </a:r>
+            <a:endParaRPr lang="de-DE" dirty="0" smtClean="0"/>
           </a:p>
           <a:p>
             <a:pPr marL="342900" indent="-342900">
@@ -8155,8 +8231,13 @@
             </a:pPr>
             <a:r>
               <a:rPr lang="de-DE" dirty="0" smtClean="0"/>
-              <a:t>Grundlegende Überlegungen.</a:t>
-            </a:r>
+              <a:t>Grundlegende </a:t>
+            </a:r>
+            <a:r>
+              <a:rPr lang="de-DE" dirty="0" smtClean="0"/>
+              <a:t>Überlegungen</a:t>
+            </a:r>
+            <a:endParaRPr lang="de-DE" dirty="0" smtClean="0"/>
           </a:p>
           <a:p>
             <a:pPr marL="342900" indent="-342900">
@@ -8176,7 +8257,11 @@
             </a:r>
             <a:r>
               <a:rPr lang="de-DE" dirty="0" smtClean="0"/>
-              <a:t> API.</a:t>
+              <a:t> </a:t>
+            </a:r>
+            <a:r>
+              <a:rPr lang="de-DE" dirty="0" smtClean="0"/>
+              <a:t>API</a:t>
             </a:r>
             <a:endParaRPr lang="de-DE" dirty="0"/>
           </a:p>
@@ -8186,13 +8271,8 @@
             </a:pPr>
             <a:r>
               <a:rPr lang="de-DE" dirty="0" smtClean="0"/>
-              <a:t>Beschreibung der </a:t>
-            </a:r>
-            <a:r>
-              <a:rPr lang="de-DE" dirty="0" smtClean="0"/>
-              <a:t>Algorithmen und Ergebnisse</a:t>
-            </a:r>
-            <a:endParaRPr lang="de-DE" dirty="0" smtClean="0"/>
+              <a:t>Beschreibung der Algorithmen und Ergebnisse</a:t>
+            </a:r>
           </a:p>
           <a:p>
             <a:pPr marL="525463" lvl="1" indent="-342900">
@@ -8204,8 +8284,13 @@
             </a:r>
             <a:r>
               <a:rPr lang="de-DE" dirty="0" smtClean="0"/>
-              <a:t> Average.</a:t>
-            </a:r>
+              <a:t> </a:t>
+            </a:r>
+            <a:r>
+              <a:rPr lang="de-DE" dirty="0" smtClean="0"/>
+              <a:t>Average</a:t>
+            </a:r>
+            <a:endParaRPr lang="de-DE" dirty="0" smtClean="0"/>
           </a:p>
           <a:p>
             <a:pPr marL="525463" lvl="1" indent="-342900">
@@ -8217,8 +8302,13 @@
             </a:r>
             <a:r>
               <a:rPr lang="de-DE" dirty="0" smtClean="0"/>
-              <a:t> Trend.</a:t>
-            </a:r>
+              <a:t> </a:t>
+            </a:r>
+            <a:r>
+              <a:rPr lang="de-DE" dirty="0" smtClean="0"/>
+              <a:t>Trend</a:t>
+            </a:r>
+            <a:endParaRPr lang="de-DE" dirty="0" smtClean="0"/>
           </a:p>
           <a:p>
             <a:pPr marL="342900" indent="-342900">
@@ -8228,7 +8318,6 @@
               <a:rPr lang="de-DE" dirty="0" smtClean="0"/>
               <a:t>Ausblick</a:t>
             </a:r>
-            <a:endParaRPr lang="de-DE" dirty="0" smtClean="0"/>
           </a:p>
           <a:p>
             <a:pPr marL="342900" indent="-342900">
@@ -8613,8 +8702,21 @@
             </a:pPr>
             <a:r>
               <a:rPr lang="de-DE" dirty="0" smtClean="0"/>
-              <a:t>Menschen können ein gewisses Gefühl für den Markt entwickeln.</a:t>
-            </a:r>
+              <a:t>Menschen können ein gewisses Gefühl für den Markt </a:t>
+            </a:r>
+            <a:r>
+              <a:rPr lang="de-DE" dirty="0" smtClean="0"/>
+              <a:t>entwickeln (</a:t>
+            </a:r>
+            <a:r>
+              <a:rPr lang="de-DE" dirty="0"/>
+              <a:t>m</a:t>
+            </a:r>
+            <a:r>
+              <a:rPr lang="de-DE" dirty="0" smtClean="0"/>
+              <a:t>enschliche Intuition).</a:t>
+            </a:r>
+            <a:endParaRPr lang="de-DE" dirty="0" smtClean="0"/>
           </a:p>
         </p:txBody>
       </p:sp>
@@ -8937,9 +9039,24 @@
             </a:r>
           </a:p>
           <a:p>
+            <a:pPr marL="109728" indent="0">
+              <a:buNone/>
+            </a:pPr>
+            <a:r>
+              <a:rPr lang="de-DE" sz="2000" dirty="0"/>
+              <a:t> </a:t>
+            </a:r>
             <a:r>
               <a:rPr lang="de-DE" sz="2000" dirty="0" smtClean="0"/>
-              <a:t>&amp;d=06&amp;e=11&amp;f=2015&amp;g=d&amp;ignore</a:t>
+              <a:t>   </a:t>
+            </a:r>
+            <a:r>
+              <a:rPr lang="de-DE" sz="2000" dirty="0" smtClean="0"/>
+              <a:t>&amp;</a:t>
+            </a:r>
+            <a:r>
+              <a:rPr lang="de-DE" sz="2000" dirty="0" smtClean="0"/>
+              <a:t>d=06&amp;e=11&amp;f=2015&amp;g=d&amp;ignore</a:t>
             </a:r>
             <a:r>
               <a:rPr lang="de-DE" sz="2000" dirty="0"/>
@@ -10309,8 +10426,9 @@
             </a:pPr>
             <a:r>
               <a:rPr lang="de-DE" dirty="0" smtClean="0"/>
-              <a:t>Gibt keinen genauen Börsenkurs der nächsten Tage</a:t>
-            </a:r>
+              <a:t>Sagt keinen Börsenkurs für die Zukunft vorher</a:t>
+            </a:r>
+            <a:endParaRPr lang="de-DE" dirty="0" smtClean="0"/>
           </a:p>
           <a:p>
             <a:pPr marL="285750" indent="-285750">
@@ -10329,8 +10447,17 @@
             </a:pPr>
             <a:r>
               <a:rPr lang="de-DE" dirty="0" smtClean="0"/>
-              <a:t>MA der letzten 200 Tage und 50 Tage bilden</a:t>
-            </a:r>
+              <a:t>Bildet MA </a:t>
+            </a:r>
+            <a:r>
+              <a:rPr lang="de-DE" dirty="0" smtClean="0"/>
+              <a:t>der letzten 200 Tage und 50 </a:t>
+            </a:r>
+            <a:r>
+              <a:rPr lang="de-DE" dirty="0" smtClean="0"/>
+              <a:t>Tage</a:t>
+            </a:r>
+            <a:endParaRPr lang="de-DE" dirty="0" smtClean="0"/>
           </a:p>
           <a:p>
             <a:pPr marL="285750" indent="-285750">
@@ -10414,11 +10541,7 @@
             </a:r>
             <a:r>
               <a:rPr lang="de-DE" dirty="0" smtClean="0"/>
-              <a:t> </a:t>
-            </a:r>
-            <a:r>
-              <a:rPr lang="de-DE" dirty="0" smtClean="0"/>
-              <a:t>Average Algorithmus</a:t>
+              <a:t> Average Algorithmus</a:t>
             </a:r>
             <a:endParaRPr lang="de-DE" dirty="0"/>
           </a:p>

</xml_diff>

<commit_message>
Added my part to the presentations
</commit_message>
<xml_diff>
--- a/ALR_Vortrag.pptx
+++ b/ALR_Vortrag.pptx
@@ -28,6 +28,8 @@
     <p:sldId id="272" r:id="rId21"/>
     <p:sldId id="273" r:id="rId22"/>
     <p:sldId id="274" r:id="rId23"/>
+    <p:sldId id="275" r:id="rId24"/>
+    <p:sldId id="276" r:id="rId25"/>
   </p:sldIdLst>
   <p:sldSz cx="9144000" cy="6858000"/>
   <p:notesSz cx="6858000" cy="9144000"/>
@@ -203,7 +205,7 @@
           <a:bodyPr lIns="0" rIns="0" tIns="0" bIns="0" anchor="b"/>
           <a:p>
             <a:pPr algn="r"/>
-            <a:fld id="{B248DA04-A9C7-4084-B3C3-BD7ADAE45AA2}" type="slidenum">
+            <a:fld id="{F628A92F-AF0B-45CD-B28C-C7E678770CEA}" type="slidenum">
               <a:rPr lang="en-US" sz="1400">
                 <a:latin typeface="Times New Roman"/>
               </a:rPr>
@@ -238,7 +240,7 @@
       </p:grpSpPr>
       <p:sp>
         <p:nvSpPr>
-          <p:cNvPr id="171" name="PlaceHolder 1"/>
+          <p:cNvPr id="177" name="PlaceHolder 1"/>
           <p:cNvSpPr>
             <a:spLocks noGrp="1"/>
           </p:cNvSpPr>
@@ -262,27 +264,15 @@
               <a:rPr lang="en-US" sz="2000" strike="noStrike">
                 <a:latin typeface="Arial"/>
               </a:rPr>
-              <a:t>Jeweils bei einer einzigen Aktie.</a:t>
-            </a:r>
-            <a:endParaRPr/>
-          </a:p>
-          <a:p>
-            <a:endParaRPr/>
-          </a:p>
-          <a:p>
-            <a:r>
-              <a:rPr lang="en-US" sz="2000" strike="noStrike">
-                <a:latin typeface="Arial"/>
-              </a:rPr>
-              <a:t>Random Combination sind jeweils 100 Aktien</a:t>
-            </a:r>
-            <a:endParaRPr/>
-          </a:p>
-        </p:txBody>
-      </p:sp>
-      <p:sp>
-        <p:nvSpPr>
-          <p:cNvPr id="172" name="TextShape 2"/>
+              <a:t>Später wird erklärt wie weit in die Zukunft – Vorhersagen werden immer ungenauer, da die neusten vorhersagen dann auf alten Vorhersagen beruhen</a:t>
+            </a:r>
+            <a:endParaRPr/>
+          </a:p>
+        </p:txBody>
+      </p:sp>
+      <p:sp>
+        <p:nvSpPr>
+          <p:cNvPr id="178" name="TextShape 2"/>
           <p:cNvSpPr txBox="1"/>
           <p:nvPr/>
         </p:nvSpPr>
@@ -307,7 +297,114 @@
                 <a:spcPct val="100000"/>
               </a:lnSpc>
             </a:pPr>
-            <a:fld id="{2EC25E44-AAFF-45AF-96E6-A71318AC15F9}" type="slidenum">
+            <a:fld id="{6AE836FC-579A-4717-B4E4-63E3898C8A9C}" type="slidenum">
+              <a:rPr lang="en-US" sz="1200" strike="noStrike">
+                <a:solidFill>
+                  <a:srgbClr val="000000"/>
+                </a:solidFill>
+                <a:latin typeface="Arial"/>
+                <a:ea typeface="+mn-ea"/>
+              </a:rPr>
+              <a:t>&lt;number&gt;</a:t>
+            </a:fld>
+            <a:endParaRPr/>
+          </a:p>
+        </p:txBody>
+      </p:sp>
+    </p:spTree>
+  </p:cSld>
+</p:notes>
+</file>
+
+<file path=ppt/notesSlides/notesSlide12.xml><?xml version="1.0" encoding="utf-8"?>
+<p:notes xmlns:a="http://schemas.openxmlformats.org/drawingml/2006/main" xmlns:p="http://schemas.openxmlformats.org/presentationml/2006/main" xmlns:r="http://schemas.openxmlformats.org/officeDocument/2006/relationships">
+  <p:cSld>
+    <p:spTree>
+      <p:nvGrpSpPr>
+        <p:cNvPr id="1" name=""/>
+        <p:cNvGrpSpPr/>
+        <p:nvPr/>
+      </p:nvGrpSpPr>
+      <p:grpSpPr>
+        <a:xfrm>
+          <a:off x="0" y="0"/>
+          <a:ext cx="0" cy="0"/>
+          <a:chOff x="0" y="0"/>
+          <a:chExt cx="0" cy="0"/>
+        </a:xfrm>
+      </p:grpSpPr>
+      <p:sp>
+        <p:nvSpPr>
+          <p:cNvPr id="179" name="PlaceHolder 1"/>
+          <p:cNvSpPr>
+            <a:spLocks noGrp="1"/>
+          </p:cNvSpPr>
+          <p:nvPr>
+            <p:ph type="body"/>
+          </p:nvPr>
+        </p:nvSpPr>
+        <p:spPr>
+          <a:xfrm>
+            <a:off x="914400" y="4343400"/>
+            <a:ext cx="5028840" cy="4114440"/>
+          </a:xfrm>
+          <a:prstGeom prst="rect">
+            <a:avLst/>
+          </a:prstGeom>
+        </p:spPr>
+        <p:txBody>
+          <a:bodyPr/>
+          <a:p>
+            <a:r>
+              <a:rPr lang="en-US" sz="2000" strike="noStrike">
+                <a:latin typeface="Arial"/>
+              </a:rPr>
+              <a:t>Nur weil unsere Test gut waren, heißt es nicht das die ergebnisse repräsentativ sind bzw man immer gute ergebnisse erzielen würde.</a:t>
+            </a:r>
+            <a:endParaRPr/>
+          </a:p>
+          <a:p>
+            <a:endParaRPr/>
+          </a:p>
+          <a:p>
+            <a:r>
+              <a:rPr lang="en-US" sz="2000" strike="noStrike">
+                <a:latin typeface="Arial"/>
+              </a:rPr>
+              <a:t>Bei unseren Test wurden keine richtigen Transaktionen durchgeführt. Also wurde der Markt durch unsere Transaktionen nicht beeinflusst</a:t>
+            </a:r>
+            <a:endParaRPr/>
+          </a:p>
+        </p:txBody>
+      </p:sp>
+      <p:sp>
+        <p:nvSpPr>
+          <p:cNvPr id="180" name="TextShape 2"/>
+          <p:cNvSpPr txBox="1"/>
+          <p:nvPr/>
+        </p:nvSpPr>
+        <p:spPr>
+          <a:xfrm>
+            <a:off x="3886200" y="8686800"/>
+            <a:ext cx="2971440" cy="456840"/>
+          </a:xfrm>
+          <a:prstGeom prst="rect">
+            <a:avLst/>
+          </a:prstGeom>
+          <a:noFill/>
+          <a:ln w="9360">
+            <a:noFill/>
+          </a:ln>
+        </p:spPr>
+        <p:txBody>
+          <a:bodyPr anchor="b"/>
+          <a:p>
+            <a:pPr algn="r">
+              <a:lnSpc>
+                <a:spcPct val="100000"/>
+              </a:lnSpc>
+            </a:pPr>
+            <a:fld id="{E7424027-72FC-4505-A5B2-F8AB8AFCF8B9}" type="slidenum">
               <a:rPr lang="en-US" sz="1200" strike="noStrike">
                 <a:solidFill>
                   <a:srgbClr val="000000"/>
@@ -345,7 +442,7 @@
       </p:grpSpPr>
       <p:sp>
         <p:nvSpPr>
-          <p:cNvPr id="173" name="PlaceHolder 1"/>
+          <p:cNvPr id="181" name="PlaceHolder 1"/>
           <p:cNvSpPr>
             <a:spLocks noGrp="1"/>
           </p:cNvSpPr>
@@ -369,15 +466,27 @@
               <a:rPr lang="en-US" sz="2000" strike="noStrike">
                 <a:latin typeface="Arial"/>
               </a:rPr>
-              <a:t>Später wird erklärt wie weit in die Zukunft – Vorhersagen werden immer ungenauer, da die neusten vorhersagen dann auf alten Vorhersagen beruhen</a:t>
-            </a:r>
-            <a:endParaRPr/>
-          </a:p>
-        </p:txBody>
-      </p:sp>
-      <p:sp>
-        <p:nvSpPr>
-          <p:cNvPr id="174" name="TextShape 2"/>
+              <a:t>Jeweils bei einer einzigen Aktie.</a:t>
+            </a:r>
+            <a:endParaRPr/>
+          </a:p>
+          <a:p>
+            <a:endParaRPr/>
+          </a:p>
+          <a:p>
+            <a:r>
+              <a:rPr lang="en-US" sz="2000" strike="noStrike">
+                <a:latin typeface="Arial"/>
+              </a:rPr>
+              <a:t>Random Combination sind jeweils 100 Aktien</a:t>
+            </a:r>
+            <a:endParaRPr/>
+          </a:p>
+        </p:txBody>
+      </p:sp>
+      <p:sp>
+        <p:nvSpPr>
+          <p:cNvPr id="182" name="TextShape 2"/>
           <p:cNvSpPr txBox="1"/>
           <p:nvPr/>
         </p:nvSpPr>
@@ -402,7 +511,7 @@
                 <a:spcPct val="100000"/>
               </a:lnSpc>
             </a:pPr>
-            <a:fld id="{5D21E45D-AC9E-429A-BC84-B897DF9D3471}" type="slidenum">
+            <a:fld id="{96258E72-8765-43BF-982C-DCA91331719D}" type="slidenum">
               <a:rPr lang="en-US" sz="1200" strike="noStrike">
                 <a:solidFill>
                   <a:srgbClr val="000000"/>
@@ -421,7 +530,7 @@
 </p:notes>
 </file>
 
-<file path=ppt/notesSlides/notesSlide14.xml><?xml version="1.0" encoding="utf-8"?>
+<file path=ppt/notesSlides/notesSlide15.xml><?xml version="1.0" encoding="utf-8"?>
 <p:notes xmlns:a="http://schemas.openxmlformats.org/drawingml/2006/main" xmlns:p="http://schemas.openxmlformats.org/presentationml/2006/main" xmlns:r="http://schemas.openxmlformats.org/officeDocument/2006/relationships">
   <p:cSld>
     <p:spTree>
@@ -440,7 +549,7 @@
       </p:grpSpPr>
       <p:sp>
         <p:nvSpPr>
-          <p:cNvPr id="175" name="PlaceHolder 1"/>
+          <p:cNvPr id="183" name="PlaceHolder 1"/>
           <p:cNvSpPr>
             <a:spLocks noGrp="1"/>
           </p:cNvSpPr>
@@ -484,7 +593,7 @@
       </p:sp>
       <p:sp>
         <p:nvSpPr>
-          <p:cNvPr id="176" name="TextShape 2"/>
+          <p:cNvPr id="184" name="TextShape 2"/>
           <p:cNvSpPr txBox="1"/>
           <p:nvPr/>
         </p:nvSpPr>
@@ -509,114 +618,7 @@
                 <a:spcPct val="100000"/>
               </a:lnSpc>
             </a:pPr>
-            <a:fld id="{73665F9B-72C7-41B2-ACC3-F0600250219D}" type="slidenum">
-              <a:rPr lang="en-US" sz="1200" strike="noStrike">
-                <a:solidFill>
-                  <a:srgbClr val="000000"/>
-                </a:solidFill>
-                <a:latin typeface="Arial"/>
-                <a:ea typeface="+mn-ea"/>
-              </a:rPr>
-              <a:t>&lt;number&gt;</a:t>
-            </a:fld>
-            <a:endParaRPr/>
-          </a:p>
-        </p:txBody>
-      </p:sp>
-    </p:spTree>
-  </p:cSld>
-</p:notes>
-</file>
-
-<file path=ppt/notesSlides/notesSlide18.xml><?xml version="1.0" encoding="utf-8"?>
-<p:notes xmlns:a="http://schemas.openxmlformats.org/drawingml/2006/main" xmlns:p="http://schemas.openxmlformats.org/presentationml/2006/main" xmlns:r="http://schemas.openxmlformats.org/officeDocument/2006/relationships">
-  <p:cSld>
-    <p:spTree>
-      <p:nvGrpSpPr>
-        <p:cNvPr id="1" name=""/>
-        <p:cNvGrpSpPr/>
-        <p:nvPr/>
-      </p:nvGrpSpPr>
-      <p:grpSpPr>
-        <a:xfrm>
-          <a:off x="0" y="0"/>
-          <a:ext cx="0" cy="0"/>
-          <a:chOff x="0" y="0"/>
-          <a:chExt cx="0" cy="0"/>
-        </a:xfrm>
-      </p:grpSpPr>
-      <p:sp>
-        <p:nvSpPr>
-          <p:cNvPr id="177" name="PlaceHolder 1"/>
-          <p:cNvSpPr>
-            <a:spLocks noGrp="1"/>
-          </p:cNvSpPr>
-          <p:nvPr>
-            <p:ph type="body"/>
-          </p:nvPr>
-        </p:nvSpPr>
-        <p:spPr>
-          <a:xfrm>
-            <a:off x="914400" y="4343400"/>
-            <a:ext cx="5028840" cy="4114440"/>
-          </a:xfrm>
-          <a:prstGeom prst="rect">
-            <a:avLst/>
-          </a:prstGeom>
-        </p:spPr>
-        <p:txBody>
-          <a:bodyPr/>
-          <a:p>
-            <a:r>
-              <a:rPr lang="en-US" sz="2000" strike="noStrike">
-                <a:latin typeface="Arial"/>
-              </a:rPr>
-              <a:t>Nur weil unsere Test gut waren, heißt es nicht das die ergebnisse repräsentativ sind bzw man immer gute ergebnisse erzielen würde.</a:t>
-            </a:r>
-            <a:endParaRPr/>
-          </a:p>
-          <a:p>
-            <a:endParaRPr/>
-          </a:p>
-          <a:p>
-            <a:r>
-              <a:rPr lang="en-US" sz="2000" strike="noStrike">
-                <a:latin typeface="Arial"/>
-              </a:rPr>
-              <a:t>Bei unseren Test wurden keine richtigen Transaktionen durchgeführt. Also wurde der Markt durch unsere Transaktionen nicht beeinflusst</a:t>
-            </a:r>
-            <a:endParaRPr/>
-          </a:p>
-        </p:txBody>
-      </p:sp>
-      <p:sp>
-        <p:nvSpPr>
-          <p:cNvPr id="178" name="TextShape 2"/>
-          <p:cNvSpPr txBox="1"/>
-          <p:nvPr/>
-        </p:nvSpPr>
-        <p:spPr>
-          <a:xfrm>
-            <a:off x="3886200" y="8686800"/>
-            <a:ext cx="2971440" cy="456840"/>
-          </a:xfrm>
-          <a:prstGeom prst="rect">
-            <a:avLst/>
-          </a:prstGeom>
-          <a:noFill/>
-          <a:ln w="9360">
-            <a:noFill/>
-          </a:ln>
-        </p:spPr>
-        <p:txBody>
-          <a:bodyPr anchor="b"/>
-          <a:p>
-            <a:pPr algn="r">
-              <a:lnSpc>
-                <a:spcPct val="100000"/>
-              </a:lnSpc>
-            </a:pPr>
-            <a:fld id="{D4DCE964-F13B-4362-9E42-EA9ADCBE6B92}" type="slidenum">
+            <a:fld id="{8C602BEC-CF9F-4AC7-BAF0-B9B58D3C40A4}" type="slidenum">
               <a:rPr lang="en-US" sz="1200" strike="noStrike">
                 <a:solidFill>
                   <a:srgbClr val="000000"/>
@@ -654,7 +656,7 @@
       </p:grpSpPr>
       <p:sp>
         <p:nvSpPr>
-          <p:cNvPr id="165" name="PlaceHolder 1"/>
+          <p:cNvPr id="171" name="PlaceHolder 1"/>
           <p:cNvSpPr>
             <a:spLocks noGrp="1"/>
           </p:cNvSpPr>
@@ -686,7 +688,7 @@
       </p:sp>
       <p:sp>
         <p:nvSpPr>
-          <p:cNvPr id="166" name="TextShape 2"/>
+          <p:cNvPr id="172" name="TextShape 2"/>
           <p:cNvSpPr txBox="1"/>
           <p:nvPr/>
         </p:nvSpPr>
@@ -711,7 +713,7 @@
                 <a:spcPct val="100000"/>
               </a:lnSpc>
             </a:pPr>
-            <a:fld id="{1CF7C856-6E57-48CF-89D7-89ADC437FE31}" type="slidenum">
+            <a:fld id="{FCBF1882-1849-4DE5-A1AB-AC0CC0443452}" type="slidenum">
               <a:rPr lang="en-US" sz="1200" strike="noStrike">
                 <a:solidFill>
                   <a:srgbClr val="000000"/>
@@ -749,7 +751,7 @@
       </p:grpSpPr>
       <p:sp>
         <p:nvSpPr>
-          <p:cNvPr id="167" name="PlaceHolder 1"/>
+          <p:cNvPr id="173" name="PlaceHolder 1"/>
           <p:cNvSpPr>
             <a:spLocks noGrp="1"/>
           </p:cNvSpPr>
@@ -781,7 +783,7 @@
       </p:sp>
       <p:sp>
         <p:nvSpPr>
-          <p:cNvPr id="168" name="TextShape 2"/>
+          <p:cNvPr id="174" name="TextShape 2"/>
           <p:cNvSpPr txBox="1"/>
           <p:nvPr/>
         </p:nvSpPr>
@@ -806,7 +808,7 @@
                 <a:spcPct val="100000"/>
               </a:lnSpc>
             </a:pPr>
-            <a:fld id="{A1A06FD4-4A79-4ABB-A7D0-9EF057CFF7FB}" type="slidenum">
+            <a:fld id="{337F3591-281A-482A-AC01-526FE3EF8366}" type="slidenum">
               <a:rPr lang="en-US" sz="1200" strike="noStrike">
                 <a:solidFill>
                   <a:srgbClr val="000000"/>
@@ -844,7 +846,7 @@
       </p:grpSpPr>
       <p:sp>
         <p:nvSpPr>
-          <p:cNvPr id="169" name="PlaceHolder 1"/>
+          <p:cNvPr id="175" name="PlaceHolder 1"/>
           <p:cNvSpPr>
             <a:spLocks noGrp="1"/>
           </p:cNvSpPr>
@@ -870,7 +872,7 @@
       </p:sp>
       <p:sp>
         <p:nvSpPr>
-          <p:cNvPr id="170" name="TextShape 2"/>
+          <p:cNvPr id="176" name="TextShape 2"/>
           <p:cNvSpPr txBox="1"/>
           <p:nvPr/>
         </p:nvSpPr>
@@ -895,7 +897,7 @@
                 <a:spcPct val="100000"/>
               </a:lnSpc>
             </a:pPr>
-            <a:fld id="{8C35906B-9D1D-4BFD-962E-725381FADDB0}" type="slidenum">
+            <a:fld id="{94AF6372-B421-49D6-A461-4E252AA03701}" type="slidenum">
               <a:rPr lang="en-US" sz="1200" strike="noStrike">
                 <a:solidFill>
                   <a:srgbClr val="000000"/>
@@ -3690,7 +3692,7 @@
                 <a:spcPct val="100000"/>
               </a:lnSpc>
             </a:pPr>
-            <a:fld id="{C7D041D4-038D-4C2E-BDA6-C15895DD7847}" type="slidenum">
+            <a:fld id="{84395392-C217-4A10-BD11-9A88894CAF4A}" type="slidenum">
               <a:rPr lang="en-US" sz="1000" strike="noStrike">
                 <a:solidFill>
                   <a:srgbClr val="ffffff"/>
@@ -4373,7 +4375,7 @@
                 <a:spcPct val="100000"/>
               </a:lnSpc>
             </a:pPr>
-            <a:fld id="{6590D574-8CC1-4FBA-B5CA-56ABFF2DB986}" type="slidenum">
+            <a:fld id="{86D4F0C4-5804-4913-BC45-084565E193EA}" type="slidenum">
               <a:rPr lang="en-US" sz="1000" strike="noStrike">
                 <a:solidFill>
                   <a:srgbClr val="000000"/>
@@ -4530,6 +4532,22 @@
                 <a:spcPct val="100000"/>
               </a:lnSpc>
             </a:pPr>
+            <a:endParaRPr/>
+          </a:p>
+          <a:p>
+            <a:pPr>
+              <a:lnSpc>
+                <a:spcPct val="100000"/>
+              </a:lnSpc>
+            </a:pPr>
+            <a:endParaRPr/>
+          </a:p>
+          <a:p>
+            <a:pPr>
+              <a:lnSpc>
+                <a:spcPct val="100000"/>
+              </a:lnSpc>
+            </a:pPr>
             <a:r>
               <a:rPr lang="en-US" sz="2300" strike="noStrike">
                 <a:solidFill>
@@ -4602,27 +4620,6 @@
           <a:effectRef idx="0"/>
           <a:fontRef idx="minor"/>
         </p:style>
-        <p:txBody>
-          <a:bodyPr lIns="0" rIns="0" tIns="0" bIns="0"/>
-          <a:p>
-            <a:pPr>
-              <a:lnSpc>
-                <a:spcPct val="100000"/>
-              </a:lnSpc>
-            </a:pPr>
-            <a:r>
-              <a:rPr lang="en-US" sz="2200" strike="noStrike">
-                <a:solidFill>
-                  <a:srgbClr val="a1d0e5"/>
-                </a:solidFill>
-                <a:latin typeface="Arial"/>
-                <a:ea typeface="ＭＳ Ｐゴシック"/>
-              </a:rPr>
-              <a:t>ALR-Vortrag</a:t>
-            </a:r>
-            <a:endParaRPr/>
-          </a:p>
-        </p:txBody>
       </p:sp>
       <p:sp>
         <p:nvSpPr>
@@ -4725,7 +4722,7 @@
         </p:blipFill>
         <p:spPr>
           <a:xfrm>
-            <a:off x="-756720" y="1340640"/>
+            <a:off x="-756720" y="1268640"/>
             <a:ext cx="10582920" cy="5040360"/>
           </a:xfrm>
           <a:prstGeom prst="rect">
@@ -4798,102 +4795,10 @@
         <p:txBody>
           <a:bodyPr lIns="90000" rIns="90000" tIns="45000" bIns="45000" anchor="ctr"/>
           <a:p>
-            <a:pPr>
-              <a:lnSpc>
-                <a:spcPct val="100000"/>
-              </a:lnSpc>
-            </a:pPr>
-            <a:r>
-              <a:rPr b="1" lang="en-US" sz="4100" strike="noStrike">
-                <a:solidFill>
-                  <a:srgbClr val="4e5b6f"/>
-                </a:solidFill>
-                <a:latin typeface="Calibri"/>
-              </a:rPr>
-              <a:t>Moving Average Algorithmus</a:t>
-            </a:r>
-            <a:endParaRPr/>
-          </a:p>
-        </p:txBody>
-      </p:sp>
-      <p:sp>
-        <p:nvSpPr>
-          <p:cNvPr id="136" name="CustomShape 3"/>
-          <p:cNvSpPr/>
-          <p:nvPr/>
-        </p:nvSpPr>
-        <p:spPr>
-          <a:xfrm>
-            <a:off x="6910560" y="3645000"/>
-            <a:ext cx="253440" cy="649440"/>
-          </a:xfrm>
-          <a:prstGeom prst="ellipse">
-            <a:avLst/>
-          </a:prstGeom>
-          <a:noFill/>
-          <a:ln>
-            <a:solidFill>
-              <a:schemeClr val="tx1"/>
-            </a:solidFill>
-            <a:round/>
-          </a:ln>
-          <a:effectLst>
-            <a:outerShdw algn="ctr" blurRad="107950" dir="5400000" dist="12700">
-              <a:srgbClr val="000000"/>
-            </a:outerShdw>
-            <a:softEdge rad="12700"/>
-          </a:effectLst>
-        </p:spPr>
-        <p:style>
-          <a:lnRef idx="2">
-            <a:schemeClr val="accent3"/>
-          </a:lnRef>
-          <a:fillRef idx="1">
-            <a:schemeClr val="lt1"/>
-          </a:fillRef>
-          <a:effectRef idx="0">
-            <a:schemeClr val="accent3"/>
-          </a:effectRef>
-          <a:fontRef idx="minor"/>
-        </p:style>
-      </p:sp>
-      <p:sp>
-        <p:nvSpPr>
-          <p:cNvPr id="137" name="CustomShape 4"/>
-          <p:cNvSpPr/>
-          <p:nvPr/>
-        </p:nvSpPr>
-        <p:spPr>
-          <a:xfrm>
-            <a:off x="8100360" y="2709000"/>
-            <a:ext cx="253440" cy="289440"/>
-          </a:xfrm>
-          <a:prstGeom prst="ellipse">
-            <a:avLst/>
-          </a:prstGeom>
-          <a:noFill/>
-          <a:ln>
-            <a:solidFill>
-              <a:schemeClr val="tx1"/>
-            </a:solidFill>
-            <a:round/>
-          </a:ln>
-          <a:effectLst>
-            <a:softEdge rad="12700"/>
-          </a:effectLst>
-        </p:spPr>
-        <p:style>
-          <a:lnRef idx="2">
-            <a:schemeClr val="accent3"/>
-          </a:lnRef>
-          <a:fillRef idx="1">
-            <a:schemeClr val="lt1"/>
-          </a:fillRef>
-          <a:effectRef idx="0">
-            <a:schemeClr val="accent3"/>
-          </a:effectRef>
-          <a:fontRef idx="minor"/>
-        </p:style>
+            <a:pPr algn="ctr"/>
+            <a:endParaRPr/>
+          </a:p>
+        </p:txBody>
       </p:sp>
     </p:spTree>
   </p:cSld>
@@ -4903,82 +4808,7 @@
         <p:cTn id="39" dur="indefinite" restart="never" nodeType="tmRoot">
           <p:childTnLst>
             <p:seq>
-              <p:cTn id="40" dur="indefinite" nodeType="mainSeq">
-                <p:childTnLst>
-                  <p:par>
-                    <p:cTn id="41" fill="hold">
-                      <p:stCondLst>
-                        <p:cond delay="indefinite"/>
-                      </p:stCondLst>
-                      <p:childTnLst>
-                        <p:par>
-                          <p:cTn id="42" fill="hold">
-                            <p:stCondLst>
-                              <p:cond delay="0"/>
-                            </p:stCondLst>
-                            <p:childTnLst>
-                              <p:par>
-                                <p:cTn id="43" nodeType="clickEffect" fill="hold" presetClass="entr" presetID="1">
-                                  <p:stCondLst>
-                                    <p:cond delay="0"/>
-                                  </p:stCondLst>
-                                  <p:childTnLst>
-                                    <p:set>
-                                      <p:cBhvr>
-                                        <p:cTn id="44" dur="1" fill="hold">
-                                          <p:stCondLst>
-                                            <p:cond delay="0"/>
-                                          </p:stCondLst>
-                                        </p:cTn>
-                                        <p:tgtEl>
-                                          <p:spTgt spid="136"/>
-                                        </p:tgtEl>
-                                        <p:attrNameLst>
-                                          <p:attrName>style.visibility</p:attrName>
-                                        </p:attrNameLst>
-                                      </p:cBhvr>
-                                      <p:to>
-                                        <p:strVal val="visible"/>
-                                      </p:to>
-                                    </p:set>
-                                  </p:childTnLst>
-                                </p:cTn>
-                              </p:par>
-                              <p:par>
-                                <p:cTn id="45" nodeType="withEffect" fill="hold" presetClass="entr" presetID="1">
-                                  <p:stCondLst>
-                                    <p:cond delay="0"/>
-                                  </p:stCondLst>
-                                  <p:childTnLst>
-                                    <p:set>
-                                      <p:cBhvr>
-                                        <p:cTn id="46" dur="1" fill="hold">
-                                          <p:stCondLst>
-                                            <p:cond delay="0"/>
-                                          </p:stCondLst>
-                                        </p:cTn>
-                                        <p:tgtEl>
-                                          <p:spTgt spid="137"/>
-                                        </p:tgtEl>
-                                        <p:attrNameLst>
-                                          <p:attrName>style.visibility</p:attrName>
-                                        </p:attrNameLst>
-                                      </p:cBhvr>
-                                      <p:to>
-                                        <p:strVal val="visible"/>
-                                      </p:to>
-                                    </p:set>
-                                  </p:childTnLst>
-                                </p:cTn>
-                              </p:par>
-                            </p:childTnLst>
-                          </p:cTn>
-                        </p:par>
-                      </p:childTnLst>
-                    </p:cTn>
-                  </p:par>
-                </p:childTnLst>
-              </p:cTn>
+              <p:cTn id="40" nodeType="mainSeq"/>
               <p:prevCondLst>
                 <p:cond delay="0" evt="onPrev">
                   <p:tgtEl>
@@ -5019,39 +4849,16 @@
           <a:chExt cx="0" cy="0"/>
         </a:xfrm>
       </p:grpSpPr>
-      <p:pic>
-        <p:nvPicPr>
-          <p:cNvPr id="138" name="Picture 2" descr=""/>
-          <p:cNvPicPr/>
-          <p:nvPr/>
-        </p:nvPicPr>
-        <p:blipFill>
-          <a:blip r:embed="rId1"/>
-          <a:stretch/>
-        </p:blipFill>
-        <p:spPr>
-          <a:xfrm>
-            <a:off x="1475640" y="2133000"/>
-            <a:ext cx="6624360" cy="3618720"/>
-          </a:xfrm>
-          <a:prstGeom prst="rect">
-            <a:avLst/>
-          </a:prstGeom>
-          <a:ln>
-            <a:noFill/>
-          </a:ln>
-        </p:spPr>
-      </p:pic>
-      <p:sp>
-        <p:nvSpPr>
-          <p:cNvPr id="139" name="TextShape 1"/>
+      <p:sp>
+        <p:nvSpPr>
+          <p:cNvPr id="136" name="TextShape 1"/>
           <p:cNvSpPr txBox="1"/>
           <p:nvPr/>
         </p:nvSpPr>
         <p:spPr>
           <a:xfrm>
-            <a:off x="6726960" y="6408000"/>
-            <a:ext cx="1919880" cy="365400"/>
+            <a:off x="457200" y="1481400"/>
+            <a:ext cx="8229240" cy="4525560"/>
           </a:xfrm>
           <a:prstGeom prst="rect">
             <a:avLst/>
@@ -5062,36 +4869,119 @@
           </a:ln>
         </p:spPr>
         <p:txBody>
-          <a:bodyPr lIns="90000" rIns="90000" tIns="45000" bIns="45000" anchor="b"/>
-          <a:p>
-            <a:pPr>
-              <a:lnSpc>
-                <a:spcPct val="100000"/>
-              </a:lnSpc>
-            </a:pPr>
-            <a:r>
-              <a:rPr lang="en-US" sz="1000" strike="noStrike">
+          <a:bodyPr lIns="90000" rIns="90000" tIns="45000" bIns="45000"/>
+          <a:p>
+            <a:pPr>
+              <a:lnSpc>
+                <a:spcPct val="100000"/>
+              </a:lnSpc>
+              <a:buSzPct val="68000"/>
+              <a:buFont typeface="Arial"/>
+              <a:buChar char="•"/>
+            </a:pPr>
+            <a:r>
+              <a:rPr lang="en-US" sz="2700" strike="noStrike">
                 <a:solidFill>
                   <a:srgbClr val="000000"/>
                 </a:solidFill>
-                <a:latin typeface="Arial"/>
-              </a:rPr>
-              <a:t>6/10/15</a:t>
-            </a:r>
-            <a:endParaRPr/>
-          </a:p>
-        </p:txBody>
-      </p:sp>
-      <p:sp>
-        <p:nvSpPr>
-          <p:cNvPr id="140" name="TextShape 2"/>
+                <a:latin typeface="Calibri"/>
+              </a:rPr>
+              <a:t>Vorhersage des genauen Preises einer Aktie in der Zukunft.</a:t>
+            </a:r>
+            <a:endParaRPr/>
+          </a:p>
+          <a:p>
+            <a:pPr>
+              <a:lnSpc>
+                <a:spcPct val="100000"/>
+              </a:lnSpc>
+              <a:buSzPct val="68000"/>
+              <a:buFont typeface="Arial"/>
+              <a:buChar char="•"/>
+            </a:pPr>
+            <a:r>
+              <a:rPr lang="en-US" sz="2700" strike="noStrike">
+                <a:solidFill>
+                  <a:srgbClr val="000000"/>
+                </a:solidFill>
+                <a:latin typeface="Calibri"/>
+              </a:rPr>
+              <a:t>Aktien werden bei einer positiven Prognose gekauft.</a:t>
+            </a:r>
+            <a:endParaRPr/>
+          </a:p>
+          <a:p>
+            <a:pPr>
+              <a:lnSpc>
+                <a:spcPct val="100000"/>
+              </a:lnSpc>
+              <a:buSzPct val="68000"/>
+              <a:buFont typeface="Arial"/>
+              <a:buChar char="•"/>
+            </a:pPr>
+            <a:r>
+              <a:rPr lang="en-US" sz="2700" strike="noStrike">
+                <a:solidFill>
+                  <a:srgbClr val="000000"/>
+                </a:solidFill>
+                <a:latin typeface="Calibri"/>
+              </a:rPr>
+              <a:t>Basiert auf der Kursentwicklung der letzten Handelstage.</a:t>
+            </a:r>
+            <a:endParaRPr/>
+          </a:p>
+          <a:p>
+            <a:pPr>
+              <a:lnSpc>
+                <a:spcPct val="100000"/>
+              </a:lnSpc>
+              <a:buSzPct val="68000"/>
+              <a:buFont typeface="Arial"/>
+              <a:buChar char="•"/>
+            </a:pPr>
+            <a:r>
+              <a:rPr lang="en-US" sz="2700" strike="noStrike">
+                <a:solidFill>
+                  <a:srgbClr val="000000"/>
+                </a:solidFill>
+                <a:latin typeface="Calibri"/>
+              </a:rPr>
+              <a:t>Mittelwert der Abweichung wird auf den letzten Preis addiert.</a:t>
+            </a:r>
+            <a:endParaRPr/>
+          </a:p>
+          <a:p>
+            <a:pPr>
+              <a:lnSpc>
+                <a:spcPct val="100000"/>
+              </a:lnSpc>
+              <a:buSzPct val="68000"/>
+              <a:buFont typeface="Arial"/>
+              <a:buChar char="•"/>
+            </a:pPr>
+            <a:r>
+              <a:rPr lang="en-US" sz="2700" strike="noStrike">
+                <a:solidFill>
+                  <a:srgbClr val="000000"/>
+                </a:solidFill>
+                <a:latin typeface="Calibri"/>
+              </a:rPr>
+              <a:t>Beliebig weit in die Zukunft durchführbar.</a:t>
+            </a:r>
+            <a:endParaRPr/>
+          </a:p>
+        </p:txBody>
+      </p:sp>
+      <p:sp>
+        <p:nvSpPr>
+          <p:cNvPr id="137" name="TextShape 2"/>
           <p:cNvSpPr txBox="1"/>
           <p:nvPr/>
         </p:nvSpPr>
         <p:spPr>
           <a:xfrm>
-            <a:off x="457200" y="274680"/>
-            <a:ext cx="8229240" cy="1142640"/>
+            <a:off x="6726960" y="6408000"/>
+            <a:ext cx="1919880" cy="365400"/>
           </a:xfrm>
           <a:prstGeom prst="rect">
             <a:avLst/>
@@ -5102,58 +4992,75 @@
           </a:ln>
         </p:spPr>
         <p:txBody>
-          <a:bodyPr lIns="90000" rIns="90000" tIns="45000" bIns="45000" anchor="ctr"/>
-          <a:p>
-            <a:pPr>
-              <a:lnSpc>
-                <a:spcPct val="100000"/>
-              </a:lnSpc>
-            </a:pPr>
-            <a:r>
-              <a:rPr b="1" lang="en-US" sz="4100" strike="noStrike">
-                <a:solidFill>
-                  <a:srgbClr val="4e5b6f"/>
-                </a:solidFill>
-                <a:latin typeface="Calibri"/>
-              </a:rPr>
-              <a:t>Moving Average Algorithmus Ergebnisse</a:t>
-            </a:r>
-            <a:endParaRPr/>
-          </a:p>
-        </p:txBody>
-      </p:sp>
-      <p:pic>
-        <p:nvPicPr>
-          <p:cNvPr id="141" name="Picture 3" descr=""/>
-          <p:cNvPicPr/>
+          <a:bodyPr lIns="90000" rIns="90000" tIns="45000" bIns="45000" anchor="b"/>
+          <a:p>
+            <a:pPr>
+              <a:lnSpc>
+                <a:spcPct val="100000"/>
+              </a:lnSpc>
+            </a:pPr>
+            <a:r>
+              <a:rPr lang="en-US" sz="1000" strike="noStrike">
+                <a:solidFill>
+                  <a:srgbClr val="000000"/>
+                </a:solidFill>
+                <a:latin typeface="Arial"/>
+              </a:rPr>
+              <a:t>6/10/15</a:t>
+            </a:r>
+            <a:endParaRPr/>
+          </a:p>
+        </p:txBody>
+      </p:sp>
+      <p:sp>
+        <p:nvSpPr>
+          <p:cNvPr id="138" name="TextShape 3"/>
+          <p:cNvSpPr txBox="1"/>
           <p:nvPr/>
-        </p:nvPicPr>
-        <p:blipFill>
-          <a:blip r:embed="rId2"/>
-          <a:stretch/>
-        </p:blipFill>
-        <p:spPr>
-          <a:xfrm>
-            <a:off x="7740360" y="5499360"/>
-            <a:ext cx="1485720" cy="952200"/>
-          </a:xfrm>
-          <a:prstGeom prst="rect">
-            <a:avLst/>
-          </a:prstGeom>
+        </p:nvSpPr>
+        <p:spPr>
+          <a:xfrm>
+            <a:off x="457200" y="274680"/>
+            <a:ext cx="8229240" cy="1142640"/>
+          </a:xfrm>
+          <a:prstGeom prst="rect">
+            <a:avLst/>
+          </a:prstGeom>
+          <a:noFill/>
           <a:ln>
             <a:noFill/>
           </a:ln>
         </p:spPr>
-      </p:pic>
+        <p:txBody>
+          <a:bodyPr lIns="90000" rIns="90000" tIns="45000" bIns="45000" anchor="ctr"/>
+          <a:p>
+            <a:pPr>
+              <a:lnSpc>
+                <a:spcPct val="100000"/>
+              </a:lnSpc>
+            </a:pPr>
+            <a:r>
+              <a:rPr b="1" lang="en-US" sz="4100" strike="noStrike">
+                <a:solidFill>
+                  <a:srgbClr val="4e5b6f"/>
+                </a:solidFill>
+                <a:latin typeface="Calibri"/>
+              </a:rPr>
+              <a:t>Latest Trend</a:t>
+            </a:r>
+            <a:endParaRPr/>
+          </a:p>
+        </p:txBody>
+      </p:sp>
     </p:spTree>
   </p:cSld>
   <p:timing>
     <p:tnLst>
       <p:par>
-        <p:cTn id="47" dur="indefinite" restart="never" nodeType="tmRoot">
+        <p:cTn id="41" dur="indefinite" restart="never" nodeType="tmRoot">
           <p:childTnLst>
             <p:seq>
-              <p:cTn id="48" nodeType="mainSeq"/>
+              <p:cTn id="42" nodeType="mainSeq"/>
               <p:prevCondLst>
                 <p:cond delay="0" evt="onPrev">
                   <p:tgtEl>
@@ -5196,7 +5103,7 @@
       </p:grpSpPr>
       <p:sp>
         <p:nvSpPr>
-          <p:cNvPr id="142" name="TextShape 1"/>
+          <p:cNvPr id="139" name="TextShape 1"/>
           <p:cNvSpPr txBox="1"/>
           <p:nvPr/>
         </p:nvSpPr>
@@ -5231,7 +5138,7 @@
                 </a:solidFill>
                 <a:latin typeface="Calibri"/>
               </a:rPr>
-              <a:t>Gewinne bei drei der vier Zufallskombinationen</a:t>
+              <a:t>Mit allen Algorithmen hatten wir gute Ergebnisse.</a:t>
             </a:r>
             <a:endParaRPr/>
           </a:p>
@@ -5251,7 +5158,7 @@
                 </a:solidFill>
                 <a:latin typeface="Calibri"/>
               </a:rPr>
-              <a:t>Resultate bei den einzelnen Aktien ist nicht sehr aussagekräftig aber dennoch ein Indiz</a:t>
+              <a:t>Testergebnisse keine Garantie.</a:t>
             </a:r>
             <a:endParaRPr/>
           </a:p>
@@ -5271,17 +5178,77 @@
                 </a:solidFill>
                 <a:latin typeface="Calibri"/>
               </a:rPr>
-              <a:t>Bei den Zufallskombinationen insgesamt </a:t>
-            </a:r>
-            <a:r>
-              <a:rPr b="1" lang="en-US" sz="2700" strike="noStrike">
+              <a:t>Verschiedene Aktienkurse verwendet.</a:t>
+            </a:r>
+            <a:endParaRPr/>
+          </a:p>
+          <a:p>
+            <a:pPr>
+              <a:lnSpc>
+                <a:spcPct val="100000"/>
+              </a:lnSpc>
+              <a:buSzPct val="68000"/>
+              <a:buFont typeface="Arial"/>
+              <a:buChar char="•"/>
+            </a:pPr>
+            <a:r>
+              <a:rPr lang="en-US" sz="2700" strike="noStrike">
                 <a:solidFill>
                   <a:srgbClr val="000000"/>
                 </a:solidFill>
                 <a:latin typeface="Calibri"/>
               </a:rPr>
-              <a:t>89,89 $</a:t>
-            </a:r>
+              <a:t>MA Algorithmus wurde für die letzten 1000 Tage getestet.</a:t>
+            </a:r>
+            <a:endParaRPr/>
+          </a:p>
+          <a:p>
+            <a:pPr lvl="1">
+              <a:lnSpc>
+                <a:spcPct val="100000"/>
+              </a:lnSpc>
+              <a:buFont typeface="Arial"/>
+              <a:buChar char="•"/>
+            </a:pPr>
+            <a:r>
+              <a:rPr lang="en-US" sz="2300" strike="noStrike">
+                <a:solidFill>
+                  <a:srgbClr val="000000"/>
+                </a:solidFill>
+                <a:latin typeface="Calibri"/>
+              </a:rPr>
+              <a:t>Bei den Test wurde eine Aktie gekauft/verkauft</a:t>
+            </a:r>
+            <a:endParaRPr/>
+          </a:p>
+          <a:p>
+            <a:pPr lvl="1">
+              <a:lnSpc>
+                <a:spcPct val="100000"/>
+              </a:lnSpc>
+              <a:buFont typeface="Arial"/>
+              <a:buChar char="•"/>
+            </a:pPr>
+            <a:r>
+              <a:rPr lang="en-US" sz="2300" strike="noStrike">
+                <a:solidFill>
+                  <a:srgbClr val="000000"/>
+                </a:solidFill>
+                <a:latin typeface="Calibri"/>
+              </a:rPr>
+              <a:t>Gewinne/Verluste werden anhand einer Aktie genannt.</a:t>
+            </a:r>
+            <a:endParaRPr/>
+          </a:p>
+          <a:p>
+            <a:pPr>
+              <a:lnSpc>
+                <a:spcPct val="100000"/>
+              </a:lnSpc>
+              <a:buSzPct val="68000"/>
+              <a:buFont typeface="Arial"/>
+              <a:buChar char="•"/>
+            </a:pPr>
             <a:r>
               <a:rPr lang="en-US" sz="2700" strike="noStrike">
                 <a:solidFill>
@@ -5289,23 +5256,61 @@
                 </a:solidFill>
                 <a:latin typeface="Calibri"/>
               </a:rPr>
-              <a:t> Gewinn in den letzten 1000 Tagen erwirtschaftet</a:t>
-            </a:r>
-            <a:endParaRPr/>
-          </a:p>
-          <a:p>
-            <a:pPr>
-              <a:lnSpc>
-                <a:spcPct val="100000"/>
-              </a:lnSpc>
-            </a:pPr>
-            <a:endParaRPr/>
-          </a:p>
-        </p:txBody>
-      </p:sp>
-      <p:sp>
-        <p:nvSpPr>
-          <p:cNvPr id="143" name="TextShape 2"/>
+              <a:t>Latest Trend Algorithmus beste Ergebnisse bei Berücksichtigung der letzten 15 Tage</a:t>
+            </a:r>
+            <a:endParaRPr/>
+          </a:p>
+          <a:p>
+            <a:pPr lvl="1">
+              <a:lnSpc>
+                <a:spcPct val="100000"/>
+              </a:lnSpc>
+              <a:buFont typeface="Arial"/>
+              <a:buChar char="•"/>
+            </a:pPr>
+            <a:r>
+              <a:rPr lang="en-US" sz="2300" strike="noStrike">
+                <a:solidFill>
+                  <a:srgbClr val="000000"/>
+                </a:solidFill>
+                <a:latin typeface="Calibri"/>
+              </a:rPr>
+              <a:t>Lang genug um längere Tendenzen zu erkennen</a:t>
+            </a:r>
+            <a:endParaRPr/>
+          </a:p>
+          <a:p>
+            <a:pPr lvl="1">
+              <a:lnSpc>
+                <a:spcPct val="100000"/>
+              </a:lnSpc>
+              <a:buFont typeface="Arial"/>
+              <a:buChar char="•"/>
+            </a:pPr>
+            <a:r>
+              <a:rPr lang="en-US" sz="2300" strike="noStrike">
+                <a:solidFill>
+                  <a:srgbClr val="000000"/>
+                </a:solidFill>
+                <a:latin typeface="Calibri"/>
+              </a:rPr>
+              <a:t>Kurz genug um kurzzeitige Trends zu erkennen</a:t>
+            </a:r>
+            <a:endParaRPr/>
+          </a:p>
+          <a:p>
+            <a:pPr>
+              <a:lnSpc>
+                <a:spcPct val="100000"/>
+              </a:lnSpc>
+            </a:pPr>
+            <a:endParaRPr/>
+          </a:p>
+        </p:txBody>
+      </p:sp>
+      <p:sp>
+        <p:nvSpPr>
+          <p:cNvPr id="140" name="TextShape 2"/>
           <p:cNvSpPr txBox="1"/>
           <p:nvPr/>
         </p:nvSpPr>
@@ -5345,7 +5350,7 @@
       </p:sp>
       <p:sp>
         <p:nvSpPr>
-          <p:cNvPr id="144" name="TextShape 3"/>
+          <p:cNvPr id="141" name="TextShape 3"/>
           <p:cNvSpPr txBox="1"/>
           <p:nvPr/>
         </p:nvSpPr>
@@ -5377,7 +5382,7 @@
                 </a:solidFill>
                 <a:latin typeface="Calibri"/>
               </a:rPr>
-              <a:t>Moving Average Algorithmus Ergebnisse</a:t>
+              <a:t>Ergebnisse</a:t>
             </a:r>
             <a:endParaRPr/>
           </a:p>
@@ -5388,10 +5393,10 @@
   <p:timing>
     <p:tnLst>
       <p:par>
-        <p:cTn id="49" dur="indefinite" restart="never" nodeType="tmRoot">
+        <p:cTn id="43" dur="indefinite" restart="never" nodeType="tmRoot">
           <p:childTnLst>
             <p:seq>
-              <p:cTn id="50" nodeType="mainSeq"/>
+              <p:cTn id="44" nodeType="mainSeq"/>
               <p:prevCondLst>
                 <p:cond delay="0" evt="onPrev">
                   <p:tgtEl>
@@ -5432,16 +5437,39 @@
           <a:chExt cx="0" cy="0"/>
         </a:xfrm>
       </p:grpSpPr>
-      <p:sp>
-        <p:nvSpPr>
-          <p:cNvPr id="145" name="TextShape 1"/>
+      <p:pic>
+        <p:nvPicPr>
+          <p:cNvPr id="142" name="Picture 2" descr=""/>
+          <p:cNvPicPr/>
+          <p:nvPr/>
+        </p:nvPicPr>
+        <p:blipFill>
+          <a:blip r:embed="rId1"/>
+          <a:stretch/>
+        </p:blipFill>
+        <p:spPr>
+          <a:xfrm>
+            <a:off x="1475640" y="2133000"/>
+            <a:ext cx="6624360" cy="3618720"/>
+          </a:xfrm>
+          <a:prstGeom prst="rect">
+            <a:avLst/>
+          </a:prstGeom>
+          <a:ln>
+            <a:noFill/>
+          </a:ln>
+        </p:spPr>
+      </p:pic>
+      <p:sp>
+        <p:nvSpPr>
+          <p:cNvPr id="143" name="TextShape 1"/>
           <p:cNvSpPr txBox="1"/>
           <p:nvPr/>
         </p:nvSpPr>
         <p:spPr>
           <a:xfrm>
-            <a:off x="457200" y="1481400"/>
-            <a:ext cx="8229240" cy="4525560"/>
+            <a:off x="6726960" y="6408000"/>
+            <a:ext cx="1919880" cy="365400"/>
           </a:xfrm>
           <a:prstGeom prst="rect">
             <a:avLst/>
@@ -5452,119 +5480,36 @@
           </a:ln>
         </p:spPr>
         <p:txBody>
-          <a:bodyPr lIns="90000" rIns="90000" tIns="45000" bIns="45000"/>
-          <a:p>
-            <a:pPr>
-              <a:lnSpc>
-                <a:spcPct val="100000"/>
-              </a:lnSpc>
-              <a:buSzPct val="68000"/>
-              <a:buFont typeface="Arial"/>
-              <a:buChar char="•"/>
-            </a:pPr>
-            <a:r>
-              <a:rPr lang="en-US" sz="2700" strike="noStrike">
+          <a:bodyPr lIns="90000" rIns="90000" tIns="45000" bIns="45000" anchor="b"/>
+          <a:p>
+            <a:pPr>
+              <a:lnSpc>
+                <a:spcPct val="100000"/>
+              </a:lnSpc>
+            </a:pPr>
+            <a:r>
+              <a:rPr lang="en-US" sz="1000" strike="noStrike">
                 <a:solidFill>
                   <a:srgbClr val="000000"/>
                 </a:solidFill>
-                <a:latin typeface="Calibri"/>
-              </a:rPr>
-              <a:t>Vorhersage des genauen Preises einer Aktie in der Zukunft</a:t>
-            </a:r>
-            <a:endParaRPr/>
-          </a:p>
-          <a:p>
-            <a:pPr>
-              <a:lnSpc>
-                <a:spcPct val="100000"/>
-              </a:lnSpc>
-              <a:buSzPct val="68000"/>
-              <a:buFont typeface="Arial"/>
-              <a:buChar char="•"/>
-            </a:pPr>
-            <a:r>
-              <a:rPr lang="en-US" sz="2700" strike="noStrike">
-                <a:solidFill>
-                  <a:srgbClr val="000000"/>
-                </a:solidFill>
-                <a:latin typeface="Calibri"/>
-              </a:rPr>
-              <a:t>Aktien werden bei einer positiven Prognose gekauft</a:t>
-            </a:r>
-            <a:endParaRPr/>
-          </a:p>
-          <a:p>
-            <a:pPr>
-              <a:lnSpc>
-                <a:spcPct val="100000"/>
-              </a:lnSpc>
-              <a:buSzPct val="68000"/>
-              <a:buFont typeface="Arial"/>
-              <a:buChar char="•"/>
-            </a:pPr>
-            <a:r>
-              <a:rPr lang="en-US" sz="2700" strike="noStrike">
-                <a:solidFill>
-                  <a:srgbClr val="000000"/>
-                </a:solidFill>
-                <a:latin typeface="Calibri"/>
-              </a:rPr>
-              <a:t>Basiert auf der Kursentwicklung der letzten Handelstage</a:t>
-            </a:r>
-            <a:endParaRPr/>
-          </a:p>
-          <a:p>
-            <a:pPr>
-              <a:lnSpc>
-                <a:spcPct val="100000"/>
-              </a:lnSpc>
-              <a:buSzPct val="68000"/>
-              <a:buFont typeface="Arial"/>
-              <a:buChar char="•"/>
-            </a:pPr>
-            <a:r>
-              <a:rPr lang="en-US" sz="2700" strike="noStrike">
-                <a:solidFill>
-                  <a:srgbClr val="000000"/>
-                </a:solidFill>
-                <a:latin typeface="Calibri"/>
-              </a:rPr>
-              <a:t>Mittelwert der Abweichung wird auf den letzten Preis addiert</a:t>
-            </a:r>
-            <a:endParaRPr/>
-          </a:p>
-          <a:p>
-            <a:pPr>
-              <a:lnSpc>
-                <a:spcPct val="100000"/>
-              </a:lnSpc>
-              <a:buSzPct val="68000"/>
-              <a:buFont typeface="Arial"/>
-              <a:buChar char="•"/>
-            </a:pPr>
-            <a:r>
-              <a:rPr lang="en-US" sz="2700" strike="noStrike">
-                <a:solidFill>
-                  <a:srgbClr val="000000"/>
-                </a:solidFill>
-                <a:latin typeface="Calibri"/>
-              </a:rPr>
-              <a:t>Beliebig weit in die Zukunft durchführbar</a:t>
-            </a:r>
-            <a:endParaRPr/>
-          </a:p>
-        </p:txBody>
-      </p:sp>
-      <p:sp>
-        <p:nvSpPr>
-          <p:cNvPr id="146" name="TextShape 2"/>
+                <a:latin typeface="Arial"/>
+              </a:rPr>
+              <a:t>6/10/15</a:t>
+            </a:r>
+            <a:endParaRPr/>
+          </a:p>
+        </p:txBody>
+      </p:sp>
+      <p:sp>
+        <p:nvSpPr>
+          <p:cNvPr id="144" name="TextShape 2"/>
           <p:cNvSpPr txBox="1"/>
           <p:nvPr/>
         </p:nvSpPr>
         <p:spPr>
           <a:xfrm>
-            <a:off x="6726960" y="6408000"/>
-            <a:ext cx="1919880" cy="365400"/>
+            <a:off x="457200" y="274680"/>
+            <a:ext cx="8229240" cy="1142640"/>
           </a:xfrm>
           <a:prstGeom prst="rect">
             <a:avLst/>
@@ -5575,75 +5520,58 @@
           </a:ln>
         </p:spPr>
         <p:txBody>
-          <a:bodyPr lIns="90000" rIns="90000" tIns="45000" bIns="45000" anchor="b"/>
-          <a:p>
-            <a:pPr>
-              <a:lnSpc>
-                <a:spcPct val="100000"/>
-              </a:lnSpc>
-            </a:pPr>
-            <a:r>
-              <a:rPr lang="en-US" sz="1000" strike="noStrike">
-                <a:solidFill>
-                  <a:srgbClr val="000000"/>
-                </a:solidFill>
-                <a:latin typeface="Arial"/>
-              </a:rPr>
-              <a:t>6/10/15</a:t>
-            </a:r>
-            <a:endParaRPr/>
-          </a:p>
-        </p:txBody>
-      </p:sp>
-      <p:sp>
-        <p:nvSpPr>
-          <p:cNvPr id="147" name="TextShape 3"/>
-          <p:cNvSpPr txBox="1"/>
+          <a:bodyPr lIns="90000" rIns="90000" tIns="45000" bIns="45000" anchor="ctr"/>
+          <a:p>
+            <a:pPr>
+              <a:lnSpc>
+                <a:spcPct val="100000"/>
+              </a:lnSpc>
+            </a:pPr>
+            <a:r>
+              <a:rPr b="1" lang="en-US" sz="4100" strike="noStrike">
+                <a:solidFill>
+                  <a:srgbClr val="4e5b6f"/>
+                </a:solidFill>
+                <a:latin typeface="Calibri"/>
+              </a:rPr>
+              <a:t>Moving Average Algorithmus Ergebnisse</a:t>
+            </a:r>
+            <a:endParaRPr/>
+          </a:p>
+        </p:txBody>
+      </p:sp>
+      <p:pic>
+        <p:nvPicPr>
+          <p:cNvPr id="145" name="Picture 3" descr=""/>
+          <p:cNvPicPr/>
           <p:nvPr/>
-        </p:nvSpPr>
-        <p:spPr>
-          <a:xfrm>
-            <a:off x="457200" y="274680"/>
-            <a:ext cx="8229240" cy="1142640"/>
-          </a:xfrm>
-          <a:prstGeom prst="rect">
-            <a:avLst/>
-          </a:prstGeom>
-          <a:noFill/>
+        </p:nvPicPr>
+        <p:blipFill>
+          <a:blip r:embed="rId2"/>
+          <a:stretch/>
+        </p:blipFill>
+        <p:spPr>
+          <a:xfrm>
+            <a:off x="7740360" y="5499360"/>
+            <a:ext cx="1485720" cy="952200"/>
+          </a:xfrm>
+          <a:prstGeom prst="rect">
+            <a:avLst/>
+          </a:prstGeom>
           <a:ln>
             <a:noFill/>
           </a:ln>
         </p:spPr>
-        <p:txBody>
-          <a:bodyPr lIns="90000" rIns="90000" tIns="45000" bIns="45000" anchor="ctr"/>
-          <a:p>
-            <a:pPr>
-              <a:lnSpc>
-                <a:spcPct val="100000"/>
-              </a:lnSpc>
-            </a:pPr>
-            <a:r>
-              <a:rPr b="1" lang="en-US" sz="4100" strike="noStrike">
-                <a:solidFill>
-                  <a:srgbClr val="4e5b6f"/>
-                </a:solidFill>
-                <a:latin typeface="Calibri"/>
-              </a:rPr>
-              <a:t>Latest Trend Algorithmus</a:t>
-            </a:r>
-            <a:endParaRPr/>
-          </a:p>
-        </p:txBody>
-      </p:sp>
+      </p:pic>
     </p:spTree>
   </p:cSld>
   <p:timing>
     <p:tnLst>
       <p:par>
-        <p:cTn id="51" dur="indefinite" restart="never" nodeType="tmRoot">
+        <p:cTn id="45" dur="indefinite" restart="never" nodeType="tmRoot">
           <p:childTnLst>
             <p:seq>
-              <p:cTn id="52" nodeType="mainSeq"/>
+              <p:cTn id="46" nodeType="mainSeq"/>
               <p:prevCondLst>
                 <p:cond delay="0" evt="onPrev">
                   <p:tgtEl>
@@ -5686,7 +5614,7 @@
       </p:grpSpPr>
       <p:sp>
         <p:nvSpPr>
-          <p:cNvPr id="148" name="TextShape 1"/>
+          <p:cNvPr id="146" name="TextShape 1"/>
           <p:cNvSpPr txBox="1"/>
           <p:nvPr/>
         </p:nvSpPr>
@@ -5706,13 +5634,96 @@
         <p:txBody>
           <a:bodyPr lIns="90000" rIns="90000" tIns="45000" bIns="45000"/>
           <a:p>
-            <a:endParaRPr/>
-          </a:p>
-        </p:txBody>
-      </p:sp>
-      <p:sp>
-        <p:nvSpPr>
-          <p:cNvPr id="149" name="TextShape 2"/>
+            <a:pPr>
+              <a:lnSpc>
+                <a:spcPct val="100000"/>
+              </a:lnSpc>
+              <a:buSzPct val="68000"/>
+              <a:buFont typeface="Arial"/>
+              <a:buChar char="•"/>
+            </a:pPr>
+            <a:r>
+              <a:rPr lang="en-US" sz="2700" strike="noStrike">
+                <a:solidFill>
+                  <a:srgbClr val="000000"/>
+                </a:solidFill>
+                <a:latin typeface="Calibri"/>
+              </a:rPr>
+              <a:t>Gewinne bei drei der vier Zufallskombinationen</a:t>
+            </a:r>
+            <a:endParaRPr/>
+          </a:p>
+          <a:p>
+            <a:pPr>
+              <a:lnSpc>
+                <a:spcPct val="100000"/>
+              </a:lnSpc>
+              <a:buSzPct val="68000"/>
+              <a:buFont typeface="Arial"/>
+              <a:buChar char="•"/>
+            </a:pPr>
+            <a:r>
+              <a:rPr lang="en-US" sz="2700" strike="noStrike">
+                <a:solidFill>
+                  <a:srgbClr val="000000"/>
+                </a:solidFill>
+                <a:latin typeface="Calibri"/>
+              </a:rPr>
+              <a:t>Resultate bei den einzelnen Aktien ist nicht sehr aussagekräftig aber dennoch ein Indiz</a:t>
+            </a:r>
+            <a:endParaRPr/>
+          </a:p>
+          <a:p>
+            <a:pPr>
+              <a:lnSpc>
+                <a:spcPct val="100000"/>
+              </a:lnSpc>
+              <a:buSzPct val="68000"/>
+              <a:buFont typeface="Arial"/>
+              <a:buChar char="•"/>
+            </a:pPr>
+            <a:r>
+              <a:rPr lang="en-US" sz="2700" strike="noStrike">
+                <a:solidFill>
+                  <a:srgbClr val="000000"/>
+                </a:solidFill>
+                <a:latin typeface="Calibri"/>
+              </a:rPr>
+              <a:t>Bei den Zufallskombinationen insgesamt </a:t>
+            </a:r>
+            <a:r>
+              <a:rPr b="1" lang="en-US" sz="2700" strike="noStrike">
+                <a:solidFill>
+                  <a:srgbClr val="000000"/>
+                </a:solidFill>
+                <a:latin typeface="Calibri"/>
+              </a:rPr>
+              <a:t>89,89 $</a:t>
+            </a:r>
+            <a:r>
+              <a:rPr lang="en-US" sz="2700" strike="noStrike">
+                <a:solidFill>
+                  <a:srgbClr val="000000"/>
+                </a:solidFill>
+                <a:latin typeface="Calibri"/>
+              </a:rPr>
+              <a:t> Gewinn in den letzten 1000 Tagen</a:t>
+            </a:r>
+            <a:endParaRPr/>
+          </a:p>
+          <a:p>
+            <a:pPr>
+              <a:lnSpc>
+                <a:spcPct val="100000"/>
+              </a:lnSpc>
+            </a:pPr>
+            <a:endParaRPr/>
+          </a:p>
+        </p:txBody>
+      </p:sp>
+      <p:sp>
+        <p:nvSpPr>
+          <p:cNvPr id="147" name="TextShape 2"/>
           <p:cNvSpPr txBox="1"/>
           <p:nvPr/>
         </p:nvSpPr>
@@ -5752,7 +5763,7 @@
       </p:sp>
       <p:sp>
         <p:nvSpPr>
-          <p:cNvPr id="150" name="TextShape 3"/>
+          <p:cNvPr id="148" name="TextShape 3"/>
           <p:cNvSpPr txBox="1"/>
           <p:nvPr/>
         </p:nvSpPr>
@@ -5784,44 +5795,21 @@
                 </a:solidFill>
                 <a:latin typeface="Calibri"/>
               </a:rPr>
-              <a:t>Latest Trend Algorithmus Ergebnisse</a:t>
-            </a:r>
-            <a:endParaRPr/>
-          </a:p>
-        </p:txBody>
-      </p:sp>
-      <p:pic>
-        <p:nvPicPr>
-          <p:cNvPr id="151" name="Picture 2" descr=""/>
-          <p:cNvPicPr/>
-          <p:nvPr/>
-        </p:nvPicPr>
-        <p:blipFill>
-          <a:blip r:embed="rId1"/>
-          <a:stretch/>
-        </p:blipFill>
-        <p:spPr>
-          <a:xfrm>
-            <a:off x="1547640" y="2853000"/>
-            <a:ext cx="6426360" cy="2736000"/>
-          </a:xfrm>
-          <a:prstGeom prst="rect">
-            <a:avLst/>
-          </a:prstGeom>
-          <a:ln>
-            <a:noFill/>
-          </a:ln>
-        </p:spPr>
-      </p:pic>
+              <a:t>Moving Average Algorithmus Ergebnisse</a:t>
+            </a:r>
+            <a:endParaRPr/>
+          </a:p>
+        </p:txBody>
+      </p:sp>
     </p:spTree>
   </p:cSld>
   <p:timing>
     <p:tnLst>
       <p:par>
-        <p:cTn id="53" dur="indefinite" restart="never" nodeType="tmRoot">
+        <p:cTn id="47" dur="indefinite" restart="never" nodeType="tmRoot">
           <p:childTnLst>
             <p:seq>
-              <p:cTn id="54" nodeType="mainSeq"/>
+              <p:cTn id="48" nodeType="mainSeq"/>
               <p:prevCondLst>
                 <p:cond delay="0" evt="onPrev">
                   <p:tgtEl>
@@ -5864,7 +5852,7 @@
       </p:grpSpPr>
       <p:sp>
         <p:nvSpPr>
-          <p:cNvPr id="152" name="TextShape 1"/>
+          <p:cNvPr id="149" name="TextShape 1"/>
           <p:cNvSpPr txBox="1"/>
           <p:nvPr/>
         </p:nvSpPr>
@@ -5884,78 +5872,13 @@
         <p:txBody>
           <a:bodyPr lIns="90000" rIns="90000" tIns="45000" bIns="45000"/>
           <a:p>
-            <a:pPr>
-              <a:lnSpc>
-                <a:spcPct val="100000"/>
-              </a:lnSpc>
-              <a:buSzPct val="68000"/>
-              <a:buFont typeface="Arial"/>
-              <a:buChar char="•"/>
-            </a:pPr>
-            <a:r>
-              <a:rPr lang="en-US" sz="2700" strike="noStrike">
-                <a:solidFill>
-                  <a:srgbClr val="000000"/>
-                </a:solidFill>
-                <a:latin typeface="Calibri"/>
-              </a:rPr>
-              <a:t>Eine gute Vorhersage für die nächsten 4-5 Tage in die Zukunft ist sicher</a:t>
-            </a:r>
-            <a:endParaRPr/>
-          </a:p>
-          <a:p>
-            <a:pPr>
-              <a:lnSpc>
-                <a:spcPct val="100000"/>
-              </a:lnSpc>
-              <a:buSzPct val="68000"/>
-              <a:buFont typeface="Arial"/>
-              <a:buChar char="•"/>
-            </a:pPr>
-            <a:r>
-              <a:rPr lang="en-US" sz="2700" strike="noStrike">
-                <a:solidFill>
-                  <a:srgbClr val="000000"/>
-                </a:solidFill>
-                <a:latin typeface="Calibri"/>
-              </a:rPr>
-              <a:t>Bei Set 2 + 3 sind die Vorhersagen für die nächsten 15 Tage immer noch akzeptabel mit einer Differenz von ungefähr 0.1 $</a:t>
-            </a:r>
-            <a:endParaRPr/>
-          </a:p>
-          <a:p>
-            <a:pPr>
-              <a:lnSpc>
-                <a:spcPct val="100000"/>
-              </a:lnSpc>
-              <a:buSzPct val="68000"/>
-              <a:buFont typeface="Arial"/>
-              <a:buChar char="•"/>
-            </a:pPr>
-            <a:r>
-              <a:rPr lang="en-US" sz="2700" strike="noStrike">
-                <a:solidFill>
-                  <a:srgbClr val="000000"/>
-                </a:solidFill>
-                <a:latin typeface="Calibri"/>
-              </a:rPr>
-              <a:t>Aber bei Set 1 mehr als 1 $ Differenz</a:t>
-            </a:r>
-            <a:endParaRPr/>
-          </a:p>
-          <a:p>
-            <a:pPr>
-              <a:lnSpc>
-                <a:spcPct val="100000"/>
-              </a:lnSpc>
-            </a:pPr>
-            <a:endParaRPr/>
-          </a:p>
-        </p:txBody>
-      </p:sp>
-      <p:sp>
-        <p:nvSpPr>
-          <p:cNvPr id="153" name="TextShape 2"/>
+            <a:endParaRPr/>
+          </a:p>
+        </p:txBody>
+      </p:sp>
+      <p:sp>
+        <p:nvSpPr>
+          <p:cNvPr id="150" name="TextShape 2"/>
           <p:cNvSpPr txBox="1"/>
           <p:nvPr/>
         </p:nvSpPr>
@@ -5995,7 +5918,7 @@
       </p:sp>
       <p:sp>
         <p:nvSpPr>
-          <p:cNvPr id="154" name="TextShape 3"/>
+          <p:cNvPr id="151" name="TextShape 3"/>
           <p:cNvSpPr txBox="1"/>
           <p:nvPr/>
         </p:nvSpPr>
@@ -6027,21 +5950,44 @@
                 </a:solidFill>
                 <a:latin typeface="Calibri"/>
               </a:rPr>
-              <a:t>Latest Trend Algorithmus Ergebnisse</a:t>
-            </a:r>
-            <a:endParaRPr/>
-          </a:p>
-        </p:txBody>
-      </p:sp>
+              <a:t>Latest Trend Algorithmus Ergebnis</a:t>
+            </a:r>
+            <a:endParaRPr/>
+          </a:p>
+        </p:txBody>
+      </p:sp>
+      <p:pic>
+        <p:nvPicPr>
+          <p:cNvPr id="152" name="Picture 2" descr=""/>
+          <p:cNvPicPr/>
+          <p:nvPr/>
+        </p:nvPicPr>
+        <p:blipFill>
+          <a:blip r:embed="rId1"/>
+          <a:stretch/>
+        </p:blipFill>
+        <p:spPr>
+          <a:xfrm>
+            <a:off x="1547640" y="2853000"/>
+            <a:ext cx="6426360" cy="2736000"/>
+          </a:xfrm>
+          <a:prstGeom prst="rect">
+            <a:avLst/>
+          </a:prstGeom>
+          <a:ln>
+            <a:noFill/>
+          </a:ln>
+        </p:spPr>
+      </p:pic>
     </p:spTree>
   </p:cSld>
   <p:timing>
     <p:tnLst>
       <p:par>
-        <p:cTn id="55" dur="indefinite" restart="never" nodeType="tmRoot">
+        <p:cTn id="49" dur="indefinite" restart="never" nodeType="tmRoot">
           <p:childTnLst>
             <p:seq>
-              <p:cTn id="56" nodeType="mainSeq"/>
+              <p:cTn id="50" nodeType="mainSeq"/>
               <p:prevCondLst>
                 <p:cond delay="0" evt="onPrev">
                   <p:tgtEl>
@@ -6084,14 +6030,14 @@
       </p:grpSpPr>
       <p:sp>
         <p:nvSpPr>
-          <p:cNvPr id="155" name="TextShape 1"/>
+          <p:cNvPr id="153" name="TextShape 1"/>
           <p:cNvSpPr txBox="1"/>
           <p:nvPr/>
         </p:nvSpPr>
         <p:spPr>
           <a:xfrm>
-            <a:off x="457200" y="274680"/>
-            <a:ext cx="8229240" cy="1142640"/>
+            <a:off x="457200" y="1481400"/>
+            <a:ext cx="8229240" cy="4525560"/>
           </a:xfrm>
           <a:prstGeom prst="rect">
             <a:avLst/>
@@ -6102,29 +6048,95 @@
           </a:ln>
         </p:spPr>
         <p:txBody>
-          <a:bodyPr lIns="0" rIns="0" tIns="0" bIns="0" anchor="ctr"/>
-          <a:p>
-            <a:pPr algn="ctr"/>
-            <a:r>
-              <a:rPr lang="en-US" sz="4100">
-                <a:latin typeface="Arial"/>
-              </a:rPr>
-              <a:t>Neuronales Netzwerk</a:t>
-            </a:r>
-            <a:endParaRPr/>
-          </a:p>
-        </p:txBody>
-      </p:sp>
-      <p:sp>
-        <p:nvSpPr>
-          <p:cNvPr id="156" name="TextShape 2"/>
+          <a:bodyPr lIns="90000" rIns="90000" tIns="45000" bIns="45000"/>
+          <a:p>
+            <a:pPr>
+              <a:lnSpc>
+                <a:spcPct val="100000"/>
+              </a:lnSpc>
+              <a:buSzPct val="68000"/>
+              <a:buFont typeface="Arial"/>
+              <a:buChar char="•"/>
+            </a:pPr>
+            <a:r>
+              <a:rPr lang="en-US" sz="2700" strike="noStrike">
+                <a:solidFill>
+                  <a:srgbClr val="000000"/>
+                </a:solidFill>
+                <a:latin typeface="Calibri"/>
+              </a:rPr>
+              <a:t>Eine gute Vorhersage für die nächsten 4-5 Tage in die Zukunft ist sicher</a:t>
+            </a:r>
+            <a:endParaRPr/>
+          </a:p>
+          <a:p>
+            <a:pPr>
+              <a:lnSpc>
+                <a:spcPct val="100000"/>
+              </a:lnSpc>
+              <a:buSzPct val="68000"/>
+              <a:buFont typeface="Arial"/>
+              <a:buChar char="•"/>
+            </a:pPr>
+            <a:r>
+              <a:rPr lang="en-US" sz="2700" strike="noStrike">
+                <a:solidFill>
+                  <a:srgbClr val="000000"/>
+                </a:solidFill>
+                <a:latin typeface="Calibri"/>
+              </a:rPr>
+              <a:t>Bei Set 2 + 3 sind die Vorhersagen für die nächsten 15 Tage immer noch akzeptabel mit einer Differenz von ungefähr 0.1 $</a:t>
+            </a:r>
+            <a:endParaRPr/>
+          </a:p>
+          <a:p>
+            <a:pPr>
+              <a:lnSpc>
+                <a:spcPct val="100000"/>
+              </a:lnSpc>
+              <a:buSzPct val="68000"/>
+              <a:buFont typeface="Arial"/>
+              <a:buChar char="•"/>
+            </a:pPr>
+            <a:r>
+              <a:rPr lang="en-US" sz="2700" strike="noStrike">
+                <a:solidFill>
+                  <a:srgbClr val="000000"/>
+                </a:solidFill>
+                <a:latin typeface="Calibri"/>
+              </a:rPr>
+              <a:t>Aber bei Set 1 mehr als 1 $</a:t>
+            </a:r>
+            <a:endParaRPr/>
+          </a:p>
+          <a:p>
+            <a:pPr>
+              <a:lnSpc>
+                <a:spcPct val="100000"/>
+              </a:lnSpc>
+            </a:pPr>
+            <a:endParaRPr/>
+          </a:p>
+          <a:p>
+            <a:pPr>
+              <a:lnSpc>
+                <a:spcPct val="100000"/>
+              </a:lnSpc>
+            </a:pPr>
+            <a:endParaRPr/>
+          </a:p>
+        </p:txBody>
+      </p:sp>
+      <p:sp>
+        <p:nvSpPr>
+          <p:cNvPr id="154" name="TextShape 2"/>
           <p:cNvSpPr txBox="1"/>
           <p:nvPr/>
         </p:nvSpPr>
         <p:spPr>
           <a:xfrm>
-            <a:off x="457200" y="1481400"/>
-            <a:ext cx="8229240" cy="4525560"/>
+            <a:off x="6726960" y="6408000"/>
+            <a:ext cx="1919880" cy="365400"/>
           </a:xfrm>
           <a:prstGeom prst="rect">
             <a:avLst/>
@@ -6135,32 +6147,61 @@
           </a:ln>
         </p:spPr>
         <p:txBody>
-          <a:bodyPr lIns="0" rIns="0" tIns="0" bIns="0"/>
-          <a:p>
-            <a:pPr>
-              <a:buSzPct val="45000"/>
-              <a:buFont typeface="StarSymbol"/>
-              <a:buChar char=""/>
-            </a:pPr>
-            <a:r>
-              <a:rPr lang="en-US" sz="2700">
-                <a:latin typeface="Calibri"/>
-              </a:rPr>
-              <a:t>Entwickelt von Herrn Fischer</a:t>
-            </a:r>
-            <a:endParaRPr/>
-          </a:p>
-          <a:p>
-            <a:pPr>
-              <a:buSzPct val="45000"/>
-              <a:buFont typeface="StarSymbol"/>
-              <a:buChar char=""/>
-            </a:pPr>
-            <a:r>
-              <a:rPr lang="en-US" sz="2700">
-                <a:latin typeface="Calibri"/>
-              </a:rPr>
-              <a:t>Ursprünglich zu Trennung von Spiralen in 2D</a:t>
+          <a:bodyPr lIns="90000" rIns="90000" tIns="45000" bIns="45000" anchor="b"/>
+          <a:p>
+            <a:pPr>
+              <a:lnSpc>
+                <a:spcPct val="100000"/>
+              </a:lnSpc>
+            </a:pPr>
+            <a:r>
+              <a:rPr lang="en-US" sz="1000" strike="noStrike">
+                <a:solidFill>
+                  <a:srgbClr val="000000"/>
+                </a:solidFill>
+                <a:latin typeface="Arial"/>
+              </a:rPr>
+              <a:t>6/10/15</a:t>
+            </a:r>
+            <a:endParaRPr/>
+          </a:p>
+        </p:txBody>
+      </p:sp>
+      <p:sp>
+        <p:nvSpPr>
+          <p:cNvPr id="155" name="TextShape 3"/>
+          <p:cNvSpPr txBox="1"/>
+          <p:nvPr/>
+        </p:nvSpPr>
+        <p:spPr>
+          <a:xfrm>
+            <a:off x="457200" y="274680"/>
+            <a:ext cx="8229240" cy="1142640"/>
+          </a:xfrm>
+          <a:prstGeom prst="rect">
+            <a:avLst/>
+          </a:prstGeom>
+          <a:noFill/>
+          <a:ln>
+            <a:noFill/>
+          </a:ln>
+        </p:spPr>
+        <p:txBody>
+          <a:bodyPr lIns="90000" rIns="90000" tIns="45000" bIns="45000" anchor="ctr"/>
+          <a:p>
+            <a:pPr>
+              <a:lnSpc>
+                <a:spcPct val="100000"/>
+              </a:lnSpc>
+            </a:pPr>
+            <a:r>
+              <a:rPr b="1" lang="en-US" sz="4100" strike="noStrike">
+                <a:solidFill>
+                  <a:srgbClr val="4e5b6f"/>
+                </a:solidFill>
+                <a:latin typeface="Calibri"/>
+              </a:rPr>
+              <a:t>Latest Trend Algorithmus Ergebnisse</a:t>
             </a:r>
             <a:endParaRPr/>
           </a:p>
@@ -6171,10 +6212,10 @@
   <p:timing>
     <p:tnLst>
       <p:par>
-        <p:cTn id="57" dur="indefinite" restart="never" nodeType="tmRoot">
+        <p:cTn id="51" dur="indefinite" restart="never" nodeType="tmRoot">
           <p:childTnLst>
             <p:seq>
-              <p:cTn id="58" nodeType="mainSeq"/>
+              <p:cTn id="52" nodeType="mainSeq"/>
               <p:prevCondLst>
                 <p:cond delay="0" evt="onPrev">
                   <p:tgtEl>
@@ -6217,14 +6258,14 @@
       </p:grpSpPr>
       <p:sp>
         <p:nvSpPr>
-          <p:cNvPr id="157" name="TextShape 1"/>
+          <p:cNvPr id="156" name="TextShape 1"/>
           <p:cNvSpPr txBox="1"/>
           <p:nvPr/>
         </p:nvSpPr>
         <p:spPr>
           <a:xfrm>
-            <a:off x="457200" y="262440"/>
-            <a:ext cx="8229240" cy="1167480"/>
+            <a:off x="457200" y="274680"/>
+            <a:ext cx="8229240" cy="1142640"/>
           </a:xfrm>
           <a:prstGeom prst="rect">
             <a:avLst/>
@@ -6242,15 +6283,15 @@
               <a:rPr lang="en-US" sz="4100">
                 <a:latin typeface="Arial"/>
               </a:rPr>
-              <a:t>Daten vorbereiten für das Neuronale Netz</a:t>
-            </a:r>
-            <a:endParaRPr/>
-          </a:p>
-        </p:txBody>
-      </p:sp>
-      <p:sp>
-        <p:nvSpPr>
-          <p:cNvPr id="158" name="TextShape 2"/>
+              <a:t>Supervised Learning</a:t>
+            </a:r>
+            <a:endParaRPr/>
+          </a:p>
+        </p:txBody>
+      </p:sp>
+      <p:sp>
+        <p:nvSpPr>
+          <p:cNvPr id="157" name="TextShape 2"/>
           <p:cNvSpPr txBox="1"/>
           <p:nvPr/>
         </p:nvSpPr>
@@ -6279,7 +6320,7 @@
               <a:rPr lang="en-US" sz="2700">
                 <a:latin typeface="Calibri"/>
               </a:rPr>
-              <a:t>Börsen Preise auf [0.0, 1.0] normalisieren</a:t>
+              <a:t>n Features werden ausgewählt (Daily Returns, Moving Averages...)</a:t>
             </a:r>
             <a:endParaRPr/>
           </a:p>
@@ -6293,7 +6334,7 @@
               <a:rPr lang="en-US" sz="2700">
                 <a:latin typeface="Calibri"/>
               </a:rPr>
-              <a:t>Output auf -1.0 für absteigend und 1.0 für steigend</a:t>
+              <a:t>Suche nach Modell, welches anhand der Features den Trend bestimmen kann</a:t>
             </a:r>
             <a:endParaRPr/>
           </a:p>
@@ -6307,7 +6348,7 @@
               <a:rPr lang="en-US" sz="2700">
                 <a:latin typeface="Calibri"/>
               </a:rPr>
-              <a:t>Testdaten erzeugen anhand derer das </a:t>
+              <a:t>Verschieden Modelle können verwendet werden, um das Muster zu lernen</a:t>
             </a:r>
             <a:endParaRPr/>
           </a:p>
@@ -6318,10 +6359,10 @@
   <p:timing>
     <p:tnLst>
       <p:par>
-        <p:cTn id="59" dur="indefinite" restart="never" nodeType="tmRoot">
+        <p:cTn id="53" dur="indefinite" restart="never" nodeType="tmRoot">
           <p:childTnLst>
             <p:seq>
-              <p:cTn id="60" nodeType="mainSeq"/>
+              <p:cTn id="54" nodeType="mainSeq"/>
               <p:prevCondLst>
                 <p:cond delay="0" evt="onPrev">
                   <p:tgtEl>
@@ -6364,14 +6405,14 @@
       </p:grpSpPr>
       <p:sp>
         <p:nvSpPr>
-          <p:cNvPr id="159" name="TextShape 1"/>
+          <p:cNvPr id="158" name="TextShape 1"/>
           <p:cNvSpPr txBox="1"/>
           <p:nvPr/>
         </p:nvSpPr>
         <p:spPr>
           <a:xfrm>
-            <a:off x="457200" y="1481400"/>
-            <a:ext cx="8229240" cy="4525560"/>
+            <a:off x="457200" y="274680"/>
+            <a:ext cx="8229240" cy="1142640"/>
           </a:xfrm>
           <a:prstGeom prst="rect">
             <a:avLst/>
@@ -6382,156 +6423,29 @@
           </a:ln>
         </p:spPr>
         <p:txBody>
-          <a:bodyPr lIns="90000" rIns="90000" tIns="45000" bIns="45000"/>
-          <a:p>
-            <a:pPr>
-              <a:lnSpc>
-                <a:spcPct val="100000"/>
-              </a:lnSpc>
-              <a:buSzPct val="68000"/>
-              <a:buFont typeface="Arial"/>
-              <a:buChar char="•"/>
-            </a:pPr>
-            <a:r>
-              <a:rPr lang="en-US" sz="2700" strike="noStrike">
-                <a:solidFill>
-                  <a:srgbClr val="000000"/>
-                </a:solidFill>
-                <a:latin typeface="Calibri"/>
-              </a:rPr>
-              <a:t>Mit allen Algorithmen hatten wir gute Ergebnisse</a:t>
-            </a:r>
-            <a:endParaRPr/>
-          </a:p>
-          <a:p>
-            <a:pPr>
-              <a:lnSpc>
-                <a:spcPct val="100000"/>
-              </a:lnSpc>
-              <a:buSzPct val="68000"/>
-              <a:buFont typeface="Arial"/>
-              <a:buChar char="•"/>
-            </a:pPr>
-            <a:r>
-              <a:rPr lang="en-US" sz="2700" strike="noStrike">
-                <a:solidFill>
-                  <a:srgbClr val="000000"/>
-                </a:solidFill>
-                <a:latin typeface="Calibri"/>
-              </a:rPr>
-              <a:t>Testergebnisse keine Garantie</a:t>
-            </a:r>
-            <a:endParaRPr/>
-          </a:p>
-          <a:p>
-            <a:pPr>
-              <a:lnSpc>
-                <a:spcPct val="100000"/>
-              </a:lnSpc>
-              <a:buSzPct val="68000"/>
-              <a:buFont typeface="Arial"/>
-              <a:buChar char="•"/>
-            </a:pPr>
-            <a:r>
-              <a:rPr lang="en-US" sz="2700" strike="noStrike">
-                <a:solidFill>
-                  <a:srgbClr val="000000"/>
-                </a:solidFill>
-                <a:latin typeface="Calibri"/>
-              </a:rPr>
-              <a:t>Verschiedene Aktienkurse verwendet</a:t>
-            </a:r>
-            <a:endParaRPr/>
-          </a:p>
-          <a:p>
-            <a:pPr lvl="1">
-              <a:lnSpc>
-                <a:spcPct val="100000"/>
-              </a:lnSpc>
-              <a:buFont typeface="Arial"/>
-              <a:buChar char="•"/>
-            </a:pPr>
-            <a:r>
-              <a:rPr lang="en-US" sz="2300" strike="noStrike">
-                <a:solidFill>
-                  <a:srgbClr val="000000"/>
-                </a:solidFill>
-                <a:latin typeface="Calibri"/>
-              </a:rPr>
-              <a:t>Bei den Tests wurde eine Aktie gekauft/verkauft</a:t>
-            </a:r>
-            <a:endParaRPr/>
-          </a:p>
-          <a:p>
-            <a:pPr lvl="1">
-              <a:lnSpc>
-                <a:spcPct val="100000"/>
-              </a:lnSpc>
-              <a:buFont typeface="Arial"/>
-              <a:buChar char="•"/>
-            </a:pPr>
-            <a:r>
-              <a:rPr lang="en-US" sz="2300" strike="noStrike">
-                <a:solidFill>
-                  <a:srgbClr val="000000"/>
-                </a:solidFill>
-                <a:latin typeface="Calibri"/>
-              </a:rPr>
-              <a:t>Gewinne/Verluste werden anhand einer Aktie genannt</a:t>
-            </a:r>
-            <a:endParaRPr/>
-          </a:p>
-          <a:p>
-            <a:pPr>
-              <a:lnSpc>
-                <a:spcPct val="100000"/>
-              </a:lnSpc>
-              <a:buSzPct val="68000"/>
-              <a:buFont typeface="Arial"/>
-              <a:buChar char="•"/>
-            </a:pPr>
-            <a:r>
-              <a:rPr lang="en-US" sz="2700" strike="noStrike">
-                <a:solidFill>
-                  <a:srgbClr val="000000"/>
-                </a:solidFill>
-                <a:latin typeface="Calibri"/>
-              </a:rPr>
-              <a:t>Latest Trend Algorithmus lieferte beste Ergebnisse bei Berücksichtigung der letzten 15 Tage</a:t>
-            </a:r>
-            <a:endParaRPr/>
-          </a:p>
-          <a:p>
-            <a:pPr lvl="1">
-              <a:lnSpc>
-                <a:spcPct val="100000"/>
-              </a:lnSpc>
-              <a:buFont typeface="Wingdings" charset="2"/>
-              <a:buChar char=""/>
-            </a:pPr>
-            <a:r>
-              <a:rPr lang="en-US" sz="2300" strike="noStrike">
-                <a:solidFill>
-                  <a:srgbClr val="000000"/>
-                </a:solidFill>
-                <a:latin typeface="Calibri"/>
-              </a:rPr>
-              <a:t>Zeitraum optimal um längerfristige Tendenzen und kurzzeitige Trends erkennen zu können</a:t>
-            </a:r>
-            <a:endParaRPr/>
-          </a:p>
-        </p:txBody>
-      </p:sp>
-      <p:sp>
-        <p:nvSpPr>
-          <p:cNvPr id="160" name="TextShape 2"/>
+          <a:bodyPr lIns="0" rIns="0" tIns="0" bIns="0" anchor="ctr"/>
+          <a:p>
+            <a:pPr algn="ctr"/>
+            <a:r>
+              <a:rPr lang="en-US" sz="4100">
+                <a:latin typeface="Arial"/>
+              </a:rPr>
+              <a:t>Neuronales Netzwerk</a:t>
+            </a:r>
+            <a:endParaRPr/>
+          </a:p>
+        </p:txBody>
+      </p:sp>
+      <p:sp>
+        <p:nvSpPr>
+          <p:cNvPr id="159" name="TextShape 2"/>
           <p:cNvSpPr txBox="1"/>
           <p:nvPr/>
         </p:nvSpPr>
         <p:spPr>
           <a:xfrm>
-            <a:off x="6726960" y="6408000"/>
-            <a:ext cx="1919880" cy="365400"/>
+            <a:off x="457200" y="1481400"/>
+            <a:ext cx="8229240" cy="4525560"/>
           </a:xfrm>
           <a:prstGeom prst="rect">
             <a:avLst/>
@@ -6542,61 +6456,121 @@
           </a:ln>
         </p:spPr>
         <p:txBody>
-          <a:bodyPr lIns="90000" rIns="90000" tIns="45000" bIns="45000" anchor="b"/>
-          <a:p>
-            <a:pPr>
-              <a:lnSpc>
-                <a:spcPct val="100000"/>
-              </a:lnSpc>
-            </a:pPr>
-            <a:r>
-              <a:rPr lang="en-US" sz="1000" strike="noStrike">
-                <a:solidFill>
-                  <a:srgbClr val="000000"/>
-                </a:solidFill>
-                <a:latin typeface="Arial"/>
-              </a:rPr>
-              <a:t>6/10/15</a:t>
-            </a:r>
-            <a:endParaRPr/>
-          </a:p>
-        </p:txBody>
-      </p:sp>
-      <p:sp>
-        <p:nvSpPr>
-          <p:cNvPr id="161" name="TextShape 3"/>
-          <p:cNvSpPr txBox="1"/>
+          <a:bodyPr lIns="0" rIns="0" tIns="0" bIns="0"/>
+          <a:p>
+            <a:pPr>
+              <a:buSzPct val="45000"/>
+              <a:buFont typeface="StarSymbol"/>
+              <a:buChar char=""/>
+            </a:pPr>
+            <a:r>
+              <a:rPr lang="en-US" sz="2700">
+                <a:latin typeface="Calibri"/>
+              </a:rPr>
+              <a:t>Entwickelt von Herr Fischer</a:t>
+            </a:r>
+            <a:endParaRPr/>
+          </a:p>
+          <a:p>
+            <a:pPr>
+              <a:buSzPct val="45000"/>
+              <a:buFont typeface="StarSymbol"/>
+              <a:buChar char=""/>
+            </a:pPr>
+            <a:r>
+              <a:rPr lang="en-US" sz="2700">
+                <a:latin typeface="Calibri"/>
+              </a:rPr>
+              <a:t>Ursprünglich zur Trennung von Spiralen in 2D</a:t>
+            </a:r>
+            <a:endParaRPr/>
+          </a:p>
+          <a:p>
+            <a:pPr>
+              <a:buSzPct val="45000"/>
+              <a:buFont typeface="StarSymbol"/>
+              <a:buChar char=""/>
+            </a:pPr>
+            <a:endParaRPr/>
+          </a:p>
+        </p:txBody>
+      </p:sp>
+      <p:pic>
+        <p:nvPicPr>
+          <p:cNvPr id="160" name="" descr=""/>
+          <p:cNvPicPr/>
           <p:nvPr/>
-        </p:nvSpPr>
-        <p:spPr>
-          <a:xfrm>
-            <a:off x="457200" y="274680"/>
-            <a:ext cx="8229240" cy="1142640"/>
-          </a:xfrm>
-          <a:prstGeom prst="rect">
-            <a:avLst/>
-          </a:prstGeom>
-          <a:noFill/>
+        </p:nvPicPr>
+        <p:blipFill>
+          <a:blip r:embed="rId1"/>
+          <a:stretch/>
+        </p:blipFill>
+        <p:spPr>
+          <a:xfrm>
+            <a:off x="457560" y="3200760"/>
+            <a:ext cx="2721960" cy="2128680"/>
+          </a:xfrm>
+          <a:prstGeom prst="rect">
+            <a:avLst/>
+          </a:prstGeom>
           <a:ln>
             <a:noFill/>
           </a:ln>
         </p:spPr>
+      </p:pic>
+      <p:pic>
+        <p:nvPicPr>
+          <p:cNvPr id="161" name="" descr=""/>
+          <p:cNvPicPr/>
+          <p:nvPr/>
+        </p:nvPicPr>
+        <p:blipFill>
+          <a:blip r:embed="rId2"/>
+          <a:stretch/>
+        </p:blipFill>
+        <p:spPr>
+          <a:xfrm>
+            <a:off x="6035400" y="2926080"/>
+            <a:ext cx="2732760" cy="2834640"/>
+          </a:xfrm>
+          <a:prstGeom prst="rect">
+            <a:avLst/>
+          </a:prstGeom>
+          <a:ln>
+            <a:noFill/>
+          </a:ln>
+        </p:spPr>
+      </p:pic>
+      <p:sp>
+        <p:nvSpPr>
+          <p:cNvPr id="162" name="Line 3"/>
+          <p:cNvSpPr/>
+          <p:nvPr/>
+        </p:nvSpPr>
+        <p:spPr>
+          <a:xfrm flipV="1">
+            <a:off x="3291840" y="3830040"/>
+            <a:ext cx="2743200" cy="548640"/>
+          </a:xfrm>
+          <a:prstGeom prst="line">
+            <a:avLst/>
+          </a:prstGeom>
+          <a:ln>
+            <a:solidFill>
+              <a:srgbClr val="000000"/>
+            </a:solidFill>
+            <a:tailEnd len="med" type="triangle" w="med"/>
+          </a:ln>
+        </p:spPr>
         <p:txBody>
           <a:bodyPr lIns="90000" rIns="90000" tIns="45000" bIns="45000" anchor="ctr"/>
           <a:p>
-            <a:pPr>
-              <a:lnSpc>
-                <a:spcPct val="100000"/>
-              </a:lnSpc>
-            </a:pPr>
-            <a:r>
-              <a:rPr b="1" lang="en-US" sz="4100" strike="noStrike">
-                <a:solidFill>
-                  <a:srgbClr val="4e5b6f"/>
-                </a:solidFill>
-                <a:latin typeface="Calibri"/>
-              </a:rPr>
-              <a:t>Allgemeine Ergebnisse</a:t>
+            <a:pPr algn="ctr"/>
+            <a:r>
+              <a:rPr lang="en-US">
+                <a:latin typeface="Arial"/>
+              </a:rPr>
+              <a:t>Input</a:t>
             </a:r>
             <a:endParaRPr/>
           </a:p>
@@ -6607,10 +6581,10 @@
   <p:timing>
     <p:tnLst>
       <p:par>
-        <p:cTn id="61" dur="indefinite" restart="never" nodeType="tmRoot">
+        <p:cTn id="55" dur="indefinite" restart="never" nodeType="tmRoot">
           <p:childTnLst>
             <p:seq>
-              <p:cTn id="62" nodeType="mainSeq"/>
+              <p:cTn id="56" nodeType="mainSeq"/>
               <p:prevCondLst>
                 <p:cond delay="0" evt="onPrev">
                   <p:tgtEl>
@@ -6653,14 +6627,14 @@
       </p:grpSpPr>
       <p:sp>
         <p:nvSpPr>
-          <p:cNvPr id="162" name="TextShape 1"/>
+          <p:cNvPr id="163" name="TextShape 1"/>
           <p:cNvSpPr txBox="1"/>
           <p:nvPr/>
         </p:nvSpPr>
         <p:spPr>
           <a:xfrm>
-            <a:off x="457200" y="1481400"/>
-            <a:ext cx="8229240" cy="4525560"/>
+            <a:off x="457200" y="262440"/>
+            <a:ext cx="8229240" cy="1167480"/>
           </a:xfrm>
           <a:prstGeom prst="rect">
             <a:avLst/>
@@ -6671,79 +6645,29 @@
           </a:ln>
         </p:spPr>
         <p:txBody>
-          <a:bodyPr lIns="90000" rIns="90000" tIns="45000" bIns="45000"/>
-          <a:p>
-            <a:pPr>
-              <a:lnSpc>
-                <a:spcPct val="100000"/>
-              </a:lnSpc>
-              <a:buSzPct val="68000"/>
-              <a:buFont typeface="Arial"/>
-              <a:buChar char="•"/>
-            </a:pPr>
-            <a:r>
-              <a:rPr lang="en-US" sz="2700" strike="noStrike">
-                <a:solidFill>
-                  <a:srgbClr val="000000"/>
-                </a:solidFill>
-                <a:latin typeface="Calibri"/>
-              </a:rPr>
-              <a:t>Durch Berücksichtigung von noch mehr Börsenkursen eine höhere Genauigkeit erzielen</a:t>
-            </a:r>
-            <a:endParaRPr/>
-          </a:p>
-          <a:p>
-            <a:pPr>
-              <a:lnSpc>
-                <a:spcPct val="100000"/>
-              </a:lnSpc>
-              <a:buSzPct val="68000"/>
-              <a:buFont typeface="Arial"/>
-              <a:buChar char="•"/>
-            </a:pPr>
-            <a:r>
-              <a:rPr lang="en-US" sz="2700" strike="noStrike">
-                <a:solidFill>
-                  <a:srgbClr val="000000"/>
-                </a:solidFill>
-                <a:latin typeface="Calibri"/>
-              </a:rPr>
-              <a:t>Nachrichten automatisch mit einbeziehen</a:t>
-            </a:r>
-            <a:endParaRPr/>
-          </a:p>
-          <a:p>
-            <a:pPr>
-              <a:lnSpc>
-                <a:spcPct val="100000"/>
-              </a:lnSpc>
-              <a:buSzPct val="68000"/>
-              <a:buFont typeface="Arial"/>
-              <a:buChar char="•"/>
-            </a:pPr>
-            <a:r>
-              <a:rPr lang="en-US" sz="2700" strike="noStrike">
-                <a:solidFill>
-                  <a:srgbClr val="000000"/>
-                </a:solidFill>
-                <a:latin typeface="Calibri"/>
-              </a:rPr>
-              <a:t>Anhand des Volumes Trends noch besser erkennen</a:t>
-            </a:r>
-            <a:endParaRPr/>
-          </a:p>
-        </p:txBody>
-      </p:sp>
-      <p:sp>
-        <p:nvSpPr>
-          <p:cNvPr id="163" name="TextShape 2"/>
+          <a:bodyPr lIns="0" rIns="0" tIns="0" bIns="0" anchor="ctr"/>
+          <a:p>
+            <a:pPr algn="ctr"/>
+            <a:r>
+              <a:rPr lang="en-US" sz="4100">
+                <a:latin typeface="Arial"/>
+              </a:rPr>
+              <a:t>Daten für Neuronales Netz vorbereiten</a:t>
+            </a:r>
+            <a:endParaRPr/>
+          </a:p>
+        </p:txBody>
+      </p:sp>
+      <p:sp>
+        <p:nvSpPr>
+          <p:cNvPr id="164" name="TextShape 2"/>
           <p:cNvSpPr txBox="1"/>
           <p:nvPr/>
         </p:nvSpPr>
         <p:spPr>
           <a:xfrm>
-            <a:off x="6726960" y="6408000"/>
-            <a:ext cx="1919880" cy="365400"/>
+            <a:off x="457200" y="1481400"/>
+            <a:ext cx="8229240" cy="4525560"/>
           </a:xfrm>
           <a:prstGeom prst="rect">
             <a:avLst/>
@@ -6754,75 +6678,97 @@
           </a:ln>
         </p:spPr>
         <p:txBody>
-          <a:bodyPr lIns="90000" rIns="90000" tIns="45000" bIns="45000" anchor="b"/>
-          <a:p>
-            <a:pPr>
-              <a:lnSpc>
-                <a:spcPct val="100000"/>
-              </a:lnSpc>
-            </a:pPr>
-            <a:r>
-              <a:rPr lang="en-US" sz="1000" strike="noStrike">
-                <a:solidFill>
-                  <a:srgbClr val="000000"/>
-                </a:solidFill>
-                <a:latin typeface="Arial"/>
-              </a:rPr>
-              <a:t>6/10/15</a:t>
-            </a:r>
-            <a:endParaRPr/>
-          </a:p>
-        </p:txBody>
-      </p:sp>
-      <p:sp>
-        <p:nvSpPr>
-          <p:cNvPr id="164" name="TextShape 3"/>
-          <p:cNvSpPr txBox="1"/>
+          <a:bodyPr lIns="0" rIns="0" tIns="0" bIns="0"/>
+          <a:p>
+            <a:pPr>
+              <a:buSzPct val="45000"/>
+              <a:buFont typeface="StarSymbol"/>
+              <a:buChar char=""/>
+            </a:pPr>
+            <a:r>
+              <a:rPr lang="en-US" sz="2700">
+                <a:latin typeface="Calibri"/>
+              </a:rPr>
+              <a:t>Runterladen von Yahoo</a:t>
+            </a:r>
+            <a:endParaRPr/>
+          </a:p>
+          <a:p>
+            <a:pPr>
+              <a:buSzPct val="45000"/>
+              <a:buFont typeface="StarSymbol"/>
+              <a:buChar char=""/>
+            </a:pPr>
+            <a:r>
+              <a:rPr lang="en-US" sz="2700">
+                <a:latin typeface="Calibri"/>
+              </a:rPr>
+              <a:t>Auf [0.0, 1.0] normalisieren</a:t>
+            </a:r>
+            <a:endParaRPr/>
+          </a:p>
+          <a:p>
+            <a:pPr>
+              <a:buSzPct val="45000"/>
+              <a:buFont typeface="StarSymbol"/>
+              <a:buChar char=""/>
+            </a:pPr>
+            <a:r>
+              <a:rPr lang="en-US" sz="2700">
+                <a:latin typeface="Calibri"/>
+              </a:rPr>
+              <a:t>Für steigenden Kurs 1.0 als output</a:t>
+            </a:r>
+            <a:endParaRPr/>
+          </a:p>
+          <a:p>
+            <a:pPr>
+              <a:buSzPct val="45000"/>
+              <a:buFont typeface="StarSymbol"/>
+              <a:buChar char=""/>
+            </a:pPr>
+            <a:r>
+              <a:rPr lang="en-US" sz="2700">
+                <a:latin typeface="Calibri"/>
+              </a:rPr>
+              <a:t>Für fallenden Kurs -10</a:t>
+            </a:r>
+            <a:endParaRPr/>
+          </a:p>
+        </p:txBody>
+      </p:sp>
+      <p:pic>
+        <p:nvPicPr>
+          <p:cNvPr id="165" name="" descr=""/>
+          <p:cNvPicPr/>
           <p:nvPr/>
-        </p:nvSpPr>
-        <p:spPr>
-          <a:xfrm>
-            <a:off x="457200" y="274680"/>
-            <a:ext cx="8229240" cy="1142640"/>
-          </a:xfrm>
-          <a:prstGeom prst="rect">
-            <a:avLst/>
-          </a:prstGeom>
-          <a:noFill/>
+        </p:nvPicPr>
+        <p:blipFill>
+          <a:blip r:embed="rId1"/>
+          <a:stretch/>
+        </p:blipFill>
+        <p:spPr>
+          <a:xfrm>
+            <a:off x="457560" y="4023360"/>
+            <a:ext cx="8228880" cy="1257840"/>
+          </a:xfrm>
+          <a:prstGeom prst="rect">
+            <a:avLst/>
+          </a:prstGeom>
           <a:ln>
             <a:noFill/>
           </a:ln>
         </p:spPr>
-        <p:txBody>
-          <a:bodyPr lIns="90000" rIns="90000" tIns="45000" bIns="45000" anchor="ctr"/>
-          <a:p>
-            <a:pPr>
-              <a:lnSpc>
-                <a:spcPct val="100000"/>
-              </a:lnSpc>
-            </a:pPr>
-            <a:r>
-              <a:rPr b="1" lang="en-US" sz="4100" strike="noStrike">
-                <a:solidFill>
-                  <a:srgbClr val="4e5b6f"/>
-                </a:solidFill>
-                <a:latin typeface="Calibri"/>
-              </a:rPr>
-              <a:t>Ausblick</a:t>
-            </a:r>
-            <a:endParaRPr/>
-          </a:p>
-        </p:txBody>
-      </p:sp>
+      </p:pic>
     </p:spTree>
   </p:cSld>
   <p:timing>
     <p:tnLst>
       <p:par>
-        <p:cTn id="63" dur="indefinite" restart="never" nodeType="tmRoot">
+        <p:cTn id="57" dur="indefinite" restart="never" nodeType="tmRoot">
           <p:childTnLst>
             <p:seq>
-              <p:cTn id="64" nodeType="mainSeq"/>
+              <p:cTn id="58" nodeType="mainSeq"/>
               <p:prevCondLst>
                 <p:cond delay="0" evt="onPrev">
                   <p:tgtEl>
@@ -6960,74 +6906,27 @@
                 </a:solidFill>
                 <a:latin typeface="Calibri"/>
               </a:rPr>
-              <a:t>Beschreibung der Algorithmen und Ergebnisse</a:t>
-            </a:r>
-            <a:endParaRPr/>
-          </a:p>
-          <a:p>
-            <a:pPr lvl="1">
-              <a:lnSpc>
-                <a:spcPct val="100000"/>
-              </a:lnSpc>
-              <a:buFont typeface="Verdana"/>
+              <a:t>Beschreibung der Algorithmen</a:t>
+            </a:r>
+            <a:endParaRPr/>
+          </a:p>
+          <a:p>
+            <a:pPr>
+              <a:lnSpc>
+                <a:spcPct val="100000"/>
+              </a:lnSpc>
+              <a:buSzPct val="68000"/>
+              <a:buFont typeface="Wingdings 3" charset="2"/>
               <a:buAutoNum type="arabicPeriod"/>
             </a:pPr>
             <a:r>
-              <a:rPr lang="en-US" sz="2300" strike="noStrike">
+              <a:rPr lang="en-US" sz="2700" strike="noStrike">
                 <a:solidFill>
                   <a:srgbClr val="000000"/>
                 </a:solidFill>
                 <a:latin typeface="Calibri"/>
               </a:rPr>
-              <a:t>Moving Average</a:t>
-            </a:r>
-            <a:endParaRPr/>
-          </a:p>
-          <a:p>
-            <a:pPr lvl="1">
-              <a:buFont typeface="Verdana"/>
-              <a:buAutoNum type="arabicPeriod"/>
-            </a:pPr>
-            <a:r>
-              <a:rPr lang="en-US" sz="2300" strike="noStrike">
-                <a:solidFill>
-                  <a:srgbClr val="000000"/>
-                </a:solidFill>
-                <a:latin typeface="Calibri"/>
-              </a:rPr>
-              <a:t>Latest Trend</a:t>
-            </a:r>
-            <a:endParaRPr/>
-          </a:p>
-          <a:p>
-            <a:pPr lvl="1">
-              <a:buFont typeface="Verdana"/>
-              <a:buAutoNum type="arabicPeriod"/>
-            </a:pPr>
-            <a:r>
-              <a:rPr lang="en-US" sz="2300" strike="noStrike">
-                <a:solidFill>
-                  <a:srgbClr val="000000"/>
-                </a:solidFill>
-                <a:latin typeface="Calibri"/>
-              </a:rPr>
-              <a:t>LR, LDA und QDA</a:t>
-            </a:r>
-            <a:endParaRPr/>
-          </a:p>
-          <a:p>
-            <a:pPr lvl="1">
-              <a:buFont typeface="Verdana"/>
-              <a:buAutoNum type="arabicPeriod"/>
-            </a:pPr>
-            <a:r>
-              <a:rPr lang="en-US" sz="2300" strike="noStrike">
-                <a:solidFill>
-                  <a:srgbClr val="000000"/>
-                </a:solidFill>
-                <a:latin typeface="Calibri"/>
-              </a:rPr>
-              <a:t>Neuronales Netzwerk</a:t>
+              <a:t>Ergebnisse</a:t>
             </a:r>
             <a:endParaRPr/>
           </a:p>
@@ -7162,6 +7061,379 @@
           <p:childTnLst>
             <p:seq>
               <p:cTn id="4" nodeType="mainSeq"/>
+              <p:prevCondLst>
+                <p:cond delay="0" evt="onPrev">
+                  <p:tgtEl>
+                    <p:sldTgt/>
+                  </p:tgtEl>
+                </p:cond>
+              </p:prevCondLst>
+              <p:nextCondLst>
+                <p:cond delay="0" evt="onNext">
+                  <p:tgtEl>
+                    <p:sldTgt/>
+                  </p:tgtEl>
+                </p:cond>
+              </p:nextCondLst>
+            </p:seq>
+          </p:childTnLst>
+        </p:cTn>
+      </p:par>
+    </p:tnLst>
+  </p:timing>
+</p:sld>
+</file>
+
+<file path=ppt/slides/slide20.xml><?xml version="1.0" encoding="utf-8"?>
+<p:sld xmlns:a="http://schemas.openxmlformats.org/drawingml/2006/main" xmlns:p="http://schemas.openxmlformats.org/presentationml/2006/main" xmlns:r="http://schemas.openxmlformats.org/officeDocument/2006/relationships">
+  <p:cSld>
+    <p:spTree>
+      <p:nvGrpSpPr>
+        <p:cNvPr id="1" name=""/>
+        <p:cNvGrpSpPr/>
+        <p:nvPr/>
+      </p:nvGrpSpPr>
+      <p:grpSpPr>
+        <a:xfrm>
+          <a:off x="0" y="0"/>
+          <a:ext cx="0" cy="0"/>
+          <a:chOff x="0" y="0"/>
+          <a:chExt cx="0" cy="0"/>
+        </a:xfrm>
+      </p:grpSpPr>
+      <p:sp>
+        <p:nvSpPr>
+          <p:cNvPr id="166" name="TextShape 1"/>
+          <p:cNvSpPr txBox="1"/>
+          <p:nvPr/>
+        </p:nvSpPr>
+        <p:spPr>
+          <a:xfrm>
+            <a:off x="457200" y="274680"/>
+            <a:ext cx="8229240" cy="1142640"/>
+          </a:xfrm>
+          <a:prstGeom prst="rect">
+            <a:avLst/>
+          </a:prstGeom>
+          <a:noFill/>
+          <a:ln>
+            <a:noFill/>
+          </a:ln>
+        </p:spPr>
+        <p:txBody>
+          <a:bodyPr lIns="0" rIns="0" tIns="0" bIns="0" anchor="ctr"/>
+          <a:p>
+            <a:pPr algn="ctr"/>
+            <a:r>
+              <a:rPr lang="en-US" sz="4100">
+                <a:latin typeface="Arial"/>
+              </a:rPr>
+              <a:t>Vorhersage mit Neuronalem Netz</a:t>
+            </a:r>
+            <a:endParaRPr/>
+          </a:p>
+        </p:txBody>
+      </p:sp>
+      <p:sp>
+        <p:nvSpPr>
+          <p:cNvPr id="167" name="TextShape 2"/>
+          <p:cNvSpPr txBox="1"/>
+          <p:nvPr/>
+        </p:nvSpPr>
+        <p:spPr>
+          <a:xfrm>
+            <a:off x="457200" y="1481400"/>
+            <a:ext cx="8229240" cy="4525560"/>
+          </a:xfrm>
+          <a:prstGeom prst="rect">
+            <a:avLst/>
+          </a:prstGeom>
+          <a:noFill/>
+          <a:ln>
+            <a:noFill/>
+          </a:ln>
+        </p:spPr>
+        <p:txBody>
+          <a:bodyPr lIns="0" rIns="0" tIns="0" bIns="0"/>
+          <a:p>
+            <a:pPr>
+              <a:buSzPct val="45000"/>
+              <a:buFont typeface="StarSymbol"/>
+              <a:buChar char=""/>
+            </a:pPr>
+            <a:r>
+              <a:rPr lang="en-US" sz="2700">
+                <a:latin typeface="Calibri"/>
+              </a:rPr>
+              <a:t>Kurse der vorherigen Tage sind Input zum lernen</a:t>
+            </a:r>
+            <a:endParaRPr/>
+          </a:p>
+          <a:p>
+            <a:pPr>
+              <a:buSzPct val="45000"/>
+              <a:buFont typeface="StarSymbol"/>
+              <a:buChar char=""/>
+            </a:pPr>
+            <a:r>
+              <a:rPr lang="en-US" sz="2700">
+                <a:latin typeface="Calibri"/>
+              </a:rPr>
+              <a:t>Ob Kurs fällt oder steigt ist der Output</a:t>
+            </a:r>
+            <a:endParaRPr/>
+          </a:p>
+          <a:p>
+            <a:pPr>
+              <a:buSzPct val="45000"/>
+              <a:buFont typeface="StarSymbol"/>
+              <a:buChar char=""/>
+            </a:pPr>
+            <a:r>
+              <a:rPr lang="en-US" sz="2700">
+                <a:latin typeface="Calibri"/>
+              </a:rPr>
+              <a:t>Neue Tage werden als Neuronen zum testen aktiviert</a:t>
+            </a:r>
+            <a:endParaRPr/>
+          </a:p>
+          <a:p>
+            <a:pPr>
+              <a:buSzPct val="45000"/>
+              <a:buFont typeface="StarSymbol"/>
+              <a:buChar char=""/>
+            </a:pPr>
+            <a:r>
+              <a:rPr lang="en-US" sz="2700">
+                <a:latin typeface="Calibri"/>
+              </a:rPr>
+              <a:t>Ist Output des Neurons negativ wir ein fallender Kurs hervorgesagt andernfalls ein steigender</a:t>
+            </a:r>
+            <a:endParaRPr/>
+          </a:p>
+        </p:txBody>
+      </p:sp>
+    </p:spTree>
+  </p:cSld>
+  <p:timing>
+    <p:tnLst>
+      <p:par>
+        <p:cTn id="59" dur="indefinite" restart="never" nodeType="tmRoot">
+          <p:childTnLst>
+            <p:seq>
+              <p:cTn id="60" nodeType="mainSeq"/>
+              <p:prevCondLst>
+                <p:cond delay="0" evt="onPrev">
+                  <p:tgtEl>
+                    <p:sldTgt/>
+                  </p:tgtEl>
+                </p:cond>
+              </p:prevCondLst>
+              <p:nextCondLst>
+                <p:cond delay="0" evt="onNext">
+                  <p:tgtEl>
+                    <p:sldTgt/>
+                  </p:tgtEl>
+                </p:cond>
+              </p:nextCondLst>
+            </p:seq>
+          </p:childTnLst>
+        </p:cTn>
+      </p:par>
+    </p:tnLst>
+  </p:timing>
+</p:sld>
+</file>
+
+<file path=ppt/slides/slide21.xml><?xml version="1.0" encoding="utf-8"?>
+<p:sld xmlns:a="http://schemas.openxmlformats.org/drawingml/2006/main" xmlns:p="http://schemas.openxmlformats.org/presentationml/2006/main" xmlns:r="http://schemas.openxmlformats.org/officeDocument/2006/relationships">
+  <p:cSld>
+    <p:spTree>
+      <p:nvGrpSpPr>
+        <p:cNvPr id="1" name=""/>
+        <p:cNvGrpSpPr/>
+        <p:nvPr/>
+      </p:nvGrpSpPr>
+      <p:grpSpPr>
+        <a:xfrm>
+          <a:off x="0" y="0"/>
+          <a:ext cx="0" cy="0"/>
+          <a:chOff x="0" y="0"/>
+          <a:chExt cx="0" cy="0"/>
+        </a:xfrm>
+      </p:grpSpPr>
+      <p:sp>
+        <p:nvSpPr>
+          <p:cNvPr id="168" name="TextShape 1"/>
+          <p:cNvSpPr txBox="1"/>
+          <p:nvPr/>
+        </p:nvSpPr>
+        <p:spPr>
+          <a:xfrm>
+            <a:off x="457200" y="1481400"/>
+            <a:ext cx="8229240" cy="4525560"/>
+          </a:xfrm>
+          <a:prstGeom prst="rect">
+            <a:avLst/>
+          </a:prstGeom>
+          <a:noFill/>
+          <a:ln>
+            <a:noFill/>
+          </a:ln>
+        </p:spPr>
+        <p:txBody>
+          <a:bodyPr lIns="90000" rIns="90000" tIns="45000" bIns="45000"/>
+          <a:p>
+            <a:pPr>
+              <a:lnSpc>
+                <a:spcPct val="100000"/>
+              </a:lnSpc>
+              <a:buSzPct val="68000"/>
+              <a:buFont typeface="Arial"/>
+              <a:buChar char="•"/>
+            </a:pPr>
+            <a:r>
+              <a:rPr lang="en-US" sz="2700" strike="noStrike">
+                <a:solidFill>
+                  <a:srgbClr val="000000"/>
+                </a:solidFill>
+                <a:latin typeface="Calibri"/>
+              </a:rPr>
+              <a:t>Für die Algorithmen noch mehr Börsenkurse verwenden für eine höhere Genauigkeit.</a:t>
+            </a:r>
+            <a:endParaRPr/>
+          </a:p>
+          <a:p>
+            <a:pPr>
+              <a:lnSpc>
+                <a:spcPct val="100000"/>
+              </a:lnSpc>
+              <a:buSzPct val="68000"/>
+              <a:buFont typeface="Arial"/>
+              <a:buChar char="•"/>
+            </a:pPr>
+            <a:r>
+              <a:rPr lang="en-US" sz="2700" strike="noStrike">
+                <a:solidFill>
+                  <a:srgbClr val="000000"/>
+                </a:solidFill>
+                <a:latin typeface="Calibri"/>
+              </a:rPr>
+              <a:t>Nachrichten automatisch mit einbeziehen.</a:t>
+            </a:r>
+            <a:endParaRPr/>
+          </a:p>
+          <a:p>
+            <a:pPr>
+              <a:lnSpc>
+                <a:spcPct val="100000"/>
+              </a:lnSpc>
+              <a:buSzPct val="68000"/>
+              <a:buFont typeface="Arial"/>
+              <a:buChar char="•"/>
+            </a:pPr>
+            <a:r>
+              <a:rPr lang="en-US" sz="2700" strike="noStrike">
+                <a:solidFill>
+                  <a:srgbClr val="000000"/>
+                </a:solidFill>
+                <a:latin typeface="Calibri"/>
+              </a:rPr>
+              <a:t>Anhand des Volumes Trends noch besser erkennen.</a:t>
+            </a:r>
+            <a:endParaRPr/>
+          </a:p>
+        </p:txBody>
+      </p:sp>
+      <p:sp>
+        <p:nvSpPr>
+          <p:cNvPr id="169" name="TextShape 2"/>
+          <p:cNvSpPr txBox="1"/>
+          <p:nvPr/>
+        </p:nvSpPr>
+        <p:spPr>
+          <a:xfrm>
+            <a:off x="6726960" y="6408000"/>
+            <a:ext cx="1919880" cy="365400"/>
+          </a:xfrm>
+          <a:prstGeom prst="rect">
+            <a:avLst/>
+          </a:prstGeom>
+          <a:noFill/>
+          <a:ln>
+            <a:noFill/>
+          </a:ln>
+        </p:spPr>
+        <p:txBody>
+          <a:bodyPr lIns="90000" rIns="90000" tIns="45000" bIns="45000" anchor="b"/>
+          <a:p>
+            <a:pPr>
+              <a:lnSpc>
+                <a:spcPct val="100000"/>
+              </a:lnSpc>
+            </a:pPr>
+            <a:r>
+              <a:rPr lang="en-US" sz="1000" strike="noStrike">
+                <a:solidFill>
+                  <a:srgbClr val="000000"/>
+                </a:solidFill>
+                <a:latin typeface="Arial"/>
+              </a:rPr>
+              <a:t>6/10/15</a:t>
+            </a:r>
+            <a:endParaRPr/>
+          </a:p>
+        </p:txBody>
+      </p:sp>
+      <p:sp>
+        <p:nvSpPr>
+          <p:cNvPr id="170" name="TextShape 3"/>
+          <p:cNvSpPr txBox="1"/>
+          <p:nvPr/>
+        </p:nvSpPr>
+        <p:spPr>
+          <a:xfrm>
+            <a:off x="457200" y="274680"/>
+            <a:ext cx="8229240" cy="1142640"/>
+          </a:xfrm>
+          <a:prstGeom prst="rect">
+            <a:avLst/>
+          </a:prstGeom>
+          <a:noFill/>
+          <a:ln>
+            <a:noFill/>
+          </a:ln>
+        </p:spPr>
+        <p:txBody>
+          <a:bodyPr lIns="90000" rIns="90000" tIns="45000" bIns="45000" anchor="ctr"/>
+          <a:p>
+            <a:pPr>
+              <a:lnSpc>
+                <a:spcPct val="100000"/>
+              </a:lnSpc>
+            </a:pPr>
+            <a:r>
+              <a:rPr b="1" lang="en-US" sz="4100" strike="noStrike">
+                <a:solidFill>
+                  <a:srgbClr val="4e5b6f"/>
+                </a:solidFill>
+                <a:latin typeface="Calibri"/>
+              </a:rPr>
+              <a:t>Ausblick</a:t>
+            </a:r>
+            <a:endParaRPr/>
+          </a:p>
+        </p:txBody>
+      </p:sp>
+    </p:spTree>
+  </p:cSld>
+  <p:timing>
+    <p:tnLst>
+      <p:par>
+        <p:cTn id="61" dur="indefinite" restart="never" nodeType="tmRoot">
+          <p:childTnLst>
+            <p:seq>
+              <p:cTn id="62" nodeType="mainSeq"/>
               <p:prevCondLst>
                 <p:cond delay="0" evt="onPrev">
                   <p:tgtEl>
@@ -7633,7 +7905,7 @@
                 </a:solidFill>
                 <a:latin typeface="Calibri"/>
               </a:rPr>
-              <a:t>Menschen können ein gewisses Gefühl für den Markt entwickeln (menschliche Intuition).</a:t>
+              <a:t>Menschen können ein gewisses Gefühl für den Markt entwickeln.</a:t>
             </a:r>
             <a:endParaRPr/>
           </a:p>
@@ -8158,16 +8430,10 @@
               <a:lnSpc>
                 <a:spcPct val="100000"/>
               </a:lnSpc>
-            </a:pPr>
-            <a:r>
-              <a:rPr lang="en-US" sz="2000" strike="noStrike">
-                <a:solidFill>
-                  <a:srgbClr val="000000"/>
-                </a:solidFill>
-                <a:latin typeface="Calibri"/>
-              </a:rPr>
-              <a:t>    </a:t>
-            </a:r>
+              <a:buSzPct val="68000"/>
+              <a:buFont typeface="Wingdings 3" charset="2"/>
+              <a:buChar char=""/>
+            </a:pPr>
             <a:r>
               <a:rPr lang="en-US" sz="2000" strike="noStrike">
                 <a:solidFill>
@@ -9385,7 +9651,7 @@
                 </a:solidFill>
                 <a:latin typeface="Calibri"/>
               </a:rPr>
-              <a:t>Sagt keinen Börsenkurs für die Zukunft vorher</a:t>
+              <a:t>Gibt keinen genauen Börsenkurs der nächsten Tage</a:t>
             </a:r>
             <a:endParaRPr/>
           </a:p>
@@ -9425,7 +9691,7 @@
                 </a:solidFill>
                 <a:latin typeface="Calibri"/>
               </a:rPr>
-              <a:t>Bildet MA der letzten 200 Tage und 50 Tage</a:t>
+              <a:t>MA der letzten 200 Tage und 50 Tage bilden</a:t>
             </a:r>
             <a:endParaRPr/>
           </a:p>
@@ -9573,7 +9839,7 @@
                 </a:solidFill>
                 <a:latin typeface="Calibri"/>
               </a:rPr>
-              <a:t>Moving Average Algorithmus</a:t>
+              <a:t>Moving Average</a:t>
             </a:r>
             <a:endParaRPr/>
           </a:p>

</xml_diff>